<commit_message>
Modificado: - Estructura del conector - Diagramas de interfaz
</commit_message>
<xml_diff>
--- a/src/annex/propuesta_gui.pptx
+++ b/src/annex/propuesta_gui.pptx
@@ -4,10 +4,13 @@
   <p:sldMasterIdLst>
     <p:sldMasterId id="2147483648" r:id="rId1"/>
   </p:sldMasterIdLst>
+  <p:notesMasterIdLst>
+    <p:notesMasterId r:id="rId10"/>
+  </p:notesMasterIdLst>
   <p:sldIdLst>
     <p:sldId id="257" r:id="rId2"/>
     <p:sldId id="256" r:id="rId3"/>
-    <p:sldId id="263" r:id="rId4"/>
+    <p:sldId id="265" r:id="rId4"/>
     <p:sldId id="259" r:id="rId5"/>
     <p:sldId id="262" r:id="rId6"/>
     <p:sldId id="264" r:id="rId7"/>
@@ -119,6 +122,439 @@
 </p:presentation>
 </file>
 
+<file path=ppt/notesMasters/notesMaster1.xml><?xml version="1.0" encoding="utf-8"?>
+<p:notesMaster xmlns:a="http://schemas.openxmlformats.org/drawingml/2006/main" xmlns:r="http://schemas.openxmlformats.org/officeDocument/2006/relationships" xmlns:p="http://schemas.openxmlformats.org/presentationml/2006/main">
+  <p:cSld>
+    <p:bg>
+      <p:bgRef idx="1001">
+        <a:schemeClr val="bg1"/>
+      </p:bgRef>
+    </p:bg>
+    <p:spTree>
+      <p:nvGrpSpPr>
+        <p:cNvPr id="1" name=""/>
+        <p:cNvGrpSpPr/>
+        <p:nvPr/>
+      </p:nvGrpSpPr>
+      <p:grpSpPr>
+        <a:xfrm>
+          <a:off x="0" y="0"/>
+          <a:ext cx="0" cy="0"/>
+          <a:chOff x="0" y="0"/>
+          <a:chExt cx="0" cy="0"/>
+        </a:xfrm>
+      </p:grpSpPr>
+      <p:sp>
+        <p:nvSpPr>
+          <p:cNvPr id="2" name="Header Placeholder 1"/>
+          <p:cNvSpPr>
+            <a:spLocks noGrp="1"/>
+          </p:cNvSpPr>
+          <p:nvPr>
+            <p:ph type="hdr" sz="quarter"/>
+          </p:nvPr>
+        </p:nvSpPr>
+        <p:spPr>
+          <a:xfrm>
+            <a:off x="0" y="0"/>
+            <a:ext cx="2971800" cy="458788"/>
+          </a:xfrm>
+          <a:prstGeom prst="rect">
+            <a:avLst/>
+          </a:prstGeom>
+        </p:spPr>
+        <p:txBody>
+          <a:bodyPr vert="horz" lIns="91440" tIns="45720" rIns="91440" bIns="45720" rtlCol="0"/>
+          <a:lstStyle>
+            <a:lvl1pPr algn="l">
+              <a:defRPr sz="1200"/>
+            </a:lvl1pPr>
+          </a:lstStyle>
+          <a:p>
+            <a:endParaRPr lang="en-US"/>
+          </a:p>
+        </p:txBody>
+      </p:sp>
+      <p:sp>
+        <p:nvSpPr>
+          <p:cNvPr id="3" name="Date Placeholder 2"/>
+          <p:cNvSpPr>
+            <a:spLocks noGrp="1"/>
+          </p:cNvSpPr>
+          <p:nvPr>
+            <p:ph type="dt" idx="1"/>
+          </p:nvPr>
+        </p:nvSpPr>
+        <p:spPr>
+          <a:xfrm>
+            <a:off x="3884613" y="0"/>
+            <a:ext cx="2971800" cy="458788"/>
+          </a:xfrm>
+          <a:prstGeom prst="rect">
+            <a:avLst/>
+          </a:prstGeom>
+        </p:spPr>
+        <p:txBody>
+          <a:bodyPr vert="horz" lIns="91440" tIns="45720" rIns="91440" bIns="45720" rtlCol="0"/>
+          <a:lstStyle>
+            <a:lvl1pPr algn="r">
+              <a:defRPr sz="1200"/>
+            </a:lvl1pPr>
+          </a:lstStyle>
+          <a:p>
+            <a:fld id="{65768D2E-01E3-4B0B-B472-B4AC596FA912}" type="datetimeFigureOut">
+              <a:rPr lang="en-US" smtClean="0"/>
+              <a:t>6/29/2025</a:t>
+            </a:fld>
+            <a:endParaRPr lang="en-US"/>
+          </a:p>
+        </p:txBody>
+      </p:sp>
+      <p:sp>
+        <p:nvSpPr>
+          <p:cNvPr id="4" name="Slide Image Placeholder 3"/>
+          <p:cNvSpPr>
+            <a:spLocks noGrp="1" noRot="1" noChangeAspect="1"/>
+          </p:cNvSpPr>
+          <p:nvPr>
+            <p:ph type="sldImg" idx="2"/>
+          </p:nvPr>
+        </p:nvSpPr>
+        <p:spPr>
+          <a:xfrm>
+            <a:off x="685800" y="1143000"/>
+            <a:ext cx="5486400" cy="3086100"/>
+          </a:xfrm>
+          <a:prstGeom prst="rect">
+            <a:avLst/>
+          </a:prstGeom>
+          <a:noFill/>
+          <a:ln w="12700">
+            <a:solidFill>
+              <a:prstClr val="black"/>
+            </a:solidFill>
+          </a:ln>
+        </p:spPr>
+        <p:txBody>
+          <a:bodyPr vert="horz" lIns="91440" tIns="45720" rIns="91440" bIns="45720" rtlCol="0" anchor="ctr"/>
+          <a:lstStyle/>
+          <a:p>
+            <a:endParaRPr lang="en-US"/>
+          </a:p>
+        </p:txBody>
+      </p:sp>
+      <p:sp>
+        <p:nvSpPr>
+          <p:cNvPr id="5" name="Notes Placeholder 4"/>
+          <p:cNvSpPr>
+            <a:spLocks noGrp="1"/>
+          </p:cNvSpPr>
+          <p:nvPr>
+            <p:ph type="body" sz="quarter" idx="3"/>
+          </p:nvPr>
+        </p:nvSpPr>
+        <p:spPr>
+          <a:xfrm>
+            <a:off x="685800" y="4400550"/>
+            <a:ext cx="5486400" cy="3600450"/>
+          </a:xfrm>
+          <a:prstGeom prst="rect">
+            <a:avLst/>
+          </a:prstGeom>
+        </p:spPr>
+        <p:txBody>
+          <a:bodyPr vert="horz" lIns="91440" tIns="45720" rIns="91440" bIns="45720" rtlCol="0"/>
+          <a:lstStyle/>
+          <a:p>
+            <a:pPr lvl="0"/>
+            <a:r>
+              <a:rPr lang="en-US"/>
+              <a:t>Click to edit Master text styles</a:t>
+            </a:r>
+          </a:p>
+          <a:p>
+            <a:pPr lvl="1"/>
+            <a:r>
+              <a:rPr lang="en-US"/>
+              <a:t>Second level</a:t>
+            </a:r>
+          </a:p>
+          <a:p>
+            <a:pPr lvl="2"/>
+            <a:r>
+              <a:rPr lang="en-US"/>
+              <a:t>Third level</a:t>
+            </a:r>
+          </a:p>
+          <a:p>
+            <a:pPr lvl="3"/>
+            <a:r>
+              <a:rPr lang="en-US"/>
+              <a:t>Fourth level</a:t>
+            </a:r>
+          </a:p>
+          <a:p>
+            <a:pPr lvl="4"/>
+            <a:r>
+              <a:rPr lang="en-US"/>
+              <a:t>Fifth level</a:t>
+            </a:r>
+          </a:p>
+        </p:txBody>
+      </p:sp>
+      <p:sp>
+        <p:nvSpPr>
+          <p:cNvPr id="6" name="Footer Placeholder 5"/>
+          <p:cNvSpPr>
+            <a:spLocks noGrp="1"/>
+          </p:cNvSpPr>
+          <p:nvPr>
+            <p:ph type="ftr" sz="quarter" idx="4"/>
+          </p:nvPr>
+        </p:nvSpPr>
+        <p:spPr>
+          <a:xfrm>
+            <a:off x="0" y="8685213"/>
+            <a:ext cx="2971800" cy="458787"/>
+          </a:xfrm>
+          <a:prstGeom prst="rect">
+            <a:avLst/>
+          </a:prstGeom>
+        </p:spPr>
+        <p:txBody>
+          <a:bodyPr vert="horz" lIns="91440" tIns="45720" rIns="91440" bIns="45720" rtlCol="0" anchor="b"/>
+          <a:lstStyle>
+            <a:lvl1pPr algn="l">
+              <a:defRPr sz="1200"/>
+            </a:lvl1pPr>
+          </a:lstStyle>
+          <a:p>
+            <a:endParaRPr lang="en-US"/>
+          </a:p>
+        </p:txBody>
+      </p:sp>
+      <p:sp>
+        <p:nvSpPr>
+          <p:cNvPr id="7" name="Slide Number Placeholder 6"/>
+          <p:cNvSpPr>
+            <a:spLocks noGrp="1"/>
+          </p:cNvSpPr>
+          <p:nvPr>
+            <p:ph type="sldNum" sz="quarter" idx="5"/>
+          </p:nvPr>
+        </p:nvSpPr>
+        <p:spPr>
+          <a:xfrm>
+            <a:off x="3884613" y="8685213"/>
+            <a:ext cx="2971800" cy="458787"/>
+          </a:xfrm>
+          <a:prstGeom prst="rect">
+            <a:avLst/>
+          </a:prstGeom>
+        </p:spPr>
+        <p:txBody>
+          <a:bodyPr vert="horz" lIns="91440" tIns="45720" rIns="91440" bIns="45720" rtlCol="0" anchor="b"/>
+          <a:lstStyle>
+            <a:lvl1pPr algn="r">
+              <a:defRPr sz="1200"/>
+            </a:lvl1pPr>
+          </a:lstStyle>
+          <a:p>
+            <a:fld id="{7DC4374C-9139-43C5-9A45-EABD69DAAF39}" type="slidenum">
+              <a:rPr lang="en-US" smtClean="0"/>
+              <a:t>‹#›</a:t>
+            </a:fld>
+            <a:endParaRPr lang="en-US"/>
+          </a:p>
+        </p:txBody>
+      </p:sp>
+    </p:spTree>
+    <p:extLst>
+      <p:ext uri="{BB962C8B-B14F-4D97-AF65-F5344CB8AC3E}">
+        <p14:creationId xmlns:p14="http://schemas.microsoft.com/office/powerpoint/2010/main" val="2852859366"/>
+      </p:ext>
+    </p:extLst>
+  </p:cSld>
+  <p:clrMap bg1="lt1" tx1="dk1" bg2="lt2" tx2="dk2" accent1="accent1" accent2="accent2" accent3="accent3" accent4="accent4" accent5="accent5" accent6="accent6" hlink="hlink" folHlink="folHlink"/>
+  <p:notesStyle>
+    <a:lvl1pPr marL="0" algn="l" defTabSz="914400" rtl="0" eaLnBrk="1" latinLnBrk="0" hangingPunct="1">
+      <a:defRPr sz="1200" kern="1200">
+        <a:solidFill>
+          <a:schemeClr val="tx1"/>
+        </a:solidFill>
+        <a:latin typeface="+mn-lt"/>
+        <a:ea typeface="+mn-ea"/>
+        <a:cs typeface="+mn-cs"/>
+      </a:defRPr>
+    </a:lvl1pPr>
+    <a:lvl2pPr marL="457200" algn="l" defTabSz="914400" rtl="0" eaLnBrk="1" latinLnBrk="0" hangingPunct="1">
+      <a:defRPr sz="1200" kern="1200">
+        <a:solidFill>
+          <a:schemeClr val="tx1"/>
+        </a:solidFill>
+        <a:latin typeface="+mn-lt"/>
+        <a:ea typeface="+mn-ea"/>
+        <a:cs typeface="+mn-cs"/>
+      </a:defRPr>
+    </a:lvl2pPr>
+    <a:lvl3pPr marL="914400" algn="l" defTabSz="914400" rtl="0" eaLnBrk="1" latinLnBrk="0" hangingPunct="1">
+      <a:defRPr sz="1200" kern="1200">
+        <a:solidFill>
+          <a:schemeClr val="tx1"/>
+        </a:solidFill>
+        <a:latin typeface="+mn-lt"/>
+        <a:ea typeface="+mn-ea"/>
+        <a:cs typeface="+mn-cs"/>
+      </a:defRPr>
+    </a:lvl3pPr>
+    <a:lvl4pPr marL="1371600" algn="l" defTabSz="914400" rtl="0" eaLnBrk="1" latinLnBrk="0" hangingPunct="1">
+      <a:defRPr sz="1200" kern="1200">
+        <a:solidFill>
+          <a:schemeClr val="tx1"/>
+        </a:solidFill>
+        <a:latin typeface="+mn-lt"/>
+        <a:ea typeface="+mn-ea"/>
+        <a:cs typeface="+mn-cs"/>
+      </a:defRPr>
+    </a:lvl4pPr>
+    <a:lvl5pPr marL="1828800" algn="l" defTabSz="914400" rtl="0" eaLnBrk="1" latinLnBrk="0" hangingPunct="1">
+      <a:defRPr sz="1200" kern="1200">
+        <a:solidFill>
+          <a:schemeClr val="tx1"/>
+        </a:solidFill>
+        <a:latin typeface="+mn-lt"/>
+        <a:ea typeface="+mn-ea"/>
+        <a:cs typeface="+mn-cs"/>
+      </a:defRPr>
+    </a:lvl5pPr>
+    <a:lvl6pPr marL="2286000" algn="l" defTabSz="914400" rtl="0" eaLnBrk="1" latinLnBrk="0" hangingPunct="1">
+      <a:defRPr sz="1200" kern="1200">
+        <a:solidFill>
+          <a:schemeClr val="tx1"/>
+        </a:solidFill>
+        <a:latin typeface="+mn-lt"/>
+        <a:ea typeface="+mn-ea"/>
+        <a:cs typeface="+mn-cs"/>
+      </a:defRPr>
+    </a:lvl6pPr>
+    <a:lvl7pPr marL="2743200" algn="l" defTabSz="914400" rtl="0" eaLnBrk="1" latinLnBrk="0" hangingPunct="1">
+      <a:defRPr sz="1200" kern="1200">
+        <a:solidFill>
+          <a:schemeClr val="tx1"/>
+        </a:solidFill>
+        <a:latin typeface="+mn-lt"/>
+        <a:ea typeface="+mn-ea"/>
+        <a:cs typeface="+mn-cs"/>
+      </a:defRPr>
+    </a:lvl7pPr>
+    <a:lvl8pPr marL="3200400" algn="l" defTabSz="914400" rtl="0" eaLnBrk="1" latinLnBrk="0" hangingPunct="1">
+      <a:defRPr sz="1200" kern="1200">
+        <a:solidFill>
+          <a:schemeClr val="tx1"/>
+        </a:solidFill>
+        <a:latin typeface="+mn-lt"/>
+        <a:ea typeface="+mn-ea"/>
+        <a:cs typeface="+mn-cs"/>
+      </a:defRPr>
+    </a:lvl8pPr>
+    <a:lvl9pPr marL="3657600" algn="l" defTabSz="914400" rtl="0" eaLnBrk="1" latinLnBrk="0" hangingPunct="1">
+      <a:defRPr sz="1200" kern="1200">
+        <a:solidFill>
+          <a:schemeClr val="tx1"/>
+        </a:solidFill>
+        <a:latin typeface="+mn-lt"/>
+        <a:ea typeface="+mn-ea"/>
+        <a:cs typeface="+mn-cs"/>
+      </a:defRPr>
+    </a:lvl9pPr>
+  </p:notesStyle>
+</p:notesMaster>
+</file>
+
+<file path=ppt/notesSlides/notesSlide1.xml><?xml version="1.0" encoding="utf-8"?>
+<p:notes xmlns:a="http://schemas.openxmlformats.org/drawingml/2006/main" xmlns:r="http://schemas.openxmlformats.org/officeDocument/2006/relationships" xmlns:p="http://schemas.openxmlformats.org/presentationml/2006/main">
+  <p:cSld>
+    <p:spTree>
+      <p:nvGrpSpPr>
+        <p:cNvPr id="1" name=""/>
+        <p:cNvGrpSpPr/>
+        <p:nvPr/>
+      </p:nvGrpSpPr>
+      <p:grpSpPr>
+        <a:xfrm>
+          <a:off x="0" y="0"/>
+          <a:ext cx="0" cy="0"/>
+          <a:chOff x="0" y="0"/>
+          <a:chExt cx="0" cy="0"/>
+        </a:xfrm>
+      </p:grpSpPr>
+      <p:sp>
+        <p:nvSpPr>
+          <p:cNvPr id="2" name="Slide Image Placeholder 1"/>
+          <p:cNvSpPr>
+            <a:spLocks noGrp="1" noRot="1" noChangeAspect="1"/>
+          </p:cNvSpPr>
+          <p:nvPr>
+            <p:ph type="sldImg"/>
+          </p:nvPr>
+        </p:nvSpPr>
+        <p:spPr/>
+      </p:sp>
+      <p:sp>
+        <p:nvSpPr>
+          <p:cNvPr id="3" name="Notes Placeholder 2"/>
+          <p:cNvSpPr>
+            <a:spLocks noGrp="1"/>
+          </p:cNvSpPr>
+          <p:nvPr>
+            <p:ph type="body" idx="1"/>
+          </p:nvPr>
+        </p:nvSpPr>
+        <p:spPr/>
+        <p:txBody>
+          <a:bodyPr/>
+          <a:lstStyle/>
+          <a:p>
+            <a:endParaRPr lang="en-US" dirty="0"/>
+          </a:p>
+        </p:txBody>
+      </p:sp>
+      <p:sp>
+        <p:nvSpPr>
+          <p:cNvPr id="4" name="Slide Number Placeholder 3"/>
+          <p:cNvSpPr>
+            <a:spLocks noGrp="1"/>
+          </p:cNvSpPr>
+          <p:nvPr>
+            <p:ph type="sldNum" sz="quarter" idx="5"/>
+          </p:nvPr>
+        </p:nvSpPr>
+        <p:spPr/>
+        <p:txBody>
+          <a:bodyPr/>
+          <a:lstStyle/>
+          <a:p>
+            <a:fld id="{7DC4374C-9139-43C5-9A45-EABD69DAAF39}" type="slidenum">
+              <a:rPr lang="en-US" smtClean="0"/>
+              <a:t>3</a:t>
+            </a:fld>
+            <a:endParaRPr lang="en-US"/>
+          </a:p>
+        </p:txBody>
+      </p:sp>
+    </p:spTree>
+    <p:extLst>
+      <p:ext uri="{BB962C8B-B14F-4D97-AF65-F5344CB8AC3E}">
+        <p14:creationId xmlns:p14="http://schemas.microsoft.com/office/powerpoint/2010/main" val="582366409"/>
+      </p:ext>
+    </p:extLst>
+  </p:cSld>
+  <p:clrMapOvr>
+    <a:masterClrMapping/>
+  </p:clrMapOvr>
+</p:notes>
+</file>
+
 <file path=ppt/slideLayouts/slideLayout1.xml><?xml version="1.0" encoding="utf-8"?>
 <p:sldLayout xmlns:a="http://schemas.openxmlformats.org/drawingml/2006/main" xmlns:r="http://schemas.openxmlformats.org/officeDocument/2006/relationships" xmlns:p="http://schemas.openxmlformats.org/presentationml/2006/main" type="title" preserve="1">
   <p:cSld name="Diapositiva de título">
@@ -268,7 +704,7 @@
           <a:p>
             <a:fld id="{E9678507-3CFE-4A03-B562-1B8B6CB373E1}" type="datetimeFigureOut">
               <a:rPr lang="es-VE" smtClean="0"/>
-              <a:t>28/6/2025</a:t>
+              <a:t>29/6/2025</a:t>
             </a:fld>
             <a:endParaRPr lang="es-VE"/>
           </a:p>
@@ -322,7 +758,7 @@
           <a:p>
             <a:fld id="{4ECAC6D2-66BD-4570-BDCE-560FE2FDE3BB}" type="slidenum">
               <a:rPr lang="es-VE" smtClean="0"/>
-              <a:t>‹Nº›</a:t>
+              <a:t>‹#›</a:t>
             </a:fld>
             <a:endParaRPr lang="es-VE"/>
           </a:p>
@@ -468,7 +904,7 @@
           <a:p>
             <a:fld id="{E9678507-3CFE-4A03-B562-1B8B6CB373E1}" type="datetimeFigureOut">
               <a:rPr lang="es-VE" smtClean="0"/>
-              <a:t>28/6/2025</a:t>
+              <a:t>29/6/2025</a:t>
             </a:fld>
             <a:endParaRPr lang="es-VE"/>
           </a:p>
@@ -522,7 +958,7 @@
           <a:p>
             <a:fld id="{4ECAC6D2-66BD-4570-BDCE-560FE2FDE3BB}" type="slidenum">
               <a:rPr lang="es-VE" smtClean="0"/>
-              <a:t>‹Nº›</a:t>
+              <a:t>‹#›</a:t>
             </a:fld>
             <a:endParaRPr lang="es-VE"/>
           </a:p>
@@ -678,7 +1114,7 @@
           <a:p>
             <a:fld id="{E9678507-3CFE-4A03-B562-1B8B6CB373E1}" type="datetimeFigureOut">
               <a:rPr lang="es-VE" smtClean="0"/>
-              <a:t>28/6/2025</a:t>
+              <a:t>29/6/2025</a:t>
             </a:fld>
             <a:endParaRPr lang="es-VE"/>
           </a:p>
@@ -732,7 +1168,7 @@
           <a:p>
             <a:fld id="{4ECAC6D2-66BD-4570-BDCE-560FE2FDE3BB}" type="slidenum">
               <a:rPr lang="es-VE" smtClean="0"/>
-              <a:t>‹Nº›</a:t>
+              <a:t>‹#›</a:t>
             </a:fld>
             <a:endParaRPr lang="es-VE"/>
           </a:p>
@@ -878,7 +1314,7 @@
           <a:p>
             <a:fld id="{E9678507-3CFE-4A03-B562-1B8B6CB373E1}" type="datetimeFigureOut">
               <a:rPr lang="es-VE" smtClean="0"/>
-              <a:t>28/6/2025</a:t>
+              <a:t>29/6/2025</a:t>
             </a:fld>
             <a:endParaRPr lang="es-VE"/>
           </a:p>
@@ -932,7 +1368,7 @@
           <a:p>
             <a:fld id="{4ECAC6D2-66BD-4570-BDCE-560FE2FDE3BB}" type="slidenum">
               <a:rPr lang="es-VE" smtClean="0"/>
-              <a:t>‹Nº›</a:t>
+              <a:t>‹#›</a:t>
             </a:fld>
             <a:endParaRPr lang="es-VE"/>
           </a:p>
@@ -1154,7 +1590,7 @@
           <a:p>
             <a:fld id="{E9678507-3CFE-4A03-B562-1B8B6CB373E1}" type="datetimeFigureOut">
               <a:rPr lang="es-VE" smtClean="0"/>
-              <a:t>28/6/2025</a:t>
+              <a:t>29/6/2025</a:t>
             </a:fld>
             <a:endParaRPr lang="es-VE"/>
           </a:p>
@@ -1208,7 +1644,7 @@
           <a:p>
             <a:fld id="{4ECAC6D2-66BD-4570-BDCE-560FE2FDE3BB}" type="slidenum">
               <a:rPr lang="es-VE" smtClean="0"/>
-              <a:t>‹Nº›</a:t>
+              <a:t>‹#›</a:t>
             </a:fld>
             <a:endParaRPr lang="es-VE"/>
           </a:p>
@@ -1422,7 +1858,7 @@
           <a:p>
             <a:fld id="{E9678507-3CFE-4A03-B562-1B8B6CB373E1}" type="datetimeFigureOut">
               <a:rPr lang="es-VE" smtClean="0"/>
-              <a:t>28/6/2025</a:t>
+              <a:t>29/6/2025</a:t>
             </a:fld>
             <a:endParaRPr lang="es-VE"/>
           </a:p>
@@ -1476,7 +1912,7 @@
           <a:p>
             <a:fld id="{4ECAC6D2-66BD-4570-BDCE-560FE2FDE3BB}" type="slidenum">
               <a:rPr lang="es-VE" smtClean="0"/>
-              <a:t>‹Nº›</a:t>
+              <a:t>‹#›</a:t>
             </a:fld>
             <a:endParaRPr lang="es-VE"/>
           </a:p>
@@ -1837,7 +2273,7 @@
           <a:p>
             <a:fld id="{E9678507-3CFE-4A03-B562-1B8B6CB373E1}" type="datetimeFigureOut">
               <a:rPr lang="es-VE" smtClean="0"/>
-              <a:t>28/6/2025</a:t>
+              <a:t>29/6/2025</a:t>
             </a:fld>
             <a:endParaRPr lang="es-VE"/>
           </a:p>
@@ -1891,7 +2327,7 @@
           <a:p>
             <a:fld id="{4ECAC6D2-66BD-4570-BDCE-560FE2FDE3BB}" type="slidenum">
               <a:rPr lang="es-VE" smtClean="0"/>
-              <a:t>‹Nº›</a:t>
+              <a:t>‹#›</a:t>
             </a:fld>
             <a:endParaRPr lang="es-VE"/>
           </a:p>
@@ -1979,7 +2415,7 @@
           <a:p>
             <a:fld id="{E9678507-3CFE-4A03-B562-1B8B6CB373E1}" type="datetimeFigureOut">
               <a:rPr lang="es-VE" smtClean="0"/>
-              <a:t>28/6/2025</a:t>
+              <a:t>29/6/2025</a:t>
             </a:fld>
             <a:endParaRPr lang="es-VE"/>
           </a:p>
@@ -2033,7 +2469,7 @@
           <a:p>
             <a:fld id="{4ECAC6D2-66BD-4570-BDCE-560FE2FDE3BB}" type="slidenum">
               <a:rPr lang="es-VE" smtClean="0"/>
-              <a:t>‹Nº›</a:t>
+              <a:t>‹#›</a:t>
             </a:fld>
             <a:endParaRPr lang="es-VE"/>
           </a:p>
@@ -2092,7 +2528,7 @@
           <a:p>
             <a:fld id="{E9678507-3CFE-4A03-B562-1B8B6CB373E1}" type="datetimeFigureOut">
               <a:rPr lang="es-VE" smtClean="0"/>
-              <a:t>28/6/2025</a:t>
+              <a:t>29/6/2025</a:t>
             </a:fld>
             <a:endParaRPr lang="es-VE"/>
           </a:p>
@@ -2146,7 +2582,7 @@
           <a:p>
             <a:fld id="{4ECAC6D2-66BD-4570-BDCE-560FE2FDE3BB}" type="slidenum">
               <a:rPr lang="es-VE" smtClean="0"/>
-              <a:t>‹Nº›</a:t>
+              <a:t>‹#›</a:t>
             </a:fld>
             <a:endParaRPr lang="es-VE"/>
           </a:p>
@@ -2405,7 +2841,7 @@
           <a:p>
             <a:fld id="{E9678507-3CFE-4A03-B562-1B8B6CB373E1}" type="datetimeFigureOut">
               <a:rPr lang="es-VE" smtClean="0"/>
-              <a:t>28/6/2025</a:t>
+              <a:t>29/6/2025</a:t>
             </a:fld>
             <a:endParaRPr lang="es-VE"/>
           </a:p>
@@ -2459,7 +2895,7 @@
           <a:p>
             <a:fld id="{4ECAC6D2-66BD-4570-BDCE-560FE2FDE3BB}" type="slidenum">
               <a:rPr lang="es-VE" smtClean="0"/>
-              <a:t>‹Nº›</a:t>
+              <a:t>‹#›</a:t>
             </a:fld>
             <a:endParaRPr lang="es-VE"/>
           </a:p>
@@ -2694,7 +3130,7 @@
           <a:p>
             <a:fld id="{E9678507-3CFE-4A03-B562-1B8B6CB373E1}" type="datetimeFigureOut">
               <a:rPr lang="es-VE" smtClean="0"/>
-              <a:t>28/6/2025</a:t>
+              <a:t>29/6/2025</a:t>
             </a:fld>
             <a:endParaRPr lang="es-VE"/>
           </a:p>
@@ -2748,7 +3184,7 @@
           <a:p>
             <a:fld id="{4ECAC6D2-66BD-4570-BDCE-560FE2FDE3BB}" type="slidenum">
               <a:rPr lang="es-VE" smtClean="0"/>
-              <a:t>‹Nº›</a:t>
+              <a:t>‹#›</a:t>
             </a:fld>
             <a:endParaRPr lang="es-VE"/>
           </a:p>
@@ -2937,7 +3373,7 @@
           <a:p>
             <a:fld id="{E9678507-3CFE-4A03-B562-1B8B6CB373E1}" type="datetimeFigureOut">
               <a:rPr lang="es-VE" smtClean="0"/>
-              <a:t>28/6/2025</a:t>
+              <a:t>29/6/2025</a:t>
             </a:fld>
             <a:endParaRPr lang="es-VE"/>
           </a:p>
@@ -3027,7 +3463,7 @@
           <a:p>
             <a:fld id="{4ECAC6D2-66BD-4570-BDCE-560FE2FDE3BB}" type="slidenum">
               <a:rPr lang="es-VE" smtClean="0"/>
-              <a:t>‹Nº›</a:t>
+              <a:t>‹#›</a:t>
             </a:fld>
             <a:endParaRPr lang="es-VE"/>
           </a:p>
@@ -3683,8 +4119,8 @@
         </p:blipFill>
         <p:spPr>
           <a:xfrm>
-            <a:off x="1055992" y="2443869"/>
-            <a:ext cx="2339591" cy="2339591"/>
+            <a:off x="937873" y="2396920"/>
+            <a:ext cx="2613596" cy="2613596"/>
           </a:xfrm>
           <a:prstGeom prst="rect">
             <a:avLst/>
@@ -3719,7 +4155,7 @@
         </p:blipFill>
         <p:spPr>
           <a:xfrm>
-            <a:off x="8810191" y="2628536"/>
+            <a:off x="8829915" y="2396920"/>
             <a:ext cx="2339590" cy="2339590"/>
           </a:xfrm>
           <a:prstGeom prst="rect">
@@ -3756,8 +4192,8 @@
         </p:blipFill>
         <p:spPr>
           <a:xfrm>
-            <a:off x="4933092" y="2628536"/>
-            <a:ext cx="2339590" cy="1944086"/>
+            <a:off x="6221663" y="2466691"/>
+            <a:ext cx="2647625" cy="2200048"/>
           </a:xfrm>
           <a:prstGeom prst="rect">
             <a:avLst/>
@@ -3832,7 +4268,7 @@
         </p:nvSpPr>
         <p:spPr>
           <a:xfrm>
-            <a:off x="1042219" y="2259204"/>
+            <a:off x="1074876" y="1889090"/>
             <a:ext cx="2339590" cy="369332"/>
           </a:xfrm>
           <a:prstGeom prst="rect">
@@ -3869,7 +4305,7 @@
         </p:nvSpPr>
         <p:spPr>
           <a:xfrm>
-            <a:off x="4933092" y="2120704"/>
+            <a:off x="6375681" y="1889088"/>
             <a:ext cx="2339590" cy="646331"/>
           </a:xfrm>
           <a:prstGeom prst="rect">
@@ -3913,7 +4349,7 @@
         </p:nvSpPr>
         <p:spPr>
           <a:xfrm>
-            <a:off x="8682615" y="2259203"/>
+            <a:off x="8829075" y="1894947"/>
             <a:ext cx="2339590" cy="369332"/>
           </a:xfrm>
           <a:prstGeom prst="rect">
@@ -3972,6 +4408,90 @@
           </a:p>
         </p:txBody>
       </p:sp>
+      <p:sp>
+        <p:nvSpPr>
+          <p:cNvPr id="2" name="CuadroTexto 11">
+            <a:extLst>
+              <a:ext uri="{FF2B5EF4-FFF2-40B4-BE49-F238E27FC236}">
+                <a16:creationId xmlns:a16="http://schemas.microsoft.com/office/drawing/2014/main" id="{EC3E7538-0FCA-38AE-C757-CBB929519166}"/>
+              </a:ext>
+            </a:extLst>
+          </p:cNvPr>
+          <p:cNvSpPr txBox="1"/>
+          <p:nvPr/>
+        </p:nvSpPr>
+        <p:spPr>
+          <a:xfrm>
+            <a:off x="3968971" y="1889089"/>
+            <a:ext cx="1865979" cy="646331"/>
+          </a:xfrm>
+          <a:prstGeom prst="rect">
+            <a:avLst/>
+          </a:prstGeom>
+          <a:noFill/>
+        </p:spPr>
+        <p:txBody>
+          <a:bodyPr wrap="square" rtlCol="0">
+            <a:spAutoFit/>
+          </a:bodyPr>
+          <a:lstStyle/>
+          <a:p>
+            <a:pPr algn="ctr"/>
+            <a:r>
+              <a:rPr lang="es-ES" dirty="0"/>
+              <a:t>Representantes/Autorizados</a:t>
+            </a:r>
+            <a:endParaRPr lang="es-VE" dirty="0"/>
+          </a:p>
+        </p:txBody>
+      </p:sp>
+      <p:pic>
+        <p:nvPicPr>
+          <p:cNvPr id="1026" name="Picture 2" descr="Adult And Silhouettes Png - Adult And Child Vector Clipart - Full Size ...">
+            <a:extLst>
+              <a:ext uri="{FF2B5EF4-FFF2-40B4-BE49-F238E27FC236}">
+                <a16:creationId xmlns:a16="http://schemas.microsoft.com/office/drawing/2014/main" id="{BCEC35C9-7B38-AC2C-7761-E5C5161B166D}"/>
+              </a:ext>
+            </a:extLst>
+          </p:cNvPr>
+          <p:cNvPicPr>
+            <a:picLocks noChangeAspect="1" noChangeArrowheads="1"/>
+          </p:cNvPicPr>
+          <p:nvPr/>
+        </p:nvPicPr>
+        <p:blipFill>
+          <a:blip r:embed="rId9">
+            <a:extLst>
+              <a:ext uri="{28A0092B-C50C-407E-A947-70E740481C1C}">
+                <a14:useLocalDpi xmlns:a14="http://schemas.microsoft.com/office/drawing/2010/main" val="0"/>
+              </a:ext>
+            </a:extLst>
+          </a:blip>
+          <a:srcRect/>
+          <a:stretch>
+            <a:fillRect/>
+          </a:stretch>
+        </p:blipFill>
+        <p:spPr bwMode="auto">
+          <a:xfrm>
+            <a:off x="3962735" y="2515824"/>
+            <a:ext cx="1570416" cy="2220686"/>
+          </a:xfrm>
+          <a:prstGeom prst="rect">
+            <a:avLst/>
+          </a:prstGeom>
+          <a:noFill/>
+          <a:extLst>
+            <a:ext uri="{909E8E84-426E-40DD-AFC4-6F175D3DCCD1}">
+              <a14:hiddenFill xmlns:a14="http://schemas.microsoft.com/office/drawing/2010/main">
+                <a:solidFill>
+                  <a:srgbClr val="FFFFFF"/>
+                </a:solidFill>
+              </a14:hiddenFill>
+            </a:ext>
+          </a:extLst>
+        </p:spPr>
+      </p:pic>
     </p:spTree>
     <p:extLst>
       <p:ext uri="{BB962C8B-B14F-4D97-AF65-F5344CB8AC3E}">
@@ -3990,13 +4510,7 @@
   <p:cSld>
     <p:spTree>
       <p:nvGrpSpPr>
-        <p:cNvPr id="1" name="">
-          <a:extLst>
-            <a:ext uri="{FF2B5EF4-FFF2-40B4-BE49-F238E27FC236}">
-              <a16:creationId xmlns:a16="http://schemas.microsoft.com/office/drawing/2014/main" id="{0B00AF13-3172-3399-20A2-E0EED561EE7E}"/>
-            </a:ext>
-          </a:extLst>
-        </p:cNvPr>
+        <p:cNvPr id="1" name=""/>
         <p:cNvGrpSpPr/>
         <p:nvPr/>
       </p:nvGrpSpPr>
@@ -4008,12 +4522,67 @@
           <a:chExt cx="0" cy="0"/>
         </a:xfrm>
       </p:grpSpPr>
+      <p:sp>
+        <p:nvSpPr>
+          <p:cNvPr id="4" name="Título 3">
+            <a:extLst>
+              <a:ext uri="{FF2B5EF4-FFF2-40B4-BE49-F238E27FC236}">
+                <a16:creationId xmlns:a16="http://schemas.microsoft.com/office/drawing/2014/main" id="{8ED35843-7B71-116F-5ADC-B26A6264C0E5}"/>
+              </a:ext>
+            </a:extLst>
+          </p:cNvPr>
+          <p:cNvSpPr txBox="1">
+            <a:spLocks/>
+          </p:cNvSpPr>
+          <p:nvPr/>
+        </p:nvSpPr>
+        <p:spPr>
+          <a:xfrm>
+            <a:off x="4462692" y="68313"/>
+            <a:ext cx="9144000" cy="649922"/>
+          </a:xfrm>
+          <a:prstGeom prst="rect">
+            <a:avLst/>
+          </a:prstGeom>
+        </p:spPr>
+        <p:txBody>
+          <a:bodyPr vert="horz" lIns="91440" tIns="45720" rIns="91440" bIns="45720" rtlCol="0" anchor="ctr">
+            <a:spAutoFit/>
+          </a:bodyPr>
+          <a:lstStyle>
+            <a:lvl1pPr algn="l" defTabSz="914400" rtl="0" eaLnBrk="1" latinLnBrk="0" hangingPunct="1">
+              <a:lnSpc>
+                <a:spcPct val="90000"/>
+              </a:lnSpc>
+              <a:spcBef>
+                <a:spcPct val="0"/>
+              </a:spcBef>
+              <a:buNone/>
+              <a:defRPr sz="4400" kern="1200">
+                <a:solidFill>
+                  <a:schemeClr val="tx1"/>
+                </a:solidFill>
+                <a:latin typeface="+mj-lt"/>
+                <a:ea typeface="+mj-ea"/>
+                <a:cs typeface="+mj-cs"/>
+              </a:defRPr>
+            </a:lvl1pPr>
+          </a:lstStyle>
+          <a:p>
+            <a:r>
+              <a:rPr lang="es-ES" sz="4000" b="1" dirty="0"/>
+              <a:t>Estudiantes</a:t>
+            </a:r>
+            <a:endParaRPr lang="es-VE" sz="4000" b="1" dirty="0"/>
+          </a:p>
+        </p:txBody>
+      </p:sp>
       <p:pic>
         <p:nvPicPr>
-          <p:cNvPr id="5" name="Gráfico 4" descr="Birrete con relleno sólido">
-            <a:extLst>
-              <a:ext uri="{FF2B5EF4-FFF2-40B4-BE49-F238E27FC236}">
-                <a16:creationId xmlns:a16="http://schemas.microsoft.com/office/drawing/2014/main" id="{02D93500-A26B-2470-D10E-6E27CF9BD39E}"/>
+          <p:cNvPr id="5" name="Gráfico 2" descr="Lupa con relleno sólido">
+            <a:extLst>
+              <a:ext uri="{FF2B5EF4-FFF2-40B4-BE49-F238E27FC236}">
+                <a16:creationId xmlns:a16="http://schemas.microsoft.com/office/drawing/2014/main" id="{C110DF1D-8C29-164E-DD29-CF5B74D63183}"/>
               </a:ext>
             </a:extLst>
           </p:cNvPr>
@@ -4023,83 +4592,10 @@
           <p:nvPr/>
         </p:nvPicPr>
         <p:blipFill>
-          <a:blip r:embed="rId2">
+          <a:blip r:embed="rId3">
             <a:extLst>
               <a:ext uri="{96DAC541-7B7A-43D3-8B79-37D633B846F1}">
-                <asvg:svgBlip xmlns:asvg="http://schemas.microsoft.com/office/drawing/2016/SVG/main" r:embed="rId3"/>
-              </a:ext>
-            </a:extLst>
-          </a:blip>
-          <a:srcRect t="22063" b="23093"/>
-          <a:stretch>
-            <a:fillRect/>
-          </a:stretch>
-        </p:blipFill>
-        <p:spPr>
-          <a:xfrm>
-            <a:off x="0" y="0"/>
-            <a:ext cx="2339591" cy="1283109"/>
-          </a:xfrm>
-          <a:prstGeom prst="rect">
-            <a:avLst/>
-          </a:prstGeom>
-        </p:spPr>
-      </p:pic>
-      <p:sp>
-        <p:nvSpPr>
-          <p:cNvPr id="4" name="Título 3">
-            <a:extLst>
-              <a:ext uri="{FF2B5EF4-FFF2-40B4-BE49-F238E27FC236}">
-                <a16:creationId xmlns:a16="http://schemas.microsoft.com/office/drawing/2014/main" id="{2A12726C-BCA1-CB6C-74CE-A0A9D245BE64}"/>
-              </a:ext>
-            </a:extLst>
-          </p:cNvPr>
-          <p:cNvSpPr>
-            <a:spLocks noGrp="1"/>
-          </p:cNvSpPr>
-          <p:nvPr>
-            <p:ph type="ctrTitle"/>
-          </p:nvPr>
-        </p:nvSpPr>
-        <p:spPr>
-          <a:xfrm>
-            <a:off x="1524000" y="0"/>
-            <a:ext cx="9144000" cy="649922"/>
-          </a:xfrm>
-        </p:spPr>
-        <p:txBody>
-          <a:bodyPr>
-            <a:spAutoFit/>
-          </a:bodyPr>
-          <a:lstStyle/>
-          <a:p>
-            <a:r>
-              <a:rPr lang="es-ES" sz="4000" b="1" dirty="0"/>
-              <a:t>Estudiantes</a:t>
-            </a:r>
-            <a:endParaRPr lang="es-VE" sz="4000" b="1" dirty="0"/>
-          </a:p>
-        </p:txBody>
-      </p:sp>
-      <p:pic>
-        <p:nvPicPr>
-          <p:cNvPr id="3" name="Gráfico 2" descr="Lupa con relleno sólido">
-            <a:extLst>
-              <a:ext uri="{FF2B5EF4-FFF2-40B4-BE49-F238E27FC236}">
-                <a16:creationId xmlns:a16="http://schemas.microsoft.com/office/drawing/2014/main" id="{CD6110E7-2B7A-5BE9-94AF-0068ADBD7273}"/>
-              </a:ext>
-            </a:extLst>
-          </p:cNvPr>
-          <p:cNvPicPr>
-            <a:picLocks noChangeAspect="1"/>
-          </p:cNvPicPr>
-          <p:nvPr/>
-        </p:nvPicPr>
-        <p:blipFill>
-          <a:blip r:embed="rId4">
-            <a:extLst>
-              <a:ext uri="{96DAC541-7B7A-43D3-8B79-37D633B846F1}">
-                <asvg:svgBlip xmlns:asvg="http://schemas.microsoft.com/office/drawing/2016/SVG/main" r:embed="rId5"/>
+                <asvg:svgBlip xmlns:asvg="http://schemas.microsoft.com/office/drawing/2016/SVG/main" r:embed="rId4"/>
               </a:ext>
             </a:extLst>
           </a:blip>
@@ -4109,94 +4605,72 @@
         </p:blipFill>
         <p:spPr>
           <a:xfrm>
-            <a:off x="1980956" y="2259204"/>
-            <a:ext cx="2339591" cy="2339591"/>
+            <a:off x="351555" y="1283414"/>
+            <a:ext cx="409748" cy="409748"/>
           </a:xfrm>
           <a:prstGeom prst="rect">
             <a:avLst/>
           </a:prstGeom>
         </p:spPr>
       </p:pic>
-      <p:pic>
-        <p:nvPicPr>
-          <p:cNvPr id="8" name="Gráfico 7" descr="Lápiz con relleno sólido">
-            <a:hlinkClick r:id="rId6" action="ppaction://hlinksldjump"/>
-            <a:extLst>
-              <a:ext uri="{FF2B5EF4-FFF2-40B4-BE49-F238E27FC236}">
-                <a16:creationId xmlns:a16="http://schemas.microsoft.com/office/drawing/2014/main" id="{180F2339-3652-E976-AD63-C024909C159C}"/>
-              </a:ext>
-            </a:extLst>
-          </p:cNvPr>
-          <p:cNvPicPr>
-            <a:picLocks noChangeAspect="1"/>
-          </p:cNvPicPr>
+      <p:sp>
+        <p:nvSpPr>
+          <p:cNvPr id="6" name="Rectangle 5">
+            <a:extLst>
+              <a:ext uri="{FF2B5EF4-FFF2-40B4-BE49-F238E27FC236}">
+                <a16:creationId xmlns:a16="http://schemas.microsoft.com/office/drawing/2014/main" id="{D7E74FF5-CDB5-208B-CFAB-59C7CCC6AE13}"/>
+              </a:ext>
+            </a:extLst>
+          </p:cNvPr>
+          <p:cNvSpPr/>
           <p:nvPr/>
-        </p:nvPicPr>
-        <p:blipFill>
-          <a:blip r:embed="rId7">
-            <a:extLst>
-              <a:ext uri="{96DAC541-7B7A-43D3-8B79-37D633B846F1}">
-                <asvg:svgBlip xmlns:asvg="http://schemas.microsoft.com/office/drawing/2016/SVG/main" r:embed="rId8"/>
-              </a:ext>
-            </a:extLst>
-          </a:blip>
-          <a:stretch>
-            <a:fillRect/>
-          </a:stretch>
-        </p:blipFill>
-        <p:spPr>
-          <a:xfrm>
-            <a:off x="7871454" y="2321878"/>
-            <a:ext cx="2339590" cy="2339590"/>
-          </a:xfrm>
-          <a:prstGeom prst="rect">
-            <a:avLst/>
-          </a:prstGeom>
-        </p:spPr>
-      </p:pic>
-      <p:sp>
-        <p:nvSpPr>
-          <p:cNvPr id="14" name="CuadroTexto 13">
-            <a:extLst>
-              <a:ext uri="{FF2B5EF4-FFF2-40B4-BE49-F238E27FC236}">
-                <a16:creationId xmlns:a16="http://schemas.microsoft.com/office/drawing/2014/main" id="{06B073FD-B11B-8DBE-7BFB-D8A98C421F3F}"/>
-              </a:ext>
-            </a:extLst>
-          </p:cNvPr>
-          <p:cNvSpPr txBox="1"/>
-          <p:nvPr/>
-        </p:nvSpPr>
-        <p:spPr>
-          <a:xfrm>
-            <a:off x="1980957" y="2074538"/>
-            <a:ext cx="2339590" cy="369332"/>
+        </p:nvSpPr>
+        <p:spPr>
+          <a:xfrm>
+            <a:off x="820538" y="1292843"/>
+            <a:ext cx="5616319" cy="369332"/>
           </a:xfrm>
           <a:prstGeom prst="rect">
             <a:avLst/>
           </a:prstGeom>
           <a:noFill/>
-        </p:spPr>
-        <p:txBody>
-          <a:bodyPr wrap="square" rtlCol="0">
-            <a:spAutoFit/>
-          </a:bodyPr>
+          <a:ln>
+            <a:solidFill>
+              <a:schemeClr val="tx1"/>
+            </a:solidFill>
+          </a:ln>
+        </p:spPr>
+        <p:style>
+          <a:lnRef idx="2">
+            <a:schemeClr val="accent1">
+              <a:shade val="15000"/>
+            </a:schemeClr>
+          </a:lnRef>
+          <a:fillRef idx="1">
+            <a:schemeClr val="accent1"/>
+          </a:fillRef>
+          <a:effectRef idx="0">
+            <a:schemeClr val="accent1"/>
+          </a:effectRef>
+          <a:fontRef idx="minor">
+            <a:schemeClr val="lt1"/>
+          </a:fontRef>
+        </p:style>
+        <p:txBody>
+          <a:bodyPr rtlCol="0" anchor="ctr"/>
           <a:lstStyle/>
           <a:p>
             <a:pPr algn="ctr"/>
-            <a:r>
-              <a:rPr lang="es-ES" dirty="0"/>
-              <a:t>Búsqueda</a:t>
-            </a:r>
-            <a:endParaRPr lang="es-VE" dirty="0"/>
-          </a:p>
-        </p:txBody>
-      </p:sp>
-      <p:sp>
-        <p:nvSpPr>
-          <p:cNvPr id="15" name="CuadroTexto 14">
-            <a:extLst>
-              <a:ext uri="{FF2B5EF4-FFF2-40B4-BE49-F238E27FC236}">
-                <a16:creationId xmlns:a16="http://schemas.microsoft.com/office/drawing/2014/main" id="{61CFB70F-D2A7-C588-6983-D988EFF066B8}"/>
+            <a:endParaRPr lang="en-US"/>
+          </a:p>
+        </p:txBody>
+      </p:sp>
+      <p:sp>
+        <p:nvSpPr>
+          <p:cNvPr id="7" name="CuadroTexto 13">
+            <a:extLst>
+              <a:ext uri="{FF2B5EF4-FFF2-40B4-BE49-F238E27FC236}">
+                <a16:creationId xmlns:a16="http://schemas.microsoft.com/office/drawing/2014/main" id="{6E242639-9563-BE38-7436-593AFDDA3690}"/>
               </a:ext>
             </a:extLst>
           </p:cNvPr>
@@ -4205,7 +4679,7 @@
         </p:nvSpPr>
         <p:spPr>
           <a:xfrm>
-            <a:off x="7871453" y="2074538"/>
+            <a:off x="351555" y="1333259"/>
             <a:ext cx="2339590" cy="369332"/>
           </a:xfrm>
           <a:prstGeom prst="rect">
@@ -4222,7 +4696,7 @@
             <a:pPr algn="ctr"/>
             <a:r>
               <a:rPr lang="es-ES" dirty="0"/>
-              <a:t>Inscripción</a:t>
+              <a:t>Búsqueda</a:t>
             </a:r>
             <a:endParaRPr lang="es-VE" dirty="0"/>
           </a:p>
@@ -4230,11 +4704,10 @@
       </p:sp>
       <p:sp>
         <p:nvSpPr>
-          <p:cNvPr id="16" name="Rectángulo: esquinas redondeadas 15">
-            <a:hlinkClick r:id="rId9" action="ppaction://hlinksldjump"/>
-            <a:extLst>
-              <a:ext uri="{FF2B5EF4-FFF2-40B4-BE49-F238E27FC236}">
-                <a16:creationId xmlns:a16="http://schemas.microsoft.com/office/drawing/2014/main" id="{55320127-8AE8-5916-1FCC-871B8615B4AB}"/>
+          <p:cNvPr id="8" name="Rectángulo 8">
+            <a:extLst>
+              <a:ext uri="{FF2B5EF4-FFF2-40B4-BE49-F238E27FC236}">
+                <a16:creationId xmlns:a16="http://schemas.microsoft.com/office/drawing/2014/main" id="{311018B1-EC6B-BDA2-B7AC-2AB4BD21E5B4}"/>
               </a:ext>
             </a:extLst>
           </p:cNvPr>
@@ -4243,10 +4716,155 @@
         </p:nvSpPr>
         <p:spPr>
           <a:xfrm>
-            <a:off x="1980956" y="4598795"/>
-            <a:ext cx="2339591" cy="636882"/>
-          </a:xfrm>
-          <a:prstGeom prst="roundRect">
+            <a:off x="461238" y="1941441"/>
+            <a:ext cx="11269523" cy="4397531"/>
+          </a:xfrm>
+          <a:prstGeom prst="rect">
+            <a:avLst/>
+          </a:prstGeom>
+        </p:spPr>
+        <p:style>
+          <a:lnRef idx="2">
+            <a:schemeClr val="dk1"/>
+          </a:lnRef>
+          <a:fillRef idx="1">
+            <a:schemeClr val="lt1"/>
+          </a:fillRef>
+          <a:effectRef idx="0">
+            <a:schemeClr val="dk1"/>
+          </a:effectRef>
+          <a:fontRef idx="minor">
+            <a:schemeClr val="dk1"/>
+          </a:fontRef>
+        </p:style>
+        <p:txBody>
+          <a:bodyPr rtlCol="0" anchor="ctr"/>
+          <a:lstStyle/>
+          <a:p>
+            <a:pPr algn="ctr"/>
+            <a:endParaRPr lang="es-VE" dirty="0"/>
+          </a:p>
+        </p:txBody>
+      </p:sp>
+      <p:grpSp>
+        <p:nvGrpSpPr>
+          <p:cNvPr id="9" name="Grupo 4">
+            <a:extLst>
+              <a:ext uri="{FF2B5EF4-FFF2-40B4-BE49-F238E27FC236}">
+                <a16:creationId xmlns:a16="http://schemas.microsoft.com/office/drawing/2014/main" id="{89180801-7260-E39D-1E34-D5AFACD3399B}"/>
+              </a:ext>
+            </a:extLst>
+          </p:cNvPr>
+          <p:cNvGrpSpPr/>
+          <p:nvPr/>
+        </p:nvGrpSpPr>
+        <p:grpSpPr>
+          <a:xfrm>
+            <a:off x="480399" y="1941441"/>
+            <a:ext cx="1617910" cy="1559606"/>
+            <a:chOff x="862780" y="190737"/>
+            <a:chExt cx="1637071" cy="1578077"/>
+          </a:xfrm>
+        </p:grpSpPr>
+        <p:sp>
+          <p:nvSpPr>
+            <p:cNvPr id="10" name="Rectángulo 5">
+              <a:extLst>
+                <a:ext uri="{FF2B5EF4-FFF2-40B4-BE49-F238E27FC236}">
+                  <a16:creationId xmlns:a16="http://schemas.microsoft.com/office/drawing/2014/main" id="{CF57DEF9-CC8A-682C-9C0E-4F223A0A6EB3}"/>
+                </a:ext>
+              </a:extLst>
+            </p:cNvPr>
+            <p:cNvSpPr/>
+            <p:nvPr/>
+          </p:nvSpPr>
+          <p:spPr>
+            <a:xfrm>
+              <a:off x="862780" y="190737"/>
+              <a:ext cx="1637071" cy="1578077"/>
+            </a:xfrm>
+            <a:prstGeom prst="rect">
+              <a:avLst/>
+            </a:prstGeom>
+          </p:spPr>
+          <p:style>
+            <a:lnRef idx="2">
+              <a:schemeClr val="dk1"/>
+            </a:lnRef>
+            <a:fillRef idx="1">
+              <a:schemeClr val="lt1"/>
+            </a:fillRef>
+            <a:effectRef idx="0">
+              <a:schemeClr val="dk1"/>
+            </a:effectRef>
+            <a:fontRef idx="minor">
+              <a:schemeClr val="dk1"/>
+            </a:fontRef>
+          </p:style>
+          <p:txBody>
+            <a:bodyPr rtlCol="0" anchor="ctr"/>
+            <a:lstStyle/>
+            <a:p>
+              <a:pPr algn="ctr"/>
+              <a:endParaRPr lang="es-VE"/>
+            </a:p>
+          </p:txBody>
+        </p:sp>
+        <p:pic>
+          <p:nvPicPr>
+            <p:cNvPr id="11" name="Gráfico 6" descr="Contorno de cara riendo con relleno sólido">
+              <a:extLst>
+                <a:ext uri="{FF2B5EF4-FFF2-40B4-BE49-F238E27FC236}">
+                  <a16:creationId xmlns:a16="http://schemas.microsoft.com/office/drawing/2014/main" id="{4578A14D-D25C-297B-3744-6DEAF73980EC}"/>
+                </a:ext>
+              </a:extLst>
+            </p:cNvPr>
+            <p:cNvPicPr>
+              <a:picLocks noChangeAspect="1"/>
+            </p:cNvPicPr>
+            <p:nvPr/>
+          </p:nvPicPr>
+          <p:blipFill>
+            <a:blip r:embed="rId5">
+              <a:extLst>
+                <a:ext uri="{96DAC541-7B7A-43D3-8B79-37D633B846F1}">
+                  <asvg:svgBlip xmlns:asvg="http://schemas.microsoft.com/office/drawing/2016/SVG/main" r:embed="rId6"/>
+                </a:ext>
+              </a:extLst>
+            </a:blip>
+            <a:stretch>
+              <a:fillRect/>
+            </a:stretch>
+          </p:blipFill>
+          <p:spPr>
+            <a:xfrm>
+              <a:off x="1224115" y="522575"/>
+              <a:ext cx="914400" cy="914400"/>
+            </a:xfrm>
+            <a:prstGeom prst="rect">
+              <a:avLst/>
+            </a:prstGeom>
+          </p:spPr>
+        </p:pic>
+      </p:grpSp>
+      <p:sp>
+        <p:nvSpPr>
+          <p:cNvPr id="12" name="Rectángulo 9">
+            <a:extLst>
+              <a:ext uri="{FF2B5EF4-FFF2-40B4-BE49-F238E27FC236}">
+                <a16:creationId xmlns:a16="http://schemas.microsoft.com/office/drawing/2014/main" id="{8387780E-FFC4-8D76-8F4D-B7857A570258}"/>
+              </a:ext>
+            </a:extLst>
+          </p:cNvPr>
+          <p:cNvSpPr/>
+          <p:nvPr/>
+        </p:nvSpPr>
+        <p:spPr>
+          <a:xfrm>
+            <a:off x="2098308" y="1956300"/>
+            <a:ext cx="5844223" cy="1559607"/>
+          </a:xfrm>
+          <a:prstGeom prst="rect">
             <a:avLst/>
           </a:prstGeom>
         </p:spPr>
@@ -4271,19 +4889,119 @@
             <a:pPr algn="ctr"/>
             <a:r>
               <a:rPr lang="es-ES" dirty="0"/>
-              <a:t>Estudiante</a:t>
+              <a:t>DATOS</a:t>
             </a:r>
             <a:endParaRPr lang="es-VE" dirty="0"/>
           </a:p>
         </p:txBody>
       </p:sp>
-      <p:sp>
-        <p:nvSpPr>
-          <p:cNvPr id="17" name="Rectángulo: esquinas redondeadas 16">
-            <a:hlinkClick r:id="rId10" action="ppaction://hlinksldjump"/>
-            <a:extLst>
-              <a:ext uri="{FF2B5EF4-FFF2-40B4-BE49-F238E27FC236}">
-                <a16:creationId xmlns:a16="http://schemas.microsoft.com/office/drawing/2014/main" id="{3F2C384F-CE40-13BC-1DF7-2C2AC38ABAFE}"/>
+      <p:grpSp>
+        <p:nvGrpSpPr>
+          <p:cNvPr id="13" name="Grupo 10">
+            <a:extLst>
+              <a:ext uri="{FF2B5EF4-FFF2-40B4-BE49-F238E27FC236}">
+                <a16:creationId xmlns:a16="http://schemas.microsoft.com/office/drawing/2014/main" id="{8AEB81B6-E92F-3DE2-3403-77F0769BB89C}"/>
+              </a:ext>
+            </a:extLst>
+          </p:cNvPr>
+          <p:cNvGrpSpPr/>
+          <p:nvPr/>
+        </p:nvGrpSpPr>
+        <p:grpSpPr>
+          <a:xfrm>
+            <a:off x="458628" y="3475368"/>
+            <a:ext cx="1639681" cy="1425805"/>
+            <a:chOff x="862780" y="190737"/>
+            <a:chExt cx="1637071" cy="1578077"/>
+          </a:xfrm>
+        </p:grpSpPr>
+        <p:sp>
+          <p:nvSpPr>
+            <p:cNvPr id="14" name="Rectángulo 11">
+              <a:extLst>
+                <a:ext uri="{FF2B5EF4-FFF2-40B4-BE49-F238E27FC236}">
+                  <a16:creationId xmlns:a16="http://schemas.microsoft.com/office/drawing/2014/main" id="{366274C7-6429-228C-9BD4-15656E220C34}"/>
+                </a:ext>
+              </a:extLst>
+            </p:cNvPr>
+            <p:cNvSpPr/>
+            <p:nvPr/>
+          </p:nvSpPr>
+          <p:spPr>
+            <a:xfrm>
+              <a:off x="862780" y="190737"/>
+              <a:ext cx="1637071" cy="1578077"/>
+            </a:xfrm>
+            <a:prstGeom prst="rect">
+              <a:avLst/>
+            </a:prstGeom>
+          </p:spPr>
+          <p:style>
+            <a:lnRef idx="2">
+              <a:schemeClr val="dk1"/>
+            </a:lnRef>
+            <a:fillRef idx="1">
+              <a:schemeClr val="lt1"/>
+            </a:fillRef>
+            <a:effectRef idx="0">
+              <a:schemeClr val="dk1"/>
+            </a:effectRef>
+            <a:fontRef idx="minor">
+              <a:schemeClr val="dk1"/>
+            </a:fontRef>
+          </p:style>
+          <p:txBody>
+            <a:bodyPr rtlCol="0" anchor="ctr"/>
+            <a:lstStyle/>
+            <a:p>
+              <a:pPr algn="ctr"/>
+              <a:endParaRPr lang="es-VE"/>
+            </a:p>
+          </p:txBody>
+        </p:sp>
+        <p:pic>
+          <p:nvPicPr>
+            <p:cNvPr id="15" name="Gráfico 13" descr="Contorno de cara riendo con relleno sólido">
+              <a:extLst>
+                <a:ext uri="{FF2B5EF4-FFF2-40B4-BE49-F238E27FC236}">
+                  <a16:creationId xmlns:a16="http://schemas.microsoft.com/office/drawing/2014/main" id="{5D1A8AE0-CEA7-33AB-563A-EDA073B1F33D}"/>
+                </a:ext>
+              </a:extLst>
+            </p:cNvPr>
+            <p:cNvPicPr>
+              <a:picLocks noChangeAspect="1"/>
+            </p:cNvPicPr>
+            <p:nvPr/>
+          </p:nvPicPr>
+          <p:blipFill>
+            <a:blip r:embed="rId5">
+              <a:extLst>
+                <a:ext uri="{96DAC541-7B7A-43D3-8B79-37D633B846F1}">
+                  <asvg:svgBlip xmlns:asvg="http://schemas.microsoft.com/office/drawing/2016/SVG/main" r:embed="rId6"/>
+                </a:ext>
+              </a:extLst>
+            </a:blip>
+            <a:stretch>
+              <a:fillRect/>
+            </a:stretch>
+          </p:blipFill>
+          <p:spPr>
+            <a:xfrm>
+              <a:off x="1224115" y="522575"/>
+              <a:ext cx="914400" cy="914400"/>
+            </a:xfrm>
+            <a:prstGeom prst="rect">
+              <a:avLst/>
+            </a:prstGeom>
+          </p:spPr>
+        </p:pic>
+      </p:grpSp>
+      <p:sp>
+        <p:nvSpPr>
+          <p:cNvPr id="16" name="Rectángulo 15">
+            <a:extLst>
+              <a:ext uri="{FF2B5EF4-FFF2-40B4-BE49-F238E27FC236}">
+                <a16:creationId xmlns:a16="http://schemas.microsoft.com/office/drawing/2014/main" id="{3A7BE2F3-876E-7973-1DE7-47D3B291E2DC}"/>
               </a:ext>
             </a:extLst>
           </p:cNvPr>
@@ -4292,10 +5010,10 @@
         </p:nvSpPr>
         <p:spPr>
           <a:xfrm>
-            <a:off x="1980955" y="5324167"/>
-            <a:ext cx="2339591" cy="636882"/>
-          </a:xfrm>
-          <a:prstGeom prst="roundRect">
+            <a:off x="2098310" y="3475367"/>
+            <a:ext cx="5844223" cy="1507134"/>
+          </a:xfrm>
+          <a:prstGeom prst="rect">
             <a:avLst/>
           </a:prstGeom>
         </p:spPr>
@@ -4320,7 +5038,686 @@
             <a:pPr algn="ctr"/>
             <a:r>
               <a:rPr lang="es-ES" dirty="0"/>
-              <a:t>Representante</a:t>
+              <a:t>DATOS</a:t>
+            </a:r>
+            <a:endParaRPr lang="es-VE" dirty="0"/>
+          </a:p>
+        </p:txBody>
+      </p:sp>
+      <p:grpSp>
+        <p:nvGrpSpPr>
+          <p:cNvPr id="17" name="Grupo 16">
+            <a:extLst>
+              <a:ext uri="{FF2B5EF4-FFF2-40B4-BE49-F238E27FC236}">
+                <a16:creationId xmlns:a16="http://schemas.microsoft.com/office/drawing/2014/main" id="{D1E5BEEF-896F-C8CD-8ADB-9D1B39CD56D1}"/>
+              </a:ext>
+            </a:extLst>
+          </p:cNvPr>
+          <p:cNvGrpSpPr/>
+          <p:nvPr/>
+        </p:nvGrpSpPr>
+        <p:grpSpPr>
+          <a:xfrm>
+            <a:off x="458629" y="4913167"/>
+            <a:ext cx="1639681" cy="1425805"/>
+            <a:chOff x="862780" y="190737"/>
+            <a:chExt cx="1637071" cy="1578077"/>
+          </a:xfrm>
+        </p:grpSpPr>
+        <p:sp>
+          <p:nvSpPr>
+            <p:cNvPr id="18" name="Rectángulo 19">
+              <a:extLst>
+                <a:ext uri="{FF2B5EF4-FFF2-40B4-BE49-F238E27FC236}">
+                  <a16:creationId xmlns:a16="http://schemas.microsoft.com/office/drawing/2014/main" id="{50BB673A-E8B5-3C0C-867B-21A65659C9C6}"/>
+                </a:ext>
+              </a:extLst>
+            </p:cNvPr>
+            <p:cNvSpPr/>
+            <p:nvPr/>
+          </p:nvSpPr>
+          <p:spPr>
+            <a:xfrm>
+              <a:off x="862780" y="190737"/>
+              <a:ext cx="1637071" cy="1578077"/>
+            </a:xfrm>
+            <a:prstGeom prst="rect">
+              <a:avLst/>
+            </a:prstGeom>
+          </p:spPr>
+          <p:style>
+            <a:lnRef idx="2">
+              <a:schemeClr val="dk1"/>
+            </a:lnRef>
+            <a:fillRef idx="1">
+              <a:schemeClr val="lt1"/>
+            </a:fillRef>
+            <a:effectRef idx="0">
+              <a:schemeClr val="dk1"/>
+            </a:effectRef>
+            <a:fontRef idx="minor">
+              <a:schemeClr val="dk1"/>
+            </a:fontRef>
+          </p:style>
+          <p:txBody>
+            <a:bodyPr rtlCol="0" anchor="ctr"/>
+            <a:lstStyle/>
+            <a:p>
+              <a:pPr algn="ctr"/>
+              <a:endParaRPr lang="es-VE"/>
+            </a:p>
+          </p:txBody>
+        </p:sp>
+        <p:pic>
+          <p:nvPicPr>
+            <p:cNvPr id="19" name="Gráfico 20" descr="Contorno de cara riendo con relleno sólido">
+              <a:extLst>
+                <a:ext uri="{FF2B5EF4-FFF2-40B4-BE49-F238E27FC236}">
+                  <a16:creationId xmlns:a16="http://schemas.microsoft.com/office/drawing/2014/main" id="{83A8C720-8B8D-527B-A010-7B218F473837}"/>
+                </a:ext>
+              </a:extLst>
+            </p:cNvPr>
+            <p:cNvPicPr>
+              <a:picLocks noChangeAspect="1"/>
+            </p:cNvPicPr>
+            <p:nvPr/>
+          </p:nvPicPr>
+          <p:blipFill>
+            <a:blip r:embed="rId5">
+              <a:extLst>
+                <a:ext uri="{96DAC541-7B7A-43D3-8B79-37D633B846F1}">
+                  <asvg:svgBlip xmlns:asvg="http://schemas.microsoft.com/office/drawing/2016/SVG/main" r:embed="rId6"/>
+                </a:ext>
+              </a:extLst>
+            </a:blip>
+            <a:stretch>
+              <a:fillRect/>
+            </a:stretch>
+          </p:blipFill>
+          <p:spPr>
+            <a:xfrm>
+              <a:off x="1224115" y="522575"/>
+              <a:ext cx="914400" cy="914400"/>
+            </a:xfrm>
+            <a:prstGeom prst="rect">
+              <a:avLst/>
+            </a:prstGeom>
+          </p:spPr>
+        </p:pic>
+      </p:grpSp>
+      <p:sp>
+        <p:nvSpPr>
+          <p:cNvPr id="20" name="Rectángulo 21">
+            <a:extLst>
+              <a:ext uri="{FF2B5EF4-FFF2-40B4-BE49-F238E27FC236}">
+                <a16:creationId xmlns:a16="http://schemas.microsoft.com/office/drawing/2014/main" id="{E3AAC181-BDA6-322B-DFBC-3D507B8D7F9A}"/>
+              </a:ext>
+            </a:extLst>
+          </p:cNvPr>
+          <p:cNvSpPr/>
+          <p:nvPr/>
+        </p:nvSpPr>
+        <p:spPr>
+          <a:xfrm>
+            <a:off x="2098310" y="4913168"/>
+            <a:ext cx="5844223" cy="1425804"/>
+          </a:xfrm>
+          <a:prstGeom prst="rect">
+            <a:avLst/>
+          </a:prstGeom>
+        </p:spPr>
+        <p:style>
+          <a:lnRef idx="2">
+            <a:schemeClr val="accent1"/>
+          </a:lnRef>
+          <a:fillRef idx="1">
+            <a:schemeClr val="lt1"/>
+          </a:fillRef>
+          <a:effectRef idx="0">
+            <a:schemeClr val="accent1"/>
+          </a:effectRef>
+          <a:fontRef idx="minor">
+            <a:schemeClr val="dk1"/>
+          </a:fontRef>
+        </p:style>
+        <p:txBody>
+          <a:bodyPr rtlCol="0" anchor="ctr"/>
+          <a:lstStyle/>
+          <a:p>
+            <a:pPr algn="ctr"/>
+            <a:r>
+              <a:rPr lang="es-ES" dirty="0"/>
+              <a:t>DATOS</a:t>
+            </a:r>
+            <a:endParaRPr lang="es-VE" dirty="0"/>
+          </a:p>
+        </p:txBody>
+      </p:sp>
+      <p:sp>
+        <p:nvSpPr>
+          <p:cNvPr id="22" name="Rectángulo: esquinas redondeadas 31">
+            <a:hlinkClick r:id="rId7" action="ppaction://hlinksldjump"/>
+            <a:extLst>
+              <a:ext uri="{FF2B5EF4-FFF2-40B4-BE49-F238E27FC236}">
+                <a16:creationId xmlns:a16="http://schemas.microsoft.com/office/drawing/2014/main" id="{149D11AA-4100-E818-FCEF-8F4DC653B0E2}"/>
+              </a:ext>
+            </a:extLst>
+          </p:cNvPr>
+          <p:cNvSpPr/>
+          <p:nvPr/>
+        </p:nvSpPr>
+        <p:spPr>
+          <a:xfrm>
+            <a:off x="8593918" y="5297043"/>
+            <a:ext cx="1061885" cy="383458"/>
+          </a:xfrm>
+          <a:prstGeom prst="roundRect">
+            <a:avLst/>
+          </a:prstGeom>
+        </p:spPr>
+        <p:style>
+          <a:lnRef idx="2">
+            <a:schemeClr val="dk1"/>
+          </a:lnRef>
+          <a:fillRef idx="1">
+            <a:schemeClr val="lt1"/>
+          </a:fillRef>
+          <a:effectRef idx="0">
+            <a:schemeClr val="dk1"/>
+          </a:effectRef>
+          <a:fontRef idx="minor">
+            <a:schemeClr val="dk1"/>
+          </a:fontRef>
+        </p:style>
+        <p:txBody>
+          <a:bodyPr rtlCol="0" anchor="ctr"/>
+          <a:lstStyle/>
+          <a:p>
+            <a:pPr algn="ctr"/>
+            <a:r>
+              <a:rPr lang="es-ES" dirty="0"/>
+              <a:t>Ver</a:t>
+            </a:r>
+            <a:endParaRPr lang="es-VE" dirty="0"/>
+          </a:p>
+        </p:txBody>
+      </p:sp>
+      <p:sp>
+        <p:nvSpPr>
+          <p:cNvPr id="23" name="Rectángulo: esquinas redondeadas 32">
+            <a:hlinkClick r:id="rId7" action="ppaction://hlinksldjump"/>
+            <a:extLst>
+              <a:ext uri="{FF2B5EF4-FFF2-40B4-BE49-F238E27FC236}">
+                <a16:creationId xmlns:a16="http://schemas.microsoft.com/office/drawing/2014/main" id="{216275AF-5962-6EF4-6F76-4C79B3FAC982}"/>
+              </a:ext>
+            </a:extLst>
+          </p:cNvPr>
+          <p:cNvSpPr/>
+          <p:nvPr/>
+        </p:nvSpPr>
+        <p:spPr>
+          <a:xfrm>
+            <a:off x="10307188" y="5779202"/>
+            <a:ext cx="1061885" cy="383458"/>
+          </a:xfrm>
+          <a:prstGeom prst="roundRect">
+            <a:avLst/>
+          </a:prstGeom>
+        </p:spPr>
+        <p:style>
+          <a:lnRef idx="2">
+            <a:schemeClr val="dk1"/>
+          </a:lnRef>
+          <a:fillRef idx="1">
+            <a:schemeClr val="lt1"/>
+          </a:fillRef>
+          <a:effectRef idx="0">
+            <a:schemeClr val="dk1"/>
+          </a:effectRef>
+          <a:fontRef idx="minor">
+            <a:schemeClr val="dk1"/>
+          </a:fontRef>
+        </p:style>
+        <p:txBody>
+          <a:bodyPr rtlCol="0" anchor="ctr"/>
+          <a:lstStyle/>
+          <a:p>
+            <a:pPr algn="ctr"/>
+            <a:r>
+              <a:rPr lang="es-ES" dirty="0"/>
+              <a:t>Editar</a:t>
+            </a:r>
+            <a:endParaRPr lang="es-VE" dirty="0"/>
+          </a:p>
+        </p:txBody>
+      </p:sp>
+      <p:sp>
+        <p:nvSpPr>
+          <p:cNvPr id="24" name="Rectángulo: esquinas redondeadas 31">
+            <a:hlinkClick r:id="rId7" action="ppaction://hlinksldjump"/>
+            <a:extLst>
+              <a:ext uri="{FF2B5EF4-FFF2-40B4-BE49-F238E27FC236}">
+                <a16:creationId xmlns:a16="http://schemas.microsoft.com/office/drawing/2014/main" id="{1559F2EC-CD34-CBFE-EF84-EE87B4CAFD35}"/>
+              </a:ext>
+            </a:extLst>
+          </p:cNvPr>
+          <p:cNvSpPr/>
+          <p:nvPr/>
+        </p:nvSpPr>
+        <p:spPr>
+          <a:xfrm>
+            <a:off x="8593919" y="5764860"/>
+            <a:ext cx="1061885" cy="383458"/>
+          </a:xfrm>
+          <a:prstGeom prst="roundRect">
+            <a:avLst/>
+          </a:prstGeom>
+        </p:spPr>
+        <p:style>
+          <a:lnRef idx="2">
+            <a:schemeClr val="dk1"/>
+          </a:lnRef>
+          <a:fillRef idx="1">
+            <a:schemeClr val="lt1"/>
+          </a:fillRef>
+          <a:effectRef idx="0">
+            <a:schemeClr val="dk1"/>
+          </a:effectRef>
+          <a:fontRef idx="minor">
+            <a:schemeClr val="dk1"/>
+          </a:fontRef>
+        </p:style>
+        <p:txBody>
+          <a:bodyPr rtlCol="0" anchor="ctr"/>
+          <a:lstStyle/>
+          <a:p>
+            <a:pPr algn="ctr"/>
+            <a:r>
+              <a:rPr lang="es-ES" dirty="0"/>
+              <a:t>Eliminar</a:t>
+            </a:r>
+            <a:endParaRPr lang="es-VE" dirty="0"/>
+          </a:p>
+        </p:txBody>
+      </p:sp>
+      <p:grpSp>
+        <p:nvGrpSpPr>
+          <p:cNvPr id="25" name="Grupo 10">
+            <a:extLst>
+              <a:ext uri="{FF2B5EF4-FFF2-40B4-BE49-F238E27FC236}">
+                <a16:creationId xmlns:a16="http://schemas.microsoft.com/office/drawing/2014/main" id="{7644BFD7-1B0B-44C0-1564-F4C764D5347B}"/>
+              </a:ext>
+            </a:extLst>
+          </p:cNvPr>
+          <p:cNvGrpSpPr/>
+          <p:nvPr/>
+        </p:nvGrpSpPr>
+        <p:grpSpPr>
+          <a:xfrm>
+            <a:off x="8933833" y="2469975"/>
+            <a:ext cx="1805623" cy="1670231"/>
+            <a:chOff x="862780" y="190737"/>
+            <a:chExt cx="1637071" cy="1578077"/>
+          </a:xfrm>
+        </p:grpSpPr>
+        <p:sp>
+          <p:nvSpPr>
+            <p:cNvPr id="26" name="Rectángulo 11">
+              <a:extLst>
+                <a:ext uri="{FF2B5EF4-FFF2-40B4-BE49-F238E27FC236}">
+                  <a16:creationId xmlns:a16="http://schemas.microsoft.com/office/drawing/2014/main" id="{CD4555B9-52EA-6FE0-96BE-764C8A3E39A4}"/>
+                </a:ext>
+              </a:extLst>
+            </p:cNvPr>
+            <p:cNvSpPr/>
+            <p:nvPr/>
+          </p:nvSpPr>
+          <p:spPr>
+            <a:xfrm>
+              <a:off x="862780" y="190737"/>
+              <a:ext cx="1637071" cy="1578077"/>
+            </a:xfrm>
+            <a:prstGeom prst="rect">
+              <a:avLst/>
+            </a:prstGeom>
+          </p:spPr>
+          <p:style>
+            <a:lnRef idx="2">
+              <a:schemeClr val="dk1"/>
+            </a:lnRef>
+            <a:fillRef idx="1">
+              <a:schemeClr val="lt1"/>
+            </a:fillRef>
+            <a:effectRef idx="0">
+              <a:schemeClr val="dk1"/>
+            </a:effectRef>
+            <a:fontRef idx="minor">
+              <a:schemeClr val="dk1"/>
+            </a:fontRef>
+          </p:style>
+          <p:txBody>
+            <a:bodyPr rtlCol="0" anchor="ctr"/>
+            <a:lstStyle/>
+            <a:p>
+              <a:pPr algn="ctr"/>
+              <a:endParaRPr lang="es-VE"/>
+            </a:p>
+          </p:txBody>
+        </p:sp>
+        <p:pic>
+          <p:nvPicPr>
+            <p:cNvPr id="27" name="Gráfico 13" descr="Contorno de cara riendo con relleno sólido">
+              <a:extLst>
+                <a:ext uri="{FF2B5EF4-FFF2-40B4-BE49-F238E27FC236}">
+                  <a16:creationId xmlns:a16="http://schemas.microsoft.com/office/drawing/2014/main" id="{BAD8E174-9F71-EE90-6E7F-9DF48B980031}"/>
+                </a:ext>
+              </a:extLst>
+            </p:cNvPr>
+            <p:cNvPicPr>
+              <a:picLocks noChangeAspect="1"/>
+            </p:cNvPicPr>
+            <p:nvPr/>
+          </p:nvPicPr>
+          <p:blipFill>
+            <a:blip r:embed="rId5">
+              <a:extLst>
+                <a:ext uri="{96DAC541-7B7A-43D3-8B79-37D633B846F1}">
+                  <asvg:svgBlip xmlns:asvg="http://schemas.microsoft.com/office/drawing/2016/SVG/main" r:embed="rId6"/>
+                </a:ext>
+              </a:extLst>
+            </a:blip>
+            <a:stretch>
+              <a:fillRect/>
+            </a:stretch>
+          </p:blipFill>
+          <p:spPr>
+            <a:xfrm>
+              <a:off x="1224115" y="522575"/>
+              <a:ext cx="914400" cy="914400"/>
+            </a:xfrm>
+            <a:prstGeom prst="rect">
+              <a:avLst/>
+            </a:prstGeom>
+          </p:spPr>
+        </p:pic>
+      </p:grpSp>
+      <p:sp>
+        <p:nvSpPr>
+          <p:cNvPr id="29" name="CuadroTexto 13">
+            <a:extLst>
+              <a:ext uri="{FF2B5EF4-FFF2-40B4-BE49-F238E27FC236}">
+                <a16:creationId xmlns:a16="http://schemas.microsoft.com/office/drawing/2014/main" id="{719659D0-D63E-AA8E-794F-2844F1D85951}"/>
+              </a:ext>
+            </a:extLst>
+          </p:cNvPr>
+          <p:cNvSpPr txBox="1"/>
+          <p:nvPr/>
+        </p:nvSpPr>
+        <p:spPr>
+          <a:xfrm>
+            <a:off x="8650977" y="2022575"/>
+            <a:ext cx="2339590" cy="369332"/>
+          </a:xfrm>
+          <a:prstGeom prst="rect">
+            <a:avLst/>
+          </a:prstGeom>
+          <a:noFill/>
+        </p:spPr>
+        <p:txBody>
+          <a:bodyPr wrap="square" rtlCol="0">
+            <a:spAutoFit/>
+          </a:bodyPr>
+          <a:lstStyle/>
+          <a:p>
+            <a:pPr algn="ctr"/>
+            <a:r>
+              <a:rPr lang="es-ES" b="1" dirty="0"/>
+              <a:t>Selección</a:t>
+            </a:r>
+            <a:endParaRPr lang="es-VE" b="1" dirty="0"/>
+          </a:p>
+        </p:txBody>
+      </p:sp>
+      <p:sp>
+        <p:nvSpPr>
+          <p:cNvPr id="30" name="Rectángulo: esquinas redondeadas 31">
+            <a:hlinkClick r:id="rId7" action="ppaction://hlinksldjump"/>
+            <a:extLst>
+              <a:ext uri="{FF2B5EF4-FFF2-40B4-BE49-F238E27FC236}">
+                <a16:creationId xmlns:a16="http://schemas.microsoft.com/office/drawing/2014/main" id="{EB5A203F-3DBC-8879-3443-D15D0D93D773}"/>
+              </a:ext>
+            </a:extLst>
+          </p:cNvPr>
+          <p:cNvSpPr/>
+          <p:nvPr/>
+        </p:nvSpPr>
+        <p:spPr>
+          <a:xfrm>
+            <a:off x="8371045" y="4267855"/>
+            <a:ext cx="2998028" cy="897983"/>
+          </a:xfrm>
+          <a:prstGeom prst="roundRect">
+            <a:avLst/>
+          </a:prstGeom>
+        </p:spPr>
+        <p:style>
+          <a:lnRef idx="2">
+            <a:schemeClr val="dk1"/>
+          </a:lnRef>
+          <a:fillRef idx="1">
+            <a:schemeClr val="lt1"/>
+          </a:fillRef>
+          <a:effectRef idx="0">
+            <a:schemeClr val="dk1"/>
+          </a:effectRef>
+          <a:fontRef idx="minor">
+            <a:schemeClr val="dk1"/>
+          </a:fontRef>
+        </p:style>
+        <p:txBody>
+          <a:bodyPr rtlCol="0" anchor="ctr"/>
+          <a:lstStyle/>
+          <a:p>
+            <a:pPr algn="ctr"/>
+            <a:r>
+              <a:rPr lang="es-ES" dirty="0"/>
+              <a:t>Datos</a:t>
+            </a:r>
+            <a:endParaRPr lang="es-VE" dirty="0"/>
+          </a:p>
+        </p:txBody>
+      </p:sp>
+      <p:sp>
+        <p:nvSpPr>
+          <p:cNvPr id="31" name="Rectángulo: esquinas redondeadas 31">
+            <a:hlinkClick r:id="rId7" action="ppaction://hlinksldjump"/>
+            <a:extLst>
+              <a:ext uri="{FF2B5EF4-FFF2-40B4-BE49-F238E27FC236}">
+                <a16:creationId xmlns:a16="http://schemas.microsoft.com/office/drawing/2014/main" id="{68AEE113-FEB8-C260-C918-244EA06C21D8}"/>
+              </a:ext>
+            </a:extLst>
+          </p:cNvPr>
+          <p:cNvSpPr/>
+          <p:nvPr/>
+        </p:nvSpPr>
+        <p:spPr>
+          <a:xfrm>
+            <a:off x="7942531" y="1304130"/>
+            <a:ext cx="2172055" cy="387174"/>
+          </a:xfrm>
+          <a:prstGeom prst="roundRect">
+            <a:avLst/>
+          </a:prstGeom>
+        </p:spPr>
+        <p:style>
+          <a:lnRef idx="2">
+            <a:schemeClr val="dk1"/>
+          </a:lnRef>
+          <a:fillRef idx="1">
+            <a:schemeClr val="lt1"/>
+          </a:fillRef>
+          <a:effectRef idx="0">
+            <a:schemeClr val="dk1"/>
+          </a:effectRef>
+          <a:fontRef idx="minor">
+            <a:schemeClr val="dk1"/>
+          </a:fontRef>
+        </p:style>
+        <p:txBody>
+          <a:bodyPr rtlCol="0" anchor="ctr"/>
+          <a:lstStyle/>
+          <a:p>
+            <a:pPr algn="ctr"/>
+            <a:r>
+              <a:rPr lang="es-ES" dirty="0"/>
+              <a:t>Añadir estudiante</a:t>
+            </a:r>
+            <a:endParaRPr lang="es-VE" dirty="0"/>
+          </a:p>
+        </p:txBody>
+      </p:sp>
+      <p:sp>
+        <p:nvSpPr>
+          <p:cNvPr id="32" name="Rectángulo: esquinas redondeadas 31">
+            <a:hlinkClick r:id="rId7" action="ppaction://hlinksldjump"/>
+            <a:extLst>
+              <a:ext uri="{FF2B5EF4-FFF2-40B4-BE49-F238E27FC236}">
+                <a16:creationId xmlns:a16="http://schemas.microsoft.com/office/drawing/2014/main" id="{9A9E929B-9FA1-06E4-8FC8-97526071E7B4}"/>
+              </a:ext>
+            </a:extLst>
+          </p:cNvPr>
+          <p:cNvSpPr/>
+          <p:nvPr/>
+        </p:nvSpPr>
+        <p:spPr>
+          <a:xfrm>
+            <a:off x="10439610" y="1317257"/>
+            <a:ext cx="1101914" cy="342062"/>
+          </a:xfrm>
+          <a:prstGeom prst="roundRect">
+            <a:avLst/>
+          </a:prstGeom>
+        </p:spPr>
+        <p:style>
+          <a:lnRef idx="2">
+            <a:schemeClr val="dk1"/>
+          </a:lnRef>
+          <a:fillRef idx="1">
+            <a:schemeClr val="lt1"/>
+          </a:fillRef>
+          <a:effectRef idx="0">
+            <a:schemeClr val="dk1"/>
+          </a:effectRef>
+          <a:fontRef idx="minor">
+            <a:schemeClr val="dk1"/>
+          </a:fontRef>
+        </p:style>
+        <p:txBody>
+          <a:bodyPr rtlCol="0" anchor="ctr"/>
+          <a:lstStyle/>
+          <a:p>
+            <a:pPr algn="ctr"/>
+            <a:r>
+              <a:rPr lang="es-ES" dirty="0"/>
+              <a:t>Exportar</a:t>
+            </a:r>
+            <a:endParaRPr lang="es-VE" dirty="0"/>
+          </a:p>
+        </p:txBody>
+      </p:sp>
+      <p:sp>
+        <p:nvSpPr>
+          <p:cNvPr id="34" name="Rectángulo: esquinas redondeadas 31">
+            <a:hlinkClick r:id="rId7" action="ppaction://hlinksldjump"/>
+            <a:extLst>
+              <a:ext uri="{FF2B5EF4-FFF2-40B4-BE49-F238E27FC236}">
+                <a16:creationId xmlns:a16="http://schemas.microsoft.com/office/drawing/2014/main" id="{0E621854-0B20-2D51-659C-A637F4393070}"/>
+              </a:ext>
+            </a:extLst>
+          </p:cNvPr>
+          <p:cNvSpPr/>
+          <p:nvPr/>
+        </p:nvSpPr>
+        <p:spPr>
+          <a:xfrm>
+            <a:off x="10318890" y="5315318"/>
+            <a:ext cx="1061885" cy="383458"/>
+          </a:xfrm>
+          <a:prstGeom prst="roundRect">
+            <a:avLst/>
+          </a:prstGeom>
+        </p:spPr>
+        <p:style>
+          <a:lnRef idx="2">
+            <a:schemeClr val="dk1"/>
+          </a:lnRef>
+          <a:fillRef idx="1">
+            <a:schemeClr val="lt1"/>
+          </a:fillRef>
+          <a:effectRef idx="0">
+            <a:schemeClr val="dk1"/>
+          </a:effectRef>
+          <a:fontRef idx="minor">
+            <a:schemeClr val="dk1"/>
+          </a:fontRef>
+        </p:style>
+        <p:txBody>
+          <a:bodyPr rtlCol="0" anchor="ctr"/>
+          <a:lstStyle/>
+          <a:p>
+            <a:pPr algn="ctr"/>
+            <a:r>
+              <a:rPr lang="es-ES" dirty="0"/>
+              <a:t>Ver Rep.</a:t>
+            </a:r>
+            <a:endParaRPr lang="es-VE" dirty="0"/>
+          </a:p>
+        </p:txBody>
+      </p:sp>
+      <p:sp>
+        <p:nvSpPr>
+          <p:cNvPr id="35" name="Rectángulo: esquinas redondeadas 31">
+            <a:hlinkClick r:id="rId7" action="ppaction://hlinksldjump"/>
+            <a:extLst>
+              <a:ext uri="{FF2B5EF4-FFF2-40B4-BE49-F238E27FC236}">
+                <a16:creationId xmlns:a16="http://schemas.microsoft.com/office/drawing/2014/main" id="{D6020349-9BC6-9279-FBF5-9328C2039ED1}"/>
+              </a:ext>
+            </a:extLst>
+          </p:cNvPr>
+          <p:cNvSpPr/>
+          <p:nvPr/>
+        </p:nvSpPr>
+        <p:spPr>
+          <a:xfrm>
+            <a:off x="6638737" y="1321677"/>
+            <a:ext cx="1101914" cy="342062"/>
+          </a:xfrm>
+          <a:prstGeom prst="roundRect">
+            <a:avLst/>
+          </a:prstGeom>
+        </p:spPr>
+        <p:style>
+          <a:lnRef idx="2">
+            <a:schemeClr val="dk1"/>
+          </a:lnRef>
+          <a:fillRef idx="1">
+            <a:schemeClr val="lt1"/>
+          </a:fillRef>
+          <a:effectRef idx="0">
+            <a:schemeClr val="dk1"/>
+          </a:effectRef>
+          <a:fontRef idx="minor">
+            <a:schemeClr val="dk1"/>
+          </a:fontRef>
+        </p:style>
+        <p:txBody>
+          <a:bodyPr rtlCol="0" anchor="ctr"/>
+          <a:lstStyle/>
+          <a:p>
+            <a:pPr algn="ctr"/>
+            <a:r>
+              <a:rPr lang="es-ES" dirty="0"/>
+              <a:t>Filtrar</a:t>
             </a:r>
             <a:endParaRPr lang="es-VE" dirty="0"/>
           </a:p>
@@ -4329,7 +5726,7 @@
     </p:spTree>
     <p:extLst>
       <p:ext uri="{BB962C8B-B14F-4D97-AF65-F5344CB8AC3E}">
-        <p14:creationId xmlns:p14="http://schemas.microsoft.com/office/powerpoint/2010/main" val="1918439319"/>
+        <p14:creationId xmlns:p14="http://schemas.microsoft.com/office/powerpoint/2010/main" val="4181796213"/>
       </p:ext>
     </p:extLst>
   </p:cSld>
@@ -7456,4 +8853,319 @@
     </a:ext>
   </a:extLst>
 </a:theme>
+</file>
+
+<file path=ppt/theme/theme2.xml><?xml version="1.0" encoding="utf-8"?>
+<a:theme xmlns:a="http://schemas.openxmlformats.org/drawingml/2006/main" name="Office Theme">
+  <a:themeElements>
+    <a:clrScheme name="Office">
+      <a:dk1>
+        <a:sysClr val="windowText" lastClr="000000"/>
+      </a:dk1>
+      <a:lt1>
+        <a:sysClr val="window" lastClr="FFFFFF"/>
+      </a:lt1>
+      <a:dk2>
+        <a:srgbClr val="0E2841"/>
+      </a:dk2>
+      <a:lt2>
+        <a:srgbClr val="E8E8E8"/>
+      </a:lt2>
+      <a:accent1>
+        <a:srgbClr val="156082"/>
+      </a:accent1>
+      <a:accent2>
+        <a:srgbClr val="E97132"/>
+      </a:accent2>
+      <a:accent3>
+        <a:srgbClr val="196B24"/>
+      </a:accent3>
+      <a:accent4>
+        <a:srgbClr val="0F9ED5"/>
+      </a:accent4>
+      <a:accent5>
+        <a:srgbClr val="A02B93"/>
+      </a:accent5>
+      <a:accent6>
+        <a:srgbClr val="4EA72E"/>
+      </a:accent6>
+      <a:hlink>
+        <a:srgbClr val="467886"/>
+      </a:hlink>
+      <a:folHlink>
+        <a:srgbClr val="96607D"/>
+      </a:folHlink>
+    </a:clrScheme>
+    <a:fontScheme name="Office">
+      <a:majorFont>
+        <a:latin typeface="Aptos Display" panose="02110004020202020204"/>
+        <a:ea typeface=""/>
+        <a:cs typeface=""/>
+        <a:font script="Jpan" typeface="游ゴシック Light"/>
+        <a:font script="Hang" typeface="맑은 고딕"/>
+        <a:font script="Hans" typeface="等线 Light"/>
+        <a:font script="Hant" typeface="新細明體"/>
+        <a:font script="Arab" typeface="Times New Roman"/>
+        <a:font script="Hebr" typeface="Times New Roman"/>
+        <a:font script="Thai" typeface="Angsana New"/>
+        <a:font script="Ethi" typeface="Nyala"/>
+        <a:font script="Beng" typeface="Vrinda"/>
+        <a:font script="Gujr" typeface="Shruti"/>
+        <a:font script="Khmr" typeface="MoolBoran"/>
+        <a:font script="Knda" typeface="Tunga"/>
+        <a:font script="Guru" typeface="Raavi"/>
+        <a:font script="Cans" typeface="Euphemia"/>
+        <a:font script="Cher" typeface="Plantagenet Cherokee"/>
+        <a:font script="Yiii" typeface="Microsoft Yi Baiti"/>
+        <a:font script="Tibt" typeface="Microsoft Himalaya"/>
+        <a:font script="Thaa" typeface="MV Boli"/>
+        <a:font script="Deva" typeface="Mangal"/>
+        <a:font script="Telu" typeface="Gautami"/>
+        <a:font script="Taml" typeface="Latha"/>
+        <a:font script="Syrc" typeface="Estrangelo Edessa"/>
+        <a:font script="Orya" typeface="Kalinga"/>
+        <a:font script="Mlym" typeface="Kartika"/>
+        <a:font script="Laoo" typeface="DokChampa"/>
+        <a:font script="Sinh" typeface="Iskoola Pota"/>
+        <a:font script="Mong" typeface="Mongolian Baiti"/>
+        <a:font script="Viet" typeface="Times New Roman"/>
+        <a:font script="Uigh" typeface="Microsoft Uighur"/>
+        <a:font script="Geor" typeface="Sylfaen"/>
+        <a:font script="Armn" typeface="Arial"/>
+        <a:font script="Bugi" typeface="Leelawadee UI"/>
+        <a:font script="Bopo" typeface="Microsoft JhengHei"/>
+        <a:font script="Java" typeface="Javanese Text"/>
+        <a:font script="Lisu" typeface="Segoe UI"/>
+        <a:font script="Mymr" typeface="Myanmar Text"/>
+        <a:font script="Nkoo" typeface="Ebrima"/>
+        <a:font script="Olck" typeface="Nirmala UI"/>
+        <a:font script="Osma" typeface="Ebrima"/>
+        <a:font script="Phag" typeface="Phagspa"/>
+        <a:font script="Syrn" typeface="Estrangelo Edessa"/>
+        <a:font script="Syrj" typeface="Estrangelo Edessa"/>
+        <a:font script="Syre" typeface="Estrangelo Edessa"/>
+        <a:font script="Sora" typeface="Nirmala UI"/>
+        <a:font script="Tale" typeface="Microsoft Tai Le"/>
+        <a:font script="Talu" typeface="Microsoft New Tai Lue"/>
+        <a:font script="Tfng" typeface="Ebrima"/>
+      </a:majorFont>
+      <a:minorFont>
+        <a:latin typeface="Aptos" panose="02110004020202020204"/>
+        <a:ea typeface=""/>
+        <a:cs typeface=""/>
+        <a:font script="Jpan" typeface="游ゴシック"/>
+        <a:font script="Hang" typeface="맑은 고딕"/>
+        <a:font script="Hans" typeface="等线"/>
+        <a:font script="Hant" typeface="新細明體"/>
+        <a:font script="Arab" typeface="Arial"/>
+        <a:font script="Hebr" typeface="Arial"/>
+        <a:font script="Thai" typeface="Cordia New"/>
+        <a:font script="Ethi" typeface="Nyala"/>
+        <a:font script="Beng" typeface="Vrinda"/>
+        <a:font script="Gujr" typeface="Shruti"/>
+        <a:font script="Khmr" typeface="DaunPenh"/>
+        <a:font script="Knda" typeface="Tunga"/>
+        <a:font script="Guru" typeface="Raavi"/>
+        <a:font script="Cans" typeface="Euphemia"/>
+        <a:font script="Cher" typeface="Plantagenet Cherokee"/>
+        <a:font script="Yiii" typeface="Microsoft Yi Baiti"/>
+        <a:font script="Tibt" typeface="Microsoft Himalaya"/>
+        <a:font script="Thaa" typeface="MV Boli"/>
+        <a:font script="Deva" typeface="Mangal"/>
+        <a:font script="Telu" typeface="Gautami"/>
+        <a:font script="Taml" typeface="Latha"/>
+        <a:font script="Syrc" typeface="Estrangelo Edessa"/>
+        <a:font script="Orya" typeface="Kalinga"/>
+        <a:font script="Mlym" typeface="Kartika"/>
+        <a:font script="Laoo" typeface="DokChampa"/>
+        <a:font script="Sinh" typeface="Iskoola Pota"/>
+        <a:font script="Mong" typeface="Mongolian Baiti"/>
+        <a:font script="Viet" typeface="Arial"/>
+        <a:font script="Uigh" typeface="Microsoft Uighur"/>
+        <a:font script="Geor" typeface="Sylfaen"/>
+        <a:font script="Armn" typeface="Arial"/>
+        <a:font script="Bugi" typeface="Leelawadee UI"/>
+        <a:font script="Bopo" typeface="Microsoft JhengHei"/>
+        <a:font script="Java" typeface="Javanese Text"/>
+        <a:font script="Lisu" typeface="Segoe UI"/>
+        <a:font script="Mymr" typeface="Myanmar Text"/>
+        <a:font script="Nkoo" typeface="Ebrima"/>
+        <a:font script="Olck" typeface="Nirmala UI"/>
+        <a:font script="Osma" typeface="Ebrima"/>
+        <a:font script="Phag" typeface="Phagspa"/>
+        <a:font script="Syrn" typeface="Estrangelo Edessa"/>
+        <a:font script="Syrj" typeface="Estrangelo Edessa"/>
+        <a:font script="Syre" typeface="Estrangelo Edessa"/>
+        <a:font script="Sora" typeface="Nirmala UI"/>
+        <a:font script="Tale" typeface="Microsoft Tai Le"/>
+        <a:font script="Talu" typeface="Microsoft New Tai Lue"/>
+        <a:font script="Tfng" typeface="Ebrima"/>
+      </a:minorFont>
+    </a:fontScheme>
+    <a:fmtScheme name="Office">
+      <a:fillStyleLst>
+        <a:solidFill>
+          <a:schemeClr val="phClr"/>
+        </a:solidFill>
+        <a:gradFill rotWithShape="1">
+          <a:gsLst>
+            <a:gs pos="0">
+              <a:schemeClr val="phClr">
+                <a:lumMod val="110000"/>
+                <a:satMod val="105000"/>
+                <a:tint val="67000"/>
+              </a:schemeClr>
+            </a:gs>
+            <a:gs pos="50000">
+              <a:schemeClr val="phClr">
+                <a:lumMod val="105000"/>
+                <a:satMod val="103000"/>
+                <a:tint val="73000"/>
+              </a:schemeClr>
+            </a:gs>
+            <a:gs pos="100000">
+              <a:schemeClr val="phClr">
+                <a:lumMod val="105000"/>
+                <a:satMod val="109000"/>
+                <a:tint val="81000"/>
+              </a:schemeClr>
+            </a:gs>
+          </a:gsLst>
+          <a:lin ang="5400000" scaled="0"/>
+        </a:gradFill>
+        <a:gradFill rotWithShape="1">
+          <a:gsLst>
+            <a:gs pos="0">
+              <a:schemeClr val="phClr">
+                <a:satMod val="103000"/>
+                <a:lumMod val="102000"/>
+                <a:tint val="94000"/>
+              </a:schemeClr>
+            </a:gs>
+            <a:gs pos="50000">
+              <a:schemeClr val="phClr">
+                <a:satMod val="110000"/>
+                <a:lumMod val="100000"/>
+                <a:shade val="100000"/>
+              </a:schemeClr>
+            </a:gs>
+            <a:gs pos="100000">
+              <a:schemeClr val="phClr">
+                <a:lumMod val="99000"/>
+                <a:satMod val="120000"/>
+                <a:shade val="78000"/>
+              </a:schemeClr>
+            </a:gs>
+          </a:gsLst>
+          <a:lin ang="5400000" scaled="0"/>
+        </a:gradFill>
+      </a:fillStyleLst>
+      <a:lnStyleLst>
+        <a:ln w="12700" cap="flat" cmpd="sng" algn="ctr">
+          <a:solidFill>
+            <a:schemeClr val="phClr"/>
+          </a:solidFill>
+          <a:prstDash val="solid"/>
+          <a:miter lim="800000"/>
+        </a:ln>
+        <a:ln w="19050" cap="flat" cmpd="sng" algn="ctr">
+          <a:solidFill>
+            <a:schemeClr val="phClr"/>
+          </a:solidFill>
+          <a:prstDash val="solid"/>
+          <a:miter lim="800000"/>
+        </a:ln>
+        <a:ln w="25400" cap="flat" cmpd="sng" algn="ctr">
+          <a:solidFill>
+            <a:schemeClr val="phClr"/>
+          </a:solidFill>
+          <a:prstDash val="solid"/>
+          <a:miter lim="800000"/>
+        </a:ln>
+      </a:lnStyleLst>
+      <a:effectStyleLst>
+        <a:effectStyle>
+          <a:effectLst/>
+        </a:effectStyle>
+        <a:effectStyle>
+          <a:effectLst/>
+        </a:effectStyle>
+        <a:effectStyle>
+          <a:effectLst>
+            <a:outerShdw blurRad="57150" dist="19050" dir="5400000" algn="ctr" rotWithShape="0">
+              <a:srgbClr val="000000">
+                <a:alpha val="63000"/>
+              </a:srgbClr>
+            </a:outerShdw>
+          </a:effectLst>
+        </a:effectStyle>
+      </a:effectStyleLst>
+      <a:bgFillStyleLst>
+        <a:solidFill>
+          <a:schemeClr val="phClr"/>
+        </a:solidFill>
+        <a:solidFill>
+          <a:schemeClr val="phClr">
+            <a:tint val="95000"/>
+            <a:satMod val="170000"/>
+          </a:schemeClr>
+        </a:solidFill>
+        <a:gradFill rotWithShape="1">
+          <a:gsLst>
+            <a:gs pos="0">
+              <a:schemeClr val="phClr">
+                <a:tint val="93000"/>
+                <a:satMod val="150000"/>
+                <a:shade val="98000"/>
+                <a:lumMod val="102000"/>
+              </a:schemeClr>
+            </a:gs>
+            <a:gs pos="50000">
+              <a:schemeClr val="phClr">
+                <a:tint val="98000"/>
+                <a:satMod val="130000"/>
+                <a:shade val="90000"/>
+                <a:lumMod val="103000"/>
+              </a:schemeClr>
+            </a:gs>
+            <a:gs pos="100000">
+              <a:schemeClr val="phClr">
+                <a:shade val="63000"/>
+                <a:satMod val="120000"/>
+              </a:schemeClr>
+            </a:gs>
+          </a:gsLst>
+          <a:lin ang="5400000" scaled="0"/>
+        </a:gradFill>
+      </a:bgFillStyleLst>
+    </a:fmtScheme>
+  </a:themeElements>
+  <a:objectDefaults>
+    <a:lnDef>
+      <a:spPr/>
+      <a:bodyPr/>
+      <a:lstStyle/>
+      <a:style>
+        <a:lnRef idx="2">
+          <a:schemeClr val="accent1"/>
+        </a:lnRef>
+        <a:fillRef idx="0">
+          <a:schemeClr val="accent1"/>
+        </a:fillRef>
+        <a:effectRef idx="1">
+          <a:schemeClr val="accent1"/>
+        </a:effectRef>
+        <a:fontRef idx="minor">
+          <a:schemeClr val="tx1"/>
+        </a:fontRef>
+      </a:style>
+    </a:lnDef>
+  </a:objectDefaults>
+  <a:extraClrSchemeLst/>
+  <a:extLst>
+    <a:ext uri="{05A4C25C-085E-4340-85A3-A5531E510DB2}">
+      <thm15:themeFamily xmlns:thm15="http://schemas.microsoft.com/office/thememl/2012/main" name="Office Theme" id="{2E142A2C-CD16-42D6-873A-C26D2A0506FA}" vid="{1BDDFF52-6CD6-40A5-AB3C-68EB2F1E4D0A}"/>
+    </a:ext>
+  </a:extLst>
+</a:theme>
 </file>
</xml_diff>

<commit_message>
Corregida versión de archivo
</commit_message>
<xml_diff>
--- a/src/annex/propuesta_gui.pptx
+++ b/src/annex/propuesta_gui.pptx
@@ -4,10 +4,13 @@
   <p:sldMasterIdLst>
     <p:sldMasterId id="2147483648" r:id="rId1"/>
   </p:sldMasterIdLst>
+  <p:notesMasterIdLst>
+    <p:notesMasterId r:id="rId10"/>
+  </p:notesMasterIdLst>
   <p:sldIdLst>
     <p:sldId id="257" r:id="rId2"/>
     <p:sldId id="256" r:id="rId3"/>
-    <p:sldId id="263" r:id="rId4"/>
+    <p:sldId id="265" r:id="rId4"/>
     <p:sldId id="259" r:id="rId5"/>
     <p:sldId id="262" r:id="rId6"/>
     <p:sldId id="264" r:id="rId7"/>
@@ -119,6 +122,439 @@
 </p:presentation>
 </file>
 
+<file path=ppt/notesMasters/notesMaster1.xml><?xml version="1.0" encoding="utf-8"?>
+<p:notesMaster xmlns:a="http://schemas.openxmlformats.org/drawingml/2006/main" xmlns:r="http://schemas.openxmlformats.org/officeDocument/2006/relationships" xmlns:p="http://schemas.openxmlformats.org/presentationml/2006/main">
+  <p:cSld>
+    <p:bg>
+      <p:bgRef idx="1001">
+        <a:schemeClr val="bg1"/>
+      </p:bgRef>
+    </p:bg>
+    <p:spTree>
+      <p:nvGrpSpPr>
+        <p:cNvPr id="1" name=""/>
+        <p:cNvGrpSpPr/>
+        <p:nvPr/>
+      </p:nvGrpSpPr>
+      <p:grpSpPr>
+        <a:xfrm>
+          <a:off x="0" y="0"/>
+          <a:ext cx="0" cy="0"/>
+          <a:chOff x="0" y="0"/>
+          <a:chExt cx="0" cy="0"/>
+        </a:xfrm>
+      </p:grpSpPr>
+      <p:sp>
+        <p:nvSpPr>
+          <p:cNvPr id="2" name="Header Placeholder 1"/>
+          <p:cNvSpPr>
+            <a:spLocks noGrp="1"/>
+          </p:cNvSpPr>
+          <p:nvPr>
+            <p:ph type="hdr" sz="quarter"/>
+          </p:nvPr>
+        </p:nvSpPr>
+        <p:spPr>
+          <a:xfrm>
+            <a:off x="0" y="0"/>
+            <a:ext cx="2971800" cy="458788"/>
+          </a:xfrm>
+          <a:prstGeom prst="rect">
+            <a:avLst/>
+          </a:prstGeom>
+        </p:spPr>
+        <p:txBody>
+          <a:bodyPr vert="horz" lIns="91440" tIns="45720" rIns="91440" bIns="45720" rtlCol="0"/>
+          <a:lstStyle>
+            <a:lvl1pPr algn="l">
+              <a:defRPr sz="1200"/>
+            </a:lvl1pPr>
+          </a:lstStyle>
+          <a:p>
+            <a:endParaRPr lang="en-US"/>
+          </a:p>
+        </p:txBody>
+      </p:sp>
+      <p:sp>
+        <p:nvSpPr>
+          <p:cNvPr id="3" name="Date Placeholder 2"/>
+          <p:cNvSpPr>
+            <a:spLocks noGrp="1"/>
+          </p:cNvSpPr>
+          <p:nvPr>
+            <p:ph type="dt" idx="1"/>
+          </p:nvPr>
+        </p:nvSpPr>
+        <p:spPr>
+          <a:xfrm>
+            <a:off x="3884613" y="0"/>
+            <a:ext cx="2971800" cy="458788"/>
+          </a:xfrm>
+          <a:prstGeom prst="rect">
+            <a:avLst/>
+          </a:prstGeom>
+        </p:spPr>
+        <p:txBody>
+          <a:bodyPr vert="horz" lIns="91440" tIns="45720" rIns="91440" bIns="45720" rtlCol="0"/>
+          <a:lstStyle>
+            <a:lvl1pPr algn="r">
+              <a:defRPr sz="1200"/>
+            </a:lvl1pPr>
+          </a:lstStyle>
+          <a:p>
+            <a:fld id="{65768D2E-01E3-4B0B-B472-B4AC596FA912}" type="datetimeFigureOut">
+              <a:rPr lang="en-US" smtClean="0"/>
+              <a:t>6/29/2025</a:t>
+            </a:fld>
+            <a:endParaRPr lang="en-US"/>
+          </a:p>
+        </p:txBody>
+      </p:sp>
+      <p:sp>
+        <p:nvSpPr>
+          <p:cNvPr id="4" name="Slide Image Placeholder 3"/>
+          <p:cNvSpPr>
+            <a:spLocks noGrp="1" noRot="1" noChangeAspect="1"/>
+          </p:cNvSpPr>
+          <p:nvPr>
+            <p:ph type="sldImg" idx="2"/>
+          </p:nvPr>
+        </p:nvSpPr>
+        <p:spPr>
+          <a:xfrm>
+            <a:off x="685800" y="1143000"/>
+            <a:ext cx="5486400" cy="3086100"/>
+          </a:xfrm>
+          <a:prstGeom prst="rect">
+            <a:avLst/>
+          </a:prstGeom>
+          <a:noFill/>
+          <a:ln w="12700">
+            <a:solidFill>
+              <a:prstClr val="black"/>
+            </a:solidFill>
+          </a:ln>
+        </p:spPr>
+        <p:txBody>
+          <a:bodyPr vert="horz" lIns="91440" tIns="45720" rIns="91440" bIns="45720" rtlCol="0" anchor="ctr"/>
+          <a:lstStyle/>
+          <a:p>
+            <a:endParaRPr lang="en-US"/>
+          </a:p>
+        </p:txBody>
+      </p:sp>
+      <p:sp>
+        <p:nvSpPr>
+          <p:cNvPr id="5" name="Notes Placeholder 4"/>
+          <p:cNvSpPr>
+            <a:spLocks noGrp="1"/>
+          </p:cNvSpPr>
+          <p:nvPr>
+            <p:ph type="body" sz="quarter" idx="3"/>
+          </p:nvPr>
+        </p:nvSpPr>
+        <p:spPr>
+          <a:xfrm>
+            <a:off x="685800" y="4400550"/>
+            <a:ext cx="5486400" cy="3600450"/>
+          </a:xfrm>
+          <a:prstGeom prst="rect">
+            <a:avLst/>
+          </a:prstGeom>
+        </p:spPr>
+        <p:txBody>
+          <a:bodyPr vert="horz" lIns="91440" tIns="45720" rIns="91440" bIns="45720" rtlCol="0"/>
+          <a:lstStyle/>
+          <a:p>
+            <a:pPr lvl="0"/>
+            <a:r>
+              <a:rPr lang="en-US"/>
+              <a:t>Click to edit Master text styles</a:t>
+            </a:r>
+          </a:p>
+          <a:p>
+            <a:pPr lvl="1"/>
+            <a:r>
+              <a:rPr lang="en-US"/>
+              <a:t>Second level</a:t>
+            </a:r>
+          </a:p>
+          <a:p>
+            <a:pPr lvl="2"/>
+            <a:r>
+              <a:rPr lang="en-US"/>
+              <a:t>Third level</a:t>
+            </a:r>
+          </a:p>
+          <a:p>
+            <a:pPr lvl="3"/>
+            <a:r>
+              <a:rPr lang="en-US"/>
+              <a:t>Fourth level</a:t>
+            </a:r>
+          </a:p>
+          <a:p>
+            <a:pPr lvl="4"/>
+            <a:r>
+              <a:rPr lang="en-US"/>
+              <a:t>Fifth level</a:t>
+            </a:r>
+          </a:p>
+        </p:txBody>
+      </p:sp>
+      <p:sp>
+        <p:nvSpPr>
+          <p:cNvPr id="6" name="Footer Placeholder 5"/>
+          <p:cNvSpPr>
+            <a:spLocks noGrp="1"/>
+          </p:cNvSpPr>
+          <p:nvPr>
+            <p:ph type="ftr" sz="quarter" idx="4"/>
+          </p:nvPr>
+        </p:nvSpPr>
+        <p:spPr>
+          <a:xfrm>
+            <a:off x="0" y="8685213"/>
+            <a:ext cx="2971800" cy="458787"/>
+          </a:xfrm>
+          <a:prstGeom prst="rect">
+            <a:avLst/>
+          </a:prstGeom>
+        </p:spPr>
+        <p:txBody>
+          <a:bodyPr vert="horz" lIns="91440" tIns="45720" rIns="91440" bIns="45720" rtlCol="0" anchor="b"/>
+          <a:lstStyle>
+            <a:lvl1pPr algn="l">
+              <a:defRPr sz="1200"/>
+            </a:lvl1pPr>
+          </a:lstStyle>
+          <a:p>
+            <a:endParaRPr lang="en-US"/>
+          </a:p>
+        </p:txBody>
+      </p:sp>
+      <p:sp>
+        <p:nvSpPr>
+          <p:cNvPr id="7" name="Slide Number Placeholder 6"/>
+          <p:cNvSpPr>
+            <a:spLocks noGrp="1"/>
+          </p:cNvSpPr>
+          <p:nvPr>
+            <p:ph type="sldNum" sz="quarter" idx="5"/>
+          </p:nvPr>
+        </p:nvSpPr>
+        <p:spPr>
+          <a:xfrm>
+            <a:off x="3884613" y="8685213"/>
+            <a:ext cx="2971800" cy="458787"/>
+          </a:xfrm>
+          <a:prstGeom prst="rect">
+            <a:avLst/>
+          </a:prstGeom>
+        </p:spPr>
+        <p:txBody>
+          <a:bodyPr vert="horz" lIns="91440" tIns="45720" rIns="91440" bIns="45720" rtlCol="0" anchor="b"/>
+          <a:lstStyle>
+            <a:lvl1pPr algn="r">
+              <a:defRPr sz="1200"/>
+            </a:lvl1pPr>
+          </a:lstStyle>
+          <a:p>
+            <a:fld id="{7DC4374C-9139-43C5-9A45-EABD69DAAF39}" type="slidenum">
+              <a:rPr lang="en-US" smtClean="0"/>
+              <a:t>‹#›</a:t>
+            </a:fld>
+            <a:endParaRPr lang="en-US"/>
+          </a:p>
+        </p:txBody>
+      </p:sp>
+    </p:spTree>
+    <p:extLst>
+      <p:ext uri="{BB962C8B-B14F-4D97-AF65-F5344CB8AC3E}">
+        <p14:creationId xmlns:p14="http://schemas.microsoft.com/office/powerpoint/2010/main" val="2852859366"/>
+      </p:ext>
+    </p:extLst>
+  </p:cSld>
+  <p:clrMap bg1="lt1" tx1="dk1" bg2="lt2" tx2="dk2" accent1="accent1" accent2="accent2" accent3="accent3" accent4="accent4" accent5="accent5" accent6="accent6" hlink="hlink" folHlink="folHlink"/>
+  <p:notesStyle>
+    <a:lvl1pPr marL="0" algn="l" defTabSz="914400" rtl="0" eaLnBrk="1" latinLnBrk="0" hangingPunct="1">
+      <a:defRPr sz="1200" kern="1200">
+        <a:solidFill>
+          <a:schemeClr val="tx1"/>
+        </a:solidFill>
+        <a:latin typeface="+mn-lt"/>
+        <a:ea typeface="+mn-ea"/>
+        <a:cs typeface="+mn-cs"/>
+      </a:defRPr>
+    </a:lvl1pPr>
+    <a:lvl2pPr marL="457200" algn="l" defTabSz="914400" rtl="0" eaLnBrk="1" latinLnBrk="0" hangingPunct="1">
+      <a:defRPr sz="1200" kern="1200">
+        <a:solidFill>
+          <a:schemeClr val="tx1"/>
+        </a:solidFill>
+        <a:latin typeface="+mn-lt"/>
+        <a:ea typeface="+mn-ea"/>
+        <a:cs typeface="+mn-cs"/>
+      </a:defRPr>
+    </a:lvl2pPr>
+    <a:lvl3pPr marL="914400" algn="l" defTabSz="914400" rtl="0" eaLnBrk="1" latinLnBrk="0" hangingPunct="1">
+      <a:defRPr sz="1200" kern="1200">
+        <a:solidFill>
+          <a:schemeClr val="tx1"/>
+        </a:solidFill>
+        <a:latin typeface="+mn-lt"/>
+        <a:ea typeface="+mn-ea"/>
+        <a:cs typeface="+mn-cs"/>
+      </a:defRPr>
+    </a:lvl3pPr>
+    <a:lvl4pPr marL="1371600" algn="l" defTabSz="914400" rtl="0" eaLnBrk="1" latinLnBrk="0" hangingPunct="1">
+      <a:defRPr sz="1200" kern="1200">
+        <a:solidFill>
+          <a:schemeClr val="tx1"/>
+        </a:solidFill>
+        <a:latin typeface="+mn-lt"/>
+        <a:ea typeface="+mn-ea"/>
+        <a:cs typeface="+mn-cs"/>
+      </a:defRPr>
+    </a:lvl4pPr>
+    <a:lvl5pPr marL="1828800" algn="l" defTabSz="914400" rtl="0" eaLnBrk="1" latinLnBrk="0" hangingPunct="1">
+      <a:defRPr sz="1200" kern="1200">
+        <a:solidFill>
+          <a:schemeClr val="tx1"/>
+        </a:solidFill>
+        <a:latin typeface="+mn-lt"/>
+        <a:ea typeface="+mn-ea"/>
+        <a:cs typeface="+mn-cs"/>
+      </a:defRPr>
+    </a:lvl5pPr>
+    <a:lvl6pPr marL="2286000" algn="l" defTabSz="914400" rtl="0" eaLnBrk="1" latinLnBrk="0" hangingPunct="1">
+      <a:defRPr sz="1200" kern="1200">
+        <a:solidFill>
+          <a:schemeClr val="tx1"/>
+        </a:solidFill>
+        <a:latin typeface="+mn-lt"/>
+        <a:ea typeface="+mn-ea"/>
+        <a:cs typeface="+mn-cs"/>
+      </a:defRPr>
+    </a:lvl6pPr>
+    <a:lvl7pPr marL="2743200" algn="l" defTabSz="914400" rtl="0" eaLnBrk="1" latinLnBrk="0" hangingPunct="1">
+      <a:defRPr sz="1200" kern="1200">
+        <a:solidFill>
+          <a:schemeClr val="tx1"/>
+        </a:solidFill>
+        <a:latin typeface="+mn-lt"/>
+        <a:ea typeface="+mn-ea"/>
+        <a:cs typeface="+mn-cs"/>
+      </a:defRPr>
+    </a:lvl7pPr>
+    <a:lvl8pPr marL="3200400" algn="l" defTabSz="914400" rtl="0" eaLnBrk="1" latinLnBrk="0" hangingPunct="1">
+      <a:defRPr sz="1200" kern="1200">
+        <a:solidFill>
+          <a:schemeClr val="tx1"/>
+        </a:solidFill>
+        <a:latin typeface="+mn-lt"/>
+        <a:ea typeface="+mn-ea"/>
+        <a:cs typeface="+mn-cs"/>
+      </a:defRPr>
+    </a:lvl8pPr>
+    <a:lvl9pPr marL="3657600" algn="l" defTabSz="914400" rtl="0" eaLnBrk="1" latinLnBrk="0" hangingPunct="1">
+      <a:defRPr sz="1200" kern="1200">
+        <a:solidFill>
+          <a:schemeClr val="tx1"/>
+        </a:solidFill>
+        <a:latin typeface="+mn-lt"/>
+        <a:ea typeface="+mn-ea"/>
+        <a:cs typeface="+mn-cs"/>
+      </a:defRPr>
+    </a:lvl9pPr>
+  </p:notesStyle>
+</p:notesMaster>
+</file>
+
+<file path=ppt/notesSlides/notesSlide1.xml><?xml version="1.0" encoding="utf-8"?>
+<p:notes xmlns:a="http://schemas.openxmlformats.org/drawingml/2006/main" xmlns:r="http://schemas.openxmlformats.org/officeDocument/2006/relationships" xmlns:p="http://schemas.openxmlformats.org/presentationml/2006/main">
+  <p:cSld>
+    <p:spTree>
+      <p:nvGrpSpPr>
+        <p:cNvPr id="1" name=""/>
+        <p:cNvGrpSpPr/>
+        <p:nvPr/>
+      </p:nvGrpSpPr>
+      <p:grpSpPr>
+        <a:xfrm>
+          <a:off x="0" y="0"/>
+          <a:ext cx="0" cy="0"/>
+          <a:chOff x="0" y="0"/>
+          <a:chExt cx="0" cy="0"/>
+        </a:xfrm>
+      </p:grpSpPr>
+      <p:sp>
+        <p:nvSpPr>
+          <p:cNvPr id="2" name="Slide Image Placeholder 1"/>
+          <p:cNvSpPr>
+            <a:spLocks noGrp="1" noRot="1" noChangeAspect="1"/>
+          </p:cNvSpPr>
+          <p:nvPr>
+            <p:ph type="sldImg"/>
+          </p:nvPr>
+        </p:nvSpPr>
+        <p:spPr/>
+      </p:sp>
+      <p:sp>
+        <p:nvSpPr>
+          <p:cNvPr id="3" name="Notes Placeholder 2"/>
+          <p:cNvSpPr>
+            <a:spLocks noGrp="1"/>
+          </p:cNvSpPr>
+          <p:nvPr>
+            <p:ph type="body" idx="1"/>
+          </p:nvPr>
+        </p:nvSpPr>
+        <p:spPr/>
+        <p:txBody>
+          <a:bodyPr/>
+          <a:lstStyle/>
+          <a:p>
+            <a:endParaRPr lang="en-US" dirty="0"/>
+          </a:p>
+        </p:txBody>
+      </p:sp>
+      <p:sp>
+        <p:nvSpPr>
+          <p:cNvPr id="4" name="Slide Number Placeholder 3"/>
+          <p:cNvSpPr>
+            <a:spLocks noGrp="1"/>
+          </p:cNvSpPr>
+          <p:nvPr>
+            <p:ph type="sldNum" sz="quarter" idx="5"/>
+          </p:nvPr>
+        </p:nvSpPr>
+        <p:spPr/>
+        <p:txBody>
+          <a:bodyPr/>
+          <a:lstStyle/>
+          <a:p>
+            <a:fld id="{7DC4374C-9139-43C5-9A45-EABD69DAAF39}" type="slidenum">
+              <a:rPr lang="en-US" smtClean="0"/>
+              <a:t>3</a:t>
+            </a:fld>
+            <a:endParaRPr lang="en-US"/>
+          </a:p>
+        </p:txBody>
+      </p:sp>
+    </p:spTree>
+    <p:extLst>
+      <p:ext uri="{BB962C8B-B14F-4D97-AF65-F5344CB8AC3E}">
+        <p14:creationId xmlns:p14="http://schemas.microsoft.com/office/powerpoint/2010/main" val="582366409"/>
+      </p:ext>
+    </p:extLst>
+  </p:cSld>
+  <p:clrMapOvr>
+    <a:masterClrMapping/>
+  </p:clrMapOvr>
+</p:notes>
+</file>
+
 <file path=ppt/slideLayouts/slideLayout1.xml><?xml version="1.0" encoding="utf-8"?>
 <p:sldLayout xmlns:a="http://schemas.openxmlformats.org/drawingml/2006/main" xmlns:r="http://schemas.openxmlformats.org/officeDocument/2006/relationships" xmlns:p="http://schemas.openxmlformats.org/presentationml/2006/main" type="title" preserve="1">
   <p:cSld name="Diapositiva de título">
@@ -268,7 +704,7 @@
           <a:p>
             <a:fld id="{E9678507-3CFE-4A03-B562-1B8B6CB373E1}" type="datetimeFigureOut">
               <a:rPr lang="es-VE" smtClean="0"/>
-              <a:t>28/6/2025</a:t>
+              <a:t>29/6/2025</a:t>
             </a:fld>
             <a:endParaRPr lang="es-VE"/>
           </a:p>
@@ -322,7 +758,7 @@
           <a:p>
             <a:fld id="{4ECAC6D2-66BD-4570-BDCE-560FE2FDE3BB}" type="slidenum">
               <a:rPr lang="es-VE" smtClean="0"/>
-              <a:t>‹Nº›</a:t>
+              <a:t>‹#›</a:t>
             </a:fld>
             <a:endParaRPr lang="es-VE"/>
           </a:p>
@@ -468,7 +904,7 @@
           <a:p>
             <a:fld id="{E9678507-3CFE-4A03-B562-1B8B6CB373E1}" type="datetimeFigureOut">
               <a:rPr lang="es-VE" smtClean="0"/>
-              <a:t>28/6/2025</a:t>
+              <a:t>29/6/2025</a:t>
             </a:fld>
             <a:endParaRPr lang="es-VE"/>
           </a:p>
@@ -522,7 +958,7 @@
           <a:p>
             <a:fld id="{4ECAC6D2-66BD-4570-BDCE-560FE2FDE3BB}" type="slidenum">
               <a:rPr lang="es-VE" smtClean="0"/>
-              <a:t>‹Nº›</a:t>
+              <a:t>‹#›</a:t>
             </a:fld>
             <a:endParaRPr lang="es-VE"/>
           </a:p>
@@ -678,7 +1114,7 @@
           <a:p>
             <a:fld id="{E9678507-3CFE-4A03-B562-1B8B6CB373E1}" type="datetimeFigureOut">
               <a:rPr lang="es-VE" smtClean="0"/>
-              <a:t>28/6/2025</a:t>
+              <a:t>29/6/2025</a:t>
             </a:fld>
             <a:endParaRPr lang="es-VE"/>
           </a:p>
@@ -732,7 +1168,7 @@
           <a:p>
             <a:fld id="{4ECAC6D2-66BD-4570-BDCE-560FE2FDE3BB}" type="slidenum">
               <a:rPr lang="es-VE" smtClean="0"/>
-              <a:t>‹Nº›</a:t>
+              <a:t>‹#›</a:t>
             </a:fld>
             <a:endParaRPr lang="es-VE"/>
           </a:p>
@@ -878,7 +1314,7 @@
           <a:p>
             <a:fld id="{E9678507-3CFE-4A03-B562-1B8B6CB373E1}" type="datetimeFigureOut">
               <a:rPr lang="es-VE" smtClean="0"/>
-              <a:t>28/6/2025</a:t>
+              <a:t>29/6/2025</a:t>
             </a:fld>
             <a:endParaRPr lang="es-VE"/>
           </a:p>
@@ -932,7 +1368,7 @@
           <a:p>
             <a:fld id="{4ECAC6D2-66BD-4570-BDCE-560FE2FDE3BB}" type="slidenum">
               <a:rPr lang="es-VE" smtClean="0"/>
-              <a:t>‹Nº›</a:t>
+              <a:t>‹#›</a:t>
             </a:fld>
             <a:endParaRPr lang="es-VE"/>
           </a:p>
@@ -1154,7 +1590,7 @@
           <a:p>
             <a:fld id="{E9678507-3CFE-4A03-B562-1B8B6CB373E1}" type="datetimeFigureOut">
               <a:rPr lang="es-VE" smtClean="0"/>
-              <a:t>28/6/2025</a:t>
+              <a:t>29/6/2025</a:t>
             </a:fld>
             <a:endParaRPr lang="es-VE"/>
           </a:p>
@@ -1208,7 +1644,7 @@
           <a:p>
             <a:fld id="{4ECAC6D2-66BD-4570-BDCE-560FE2FDE3BB}" type="slidenum">
               <a:rPr lang="es-VE" smtClean="0"/>
-              <a:t>‹Nº›</a:t>
+              <a:t>‹#›</a:t>
             </a:fld>
             <a:endParaRPr lang="es-VE"/>
           </a:p>
@@ -1422,7 +1858,7 @@
           <a:p>
             <a:fld id="{E9678507-3CFE-4A03-B562-1B8B6CB373E1}" type="datetimeFigureOut">
               <a:rPr lang="es-VE" smtClean="0"/>
-              <a:t>28/6/2025</a:t>
+              <a:t>29/6/2025</a:t>
             </a:fld>
             <a:endParaRPr lang="es-VE"/>
           </a:p>
@@ -1476,7 +1912,7 @@
           <a:p>
             <a:fld id="{4ECAC6D2-66BD-4570-BDCE-560FE2FDE3BB}" type="slidenum">
               <a:rPr lang="es-VE" smtClean="0"/>
-              <a:t>‹Nº›</a:t>
+              <a:t>‹#›</a:t>
             </a:fld>
             <a:endParaRPr lang="es-VE"/>
           </a:p>
@@ -1837,7 +2273,7 @@
           <a:p>
             <a:fld id="{E9678507-3CFE-4A03-B562-1B8B6CB373E1}" type="datetimeFigureOut">
               <a:rPr lang="es-VE" smtClean="0"/>
-              <a:t>28/6/2025</a:t>
+              <a:t>29/6/2025</a:t>
             </a:fld>
             <a:endParaRPr lang="es-VE"/>
           </a:p>
@@ -1891,7 +2327,7 @@
           <a:p>
             <a:fld id="{4ECAC6D2-66BD-4570-BDCE-560FE2FDE3BB}" type="slidenum">
               <a:rPr lang="es-VE" smtClean="0"/>
-              <a:t>‹Nº›</a:t>
+              <a:t>‹#›</a:t>
             </a:fld>
             <a:endParaRPr lang="es-VE"/>
           </a:p>
@@ -1979,7 +2415,7 @@
           <a:p>
             <a:fld id="{E9678507-3CFE-4A03-B562-1B8B6CB373E1}" type="datetimeFigureOut">
               <a:rPr lang="es-VE" smtClean="0"/>
-              <a:t>28/6/2025</a:t>
+              <a:t>29/6/2025</a:t>
             </a:fld>
             <a:endParaRPr lang="es-VE"/>
           </a:p>
@@ -2033,7 +2469,7 @@
           <a:p>
             <a:fld id="{4ECAC6D2-66BD-4570-BDCE-560FE2FDE3BB}" type="slidenum">
               <a:rPr lang="es-VE" smtClean="0"/>
-              <a:t>‹Nº›</a:t>
+              <a:t>‹#›</a:t>
             </a:fld>
             <a:endParaRPr lang="es-VE"/>
           </a:p>
@@ -2092,7 +2528,7 @@
           <a:p>
             <a:fld id="{E9678507-3CFE-4A03-B562-1B8B6CB373E1}" type="datetimeFigureOut">
               <a:rPr lang="es-VE" smtClean="0"/>
-              <a:t>28/6/2025</a:t>
+              <a:t>29/6/2025</a:t>
             </a:fld>
             <a:endParaRPr lang="es-VE"/>
           </a:p>
@@ -2146,7 +2582,7 @@
           <a:p>
             <a:fld id="{4ECAC6D2-66BD-4570-BDCE-560FE2FDE3BB}" type="slidenum">
               <a:rPr lang="es-VE" smtClean="0"/>
-              <a:t>‹Nº›</a:t>
+              <a:t>‹#›</a:t>
             </a:fld>
             <a:endParaRPr lang="es-VE"/>
           </a:p>
@@ -2405,7 +2841,7 @@
           <a:p>
             <a:fld id="{E9678507-3CFE-4A03-B562-1B8B6CB373E1}" type="datetimeFigureOut">
               <a:rPr lang="es-VE" smtClean="0"/>
-              <a:t>28/6/2025</a:t>
+              <a:t>29/6/2025</a:t>
             </a:fld>
             <a:endParaRPr lang="es-VE"/>
           </a:p>
@@ -2459,7 +2895,7 @@
           <a:p>
             <a:fld id="{4ECAC6D2-66BD-4570-BDCE-560FE2FDE3BB}" type="slidenum">
               <a:rPr lang="es-VE" smtClean="0"/>
-              <a:t>‹Nº›</a:t>
+              <a:t>‹#›</a:t>
             </a:fld>
             <a:endParaRPr lang="es-VE"/>
           </a:p>
@@ -2694,7 +3130,7 @@
           <a:p>
             <a:fld id="{E9678507-3CFE-4A03-B562-1B8B6CB373E1}" type="datetimeFigureOut">
               <a:rPr lang="es-VE" smtClean="0"/>
-              <a:t>28/6/2025</a:t>
+              <a:t>29/6/2025</a:t>
             </a:fld>
             <a:endParaRPr lang="es-VE"/>
           </a:p>
@@ -2748,7 +3184,7 @@
           <a:p>
             <a:fld id="{4ECAC6D2-66BD-4570-BDCE-560FE2FDE3BB}" type="slidenum">
               <a:rPr lang="es-VE" smtClean="0"/>
-              <a:t>‹Nº›</a:t>
+              <a:t>‹#›</a:t>
             </a:fld>
             <a:endParaRPr lang="es-VE"/>
           </a:p>
@@ -2937,7 +3373,7 @@
           <a:p>
             <a:fld id="{E9678507-3CFE-4A03-B562-1B8B6CB373E1}" type="datetimeFigureOut">
               <a:rPr lang="es-VE" smtClean="0"/>
-              <a:t>28/6/2025</a:t>
+              <a:t>29/6/2025</a:t>
             </a:fld>
             <a:endParaRPr lang="es-VE"/>
           </a:p>
@@ -3027,7 +3463,7 @@
           <a:p>
             <a:fld id="{4ECAC6D2-66BD-4570-BDCE-560FE2FDE3BB}" type="slidenum">
               <a:rPr lang="es-VE" smtClean="0"/>
-              <a:t>‹Nº›</a:t>
+              <a:t>‹#›</a:t>
             </a:fld>
             <a:endParaRPr lang="es-VE"/>
           </a:p>
@@ -3683,8 +4119,8 @@
         </p:blipFill>
         <p:spPr>
           <a:xfrm>
-            <a:off x="1055992" y="2443869"/>
-            <a:ext cx="2339591" cy="2339591"/>
+            <a:off x="937873" y="2396920"/>
+            <a:ext cx="2613596" cy="2613596"/>
           </a:xfrm>
           <a:prstGeom prst="rect">
             <a:avLst/>
@@ -3719,7 +4155,7 @@
         </p:blipFill>
         <p:spPr>
           <a:xfrm>
-            <a:off x="8810191" y="2628536"/>
+            <a:off x="8829915" y="2396920"/>
             <a:ext cx="2339590" cy="2339590"/>
           </a:xfrm>
           <a:prstGeom prst="rect">
@@ -3756,8 +4192,8 @@
         </p:blipFill>
         <p:spPr>
           <a:xfrm>
-            <a:off x="4933092" y="2628536"/>
-            <a:ext cx="2339590" cy="1944086"/>
+            <a:off x="6221663" y="2466691"/>
+            <a:ext cx="2647625" cy="2200048"/>
           </a:xfrm>
           <a:prstGeom prst="rect">
             <a:avLst/>
@@ -3832,7 +4268,7 @@
         </p:nvSpPr>
         <p:spPr>
           <a:xfrm>
-            <a:off x="1042219" y="2259204"/>
+            <a:off x="1074876" y="1889090"/>
             <a:ext cx="2339590" cy="369332"/>
           </a:xfrm>
           <a:prstGeom prst="rect">
@@ -3869,7 +4305,7 @@
         </p:nvSpPr>
         <p:spPr>
           <a:xfrm>
-            <a:off x="4933092" y="2120704"/>
+            <a:off x="6375681" y="1889088"/>
             <a:ext cx="2339590" cy="646331"/>
           </a:xfrm>
           <a:prstGeom prst="rect">
@@ -3913,7 +4349,7 @@
         </p:nvSpPr>
         <p:spPr>
           <a:xfrm>
-            <a:off x="8682615" y="2259203"/>
+            <a:off x="8829075" y="1894947"/>
             <a:ext cx="2339590" cy="369332"/>
           </a:xfrm>
           <a:prstGeom prst="rect">
@@ -3972,6 +4408,90 @@
           </a:p>
         </p:txBody>
       </p:sp>
+      <p:sp>
+        <p:nvSpPr>
+          <p:cNvPr id="2" name="CuadroTexto 11">
+            <a:extLst>
+              <a:ext uri="{FF2B5EF4-FFF2-40B4-BE49-F238E27FC236}">
+                <a16:creationId xmlns:a16="http://schemas.microsoft.com/office/drawing/2014/main" id="{EC3E7538-0FCA-38AE-C757-CBB929519166}"/>
+              </a:ext>
+            </a:extLst>
+          </p:cNvPr>
+          <p:cNvSpPr txBox="1"/>
+          <p:nvPr/>
+        </p:nvSpPr>
+        <p:spPr>
+          <a:xfrm>
+            <a:off x="3968971" y="1889089"/>
+            <a:ext cx="1865979" cy="646331"/>
+          </a:xfrm>
+          <a:prstGeom prst="rect">
+            <a:avLst/>
+          </a:prstGeom>
+          <a:noFill/>
+        </p:spPr>
+        <p:txBody>
+          <a:bodyPr wrap="square" rtlCol="0">
+            <a:spAutoFit/>
+          </a:bodyPr>
+          <a:lstStyle/>
+          <a:p>
+            <a:pPr algn="ctr"/>
+            <a:r>
+              <a:rPr lang="es-ES" dirty="0"/>
+              <a:t>Representantes/Autorizados</a:t>
+            </a:r>
+            <a:endParaRPr lang="es-VE" dirty="0"/>
+          </a:p>
+        </p:txBody>
+      </p:sp>
+      <p:pic>
+        <p:nvPicPr>
+          <p:cNvPr id="1026" name="Picture 2" descr="Adult And Silhouettes Png - Adult And Child Vector Clipart - Full Size ...">
+            <a:extLst>
+              <a:ext uri="{FF2B5EF4-FFF2-40B4-BE49-F238E27FC236}">
+                <a16:creationId xmlns:a16="http://schemas.microsoft.com/office/drawing/2014/main" id="{BCEC35C9-7B38-AC2C-7761-E5C5161B166D}"/>
+              </a:ext>
+            </a:extLst>
+          </p:cNvPr>
+          <p:cNvPicPr>
+            <a:picLocks noChangeAspect="1" noChangeArrowheads="1"/>
+          </p:cNvPicPr>
+          <p:nvPr/>
+        </p:nvPicPr>
+        <p:blipFill>
+          <a:blip r:embed="rId9">
+            <a:extLst>
+              <a:ext uri="{28A0092B-C50C-407E-A947-70E740481C1C}">
+                <a14:useLocalDpi xmlns:a14="http://schemas.microsoft.com/office/drawing/2010/main" val="0"/>
+              </a:ext>
+            </a:extLst>
+          </a:blip>
+          <a:srcRect/>
+          <a:stretch>
+            <a:fillRect/>
+          </a:stretch>
+        </p:blipFill>
+        <p:spPr bwMode="auto">
+          <a:xfrm>
+            <a:off x="3962735" y="2515824"/>
+            <a:ext cx="1570416" cy="2220686"/>
+          </a:xfrm>
+          <a:prstGeom prst="rect">
+            <a:avLst/>
+          </a:prstGeom>
+          <a:noFill/>
+          <a:extLst>
+            <a:ext uri="{909E8E84-426E-40DD-AFC4-6F175D3DCCD1}">
+              <a14:hiddenFill xmlns:a14="http://schemas.microsoft.com/office/drawing/2010/main">
+                <a:solidFill>
+                  <a:srgbClr val="FFFFFF"/>
+                </a:solidFill>
+              </a14:hiddenFill>
+            </a:ext>
+          </a:extLst>
+        </p:spPr>
+      </p:pic>
     </p:spTree>
     <p:extLst>
       <p:ext uri="{BB962C8B-B14F-4D97-AF65-F5344CB8AC3E}">
@@ -3990,13 +4510,7 @@
   <p:cSld>
     <p:spTree>
       <p:nvGrpSpPr>
-        <p:cNvPr id="1" name="">
-          <a:extLst>
-            <a:ext uri="{FF2B5EF4-FFF2-40B4-BE49-F238E27FC236}">
-              <a16:creationId xmlns:a16="http://schemas.microsoft.com/office/drawing/2014/main" id="{0B00AF13-3172-3399-20A2-E0EED561EE7E}"/>
-            </a:ext>
-          </a:extLst>
-        </p:cNvPr>
+        <p:cNvPr id="1" name=""/>
         <p:cNvGrpSpPr/>
         <p:nvPr/>
       </p:nvGrpSpPr>
@@ -4008,12 +4522,67 @@
           <a:chExt cx="0" cy="0"/>
         </a:xfrm>
       </p:grpSpPr>
+      <p:sp>
+        <p:nvSpPr>
+          <p:cNvPr id="4" name="Título 3">
+            <a:extLst>
+              <a:ext uri="{FF2B5EF4-FFF2-40B4-BE49-F238E27FC236}">
+                <a16:creationId xmlns:a16="http://schemas.microsoft.com/office/drawing/2014/main" id="{8ED35843-7B71-116F-5ADC-B26A6264C0E5}"/>
+              </a:ext>
+            </a:extLst>
+          </p:cNvPr>
+          <p:cNvSpPr txBox="1">
+            <a:spLocks/>
+          </p:cNvSpPr>
+          <p:nvPr/>
+        </p:nvSpPr>
+        <p:spPr>
+          <a:xfrm>
+            <a:off x="4462692" y="68313"/>
+            <a:ext cx="9144000" cy="649922"/>
+          </a:xfrm>
+          <a:prstGeom prst="rect">
+            <a:avLst/>
+          </a:prstGeom>
+        </p:spPr>
+        <p:txBody>
+          <a:bodyPr vert="horz" lIns="91440" tIns="45720" rIns="91440" bIns="45720" rtlCol="0" anchor="ctr">
+            <a:spAutoFit/>
+          </a:bodyPr>
+          <a:lstStyle>
+            <a:lvl1pPr algn="l" defTabSz="914400" rtl="0" eaLnBrk="1" latinLnBrk="0" hangingPunct="1">
+              <a:lnSpc>
+                <a:spcPct val="90000"/>
+              </a:lnSpc>
+              <a:spcBef>
+                <a:spcPct val="0"/>
+              </a:spcBef>
+              <a:buNone/>
+              <a:defRPr sz="4400" kern="1200">
+                <a:solidFill>
+                  <a:schemeClr val="tx1"/>
+                </a:solidFill>
+                <a:latin typeface="+mj-lt"/>
+                <a:ea typeface="+mj-ea"/>
+                <a:cs typeface="+mj-cs"/>
+              </a:defRPr>
+            </a:lvl1pPr>
+          </a:lstStyle>
+          <a:p>
+            <a:r>
+              <a:rPr lang="es-ES" sz="4000" b="1" dirty="0"/>
+              <a:t>Estudiantes</a:t>
+            </a:r>
+            <a:endParaRPr lang="es-VE" sz="4000" b="1" dirty="0"/>
+          </a:p>
+        </p:txBody>
+      </p:sp>
       <p:pic>
         <p:nvPicPr>
-          <p:cNvPr id="5" name="Gráfico 4" descr="Birrete con relleno sólido">
-            <a:extLst>
-              <a:ext uri="{FF2B5EF4-FFF2-40B4-BE49-F238E27FC236}">
-                <a16:creationId xmlns:a16="http://schemas.microsoft.com/office/drawing/2014/main" id="{02D93500-A26B-2470-D10E-6E27CF9BD39E}"/>
+          <p:cNvPr id="5" name="Gráfico 2" descr="Lupa con relleno sólido">
+            <a:extLst>
+              <a:ext uri="{FF2B5EF4-FFF2-40B4-BE49-F238E27FC236}">
+                <a16:creationId xmlns:a16="http://schemas.microsoft.com/office/drawing/2014/main" id="{C110DF1D-8C29-164E-DD29-CF5B74D63183}"/>
               </a:ext>
             </a:extLst>
           </p:cNvPr>
@@ -4023,83 +4592,10 @@
           <p:nvPr/>
         </p:nvPicPr>
         <p:blipFill>
-          <a:blip r:embed="rId2">
+          <a:blip r:embed="rId3">
             <a:extLst>
               <a:ext uri="{96DAC541-7B7A-43D3-8B79-37D633B846F1}">
-                <asvg:svgBlip xmlns:asvg="http://schemas.microsoft.com/office/drawing/2016/SVG/main" r:embed="rId3"/>
-              </a:ext>
-            </a:extLst>
-          </a:blip>
-          <a:srcRect t="22063" b="23093"/>
-          <a:stretch>
-            <a:fillRect/>
-          </a:stretch>
-        </p:blipFill>
-        <p:spPr>
-          <a:xfrm>
-            <a:off x="0" y="0"/>
-            <a:ext cx="2339591" cy="1283109"/>
-          </a:xfrm>
-          <a:prstGeom prst="rect">
-            <a:avLst/>
-          </a:prstGeom>
-        </p:spPr>
-      </p:pic>
-      <p:sp>
-        <p:nvSpPr>
-          <p:cNvPr id="4" name="Título 3">
-            <a:extLst>
-              <a:ext uri="{FF2B5EF4-FFF2-40B4-BE49-F238E27FC236}">
-                <a16:creationId xmlns:a16="http://schemas.microsoft.com/office/drawing/2014/main" id="{2A12726C-BCA1-CB6C-74CE-A0A9D245BE64}"/>
-              </a:ext>
-            </a:extLst>
-          </p:cNvPr>
-          <p:cNvSpPr>
-            <a:spLocks noGrp="1"/>
-          </p:cNvSpPr>
-          <p:nvPr>
-            <p:ph type="ctrTitle"/>
-          </p:nvPr>
-        </p:nvSpPr>
-        <p:spPr>
-          <a:xfrm>
-            <a:off x="1524000" y="0"/>
-            <a:ext cx="9144000" cy="649922"/>
-          </a:xfrm>
-        </p:spPr>
-        <p:txBody>
-          <a:bodyPr>
-            <a:spAutoFit/>
-          </a:bodyPr>
-          <a:lstStyle/>
-          <a:p>
-            <a:r>
-              <a:rPr lang="es-ES" sz="4000" b="1" dirty="0"/>
-              <a:t>Estudiantes</a:t>
-            </a:r>
-            <a:endParaRPr lang="es-VE" sz="4000" b="1" dirty="0"/>
-          </a:p>
-        </p:txBody>
-      </p:sp>
-      <p:pic>
-        <p:nvPicPr>
-          <p:cNvPr id="3" name="Gráfico 2" descr="Lupa con relleno sólido">
-            <a:extLst>
-              <a:ext uri="{FF2B5EF4-FFF2-40B4-BE49-F238E27FC236}">
-                <a16:creationId xmlns:a16="http://schemas.microsoft.com/office/drawing/2014/main" id="{CD6110E7-2B7A-5BE9-94AF-0068ADBD7273}"/>
-              </a:ext>
-            </a:extLst>
-          </p:cNvPr>
-          <p:cNvPicPr>
-            <a:picLocks noChangeAspect="1"/>
-          </p:cNvPicPr>
-          <p:nvPr/>
-        </p:nvPicPr>
-        <p:blipFill>
-          <a:blip r:embed="rId4">
-            <a:extLst>
-              <a:ext uri="{96DAC541-7B7A-43D3-8B79-37D633B846F1}">
-                <asvg:svgBlip xmlns:asvg="http://schemas.microsoft.com/office/drawing/2016/SVG/main" r:embed="rId5"/>
+                <asvg:svgBlip xmlns:asvg="http://schemas.microsoft.com/office/drawing/2016/SVG/main" r:embed="rId4"/>
               </a:ext>
             </a:extLst>
           </a:blip>
@@ -4109,94 +4605,72 @@
         </p:blipFill>
         <p:spPr>
           <a:xfrm>
-            <a:off x="1980956" y="2259204"/>
-            <a:ext cx="2339591" cy="2339591"/>
+            <a:off x="351555" y="1283414"/>
+            <a:ext cx="409748" cy="409748"/>
           </a:xfrm>
           <a:prstGeom prst="rect">
             <a:avLst/>
           </a:prstGeom>
         </p:spPr>
       </p:pic>
-      <p:pic>
-        <p:nvPicPr>
-          <p:cNvPr id="8" name="Gráfico 7" descr="Lápiz con relleno sólido">
-            <a:hlinkClick r:id="rId6" action="ppaction://hlinksldjump"/>
-            <a:extLst>
-              <a:ext uri="{FF2B5EF4-FFF2-40B4-BE49-F238E27FC236}">
-                <a16:creationId xmlns:a16="http://schemas.microsoft.com/office/drawing/2014/main" id="{180F2339-3652-E976-AD63-C024909C159C}"/>
-              </a:ext>
-            </a:extLst>
-          </p:cNvPr>
-          <p:cNvPicPr>
-            <a:picLocks noChangeAspect="1"/>
-          </p:cNvPicPr>
+      <p:sp>
+        <p:nvSpPr>
+          <p:cNvPr id="6" name="Rectangle 5">
+            <a:extLst>
+              <a:ext uri="{FF2B5EF4-FFF2-40B4-BE49-F238E27FC236}">
+                <a16:creationId xmlns:a16="http://schemas.microsoft.com/office/drawing/2014/main" id="{D7E74FF5-CDB5-208B-CFAB-59C7CCC6AE13}"/>
+              </a:ext>
+            </a:extLst>
+          </p:cNvPr>
+          <p:cNvSpPr/>
           <p:nvPr/>
-        </p:nvPicPr>
-        <p:blipFill>
-          <a:blip r:embed="rId7">
-            <a:extLst>
-              <a:ext uri="{96DAC541-7B7A-43D3-8B79-37D633B846F1}">
-                <asvg:svgBlip xmlns:asvg="http://schemas.microsoft.com/office/drawing/2016/SVG/main" r:embed="rId8"/>
-              </a:ext>
-            </a:extLst>
-          </a:blip>
-          <a:stretch>
-            <a:fillRect/>
-          </a:stretch>
-        </p:blipFill>
-        <p:spPr>
-          <a:xfrm>
-            <a:off x="7871454" y="2321878"/>
-            <a:ext cx="2339590" cy="2339590"/>
-          </a:xfrm>
-          <a:prstGeom prst="rect">
-            <a:avLst/>
-          </a:prstGeom>
-        </p:spPr>
-      </p:pic>
-      <p:sp>
-        <p:nvSpPr>
-          <p:cNvPr id="14" name="CuadroTexto 13">
-            <a:extLst>
-              <a:ext uri="{FF2B5EF4-FFF2-40B4-BE49-F238E27FC236}">
-                <a16:creationId xmlns:a16="http://schemas.microsoft.com/office/drawing/2014/main" id="{06B073FD-B11B-8DBE-7BFB-D8A98C421F3F}"/>
-              </a:ext>
-            </a:extLst>
-          </p:cNvPr>
-          <p:cNvSpPr txBox="1"/>
-          <p:nvPr/>
-        </p:nvSpPr>
-        <p:spPr>
-          <a:xfrm>
-            <a:off x="1980957" y="2074538"/>
-            <a:ext cx="2339590" cy="369332"/>
+        </p:nvSpPr>
+        <p:spPr>
+          <a:xfrm>
+            <a:off x="820538" y="1292843"/>
+            <a:ext cx="5616319" cy="369332"/>
           </a:xfrm>
           <a:prstGeom prst="rect">
             <a:avLst/>
           </a:prstGeom>
           <a:noFill/>
-        </p:spPr>
-        <p:txBody>
-          <a:bodyPr wrap="square" rtlCol="0">
-            <a:spAutoFit/>
-          </a:bodyPr>
+          <a:ln>
+            <a:solidFill>
+              <a:schemeClr val="tx1"/>
+            </a:solidFill>
+          </a:ln>
+        </p:spPr>
+        <p:style>
+          <a:lnRef idx="2">
+            <a:schemeClr val="accent1">
+              <a:shade val="15000"/>
+            </a:schemeClr>
+          </a:lnRef>
+          <a:fillRef idx="1">
+            <a:schemeClr val="accent1"/>
+          </a:fillRef>
+          <a:effectRef idx="0">
+            <a:schemeClr val="accent1"/>
+          </a:effectRef>
+          <a:fontRef idx="minor">
+            <a:schemeClr val="lt1"/>
+          </a:fontRef>
+        </p:style>
+        <p:txBody>
+          <a:bodyPr rtlCol="0" anchor="ctr"/>
           <a:lstStyle/>
           <a:p>
             <a:pPr algn="ctr"/>
-            <a:r>
-              <a:rPr lang="es-ES" dirty="0"/>
-              <a:t>Búsqueda</a:t>
-            </a:r>
-            <a:endParaRPr lang="es-VE" dirty="0"/>
-          </a:p>
-        </p:txBody>
-      </p:sp>
-      <p:sp>
-        <p:nvSpPr>
-          <p:cNvPr id="15" name="CuadroTexto 14">
-            <a:extLst>
-              <a:ext uri="{FF2B5EF4-FFF2-40B4-BE49-F238E27FC236}">
-                <a16:creationId xmlns:a16="http://schemas.microsoft.com/office/drawing/2014/main" id="{61CFB70F-D2A7-C588-6983-D988EFF066B8}"/>
+            <a:endParaRPr lang="en-US"/>
+          </a:p>
+        </p:txBody>
+      </p:sp>
+      <p:sp>
+        <p:nvSpPr>
+          <p:cNvPr id="7" name="CuadroTexto 13">
+            <a:extLst>
+              <a:ext uri="{FF2B5EF4-FFF2-40B4-BE49-F238E27FC236}">
+                <a16:creationId xmlns:a16="http://schemas.microsoft.com/office/drawing/2014/main" id="{6E242639-9563-BE38-7436-593AFDDA3690}"/>
               </a:ext>
             </a:extLst>
           </p:cNvPr>
@@ -4205,7 +4679,7 @@
         </p:nvSpPr>
         <p:spPr>
           <a:xfrm>
-            <a:off x="7871453" y="2074538"/>
+            <a:off x="351555" y="1333259"/>
             <a:ext cx="2339590" cy="369332"/>
           </a:xfrm>
           <a:prstGeom prst="rect">
@@ -4222,7 +4696,7 @@
             <a:pPr algn="ctr"/>
             <a:r>
               <a:rPr lang="es-ES" dirty="0"/>
-              <a:t>Inscripción</a:t>
+              <a:t>Búsqueda</a:t>
             </a:r>
             <a:endParaRPr lang="es-VE" dirty="0"/>
           </a:p>
@@ -4230,11 +4704,10 @@
       </p:sp>
       <p:sp>
         <p:nvSpPr>
-          <p:cNvPr id="16" name="Rectángulo: esquinas redondeadas 15">
-            <a:hlinkClick r:id="rId9" action="ppaction://hlinksldjump"/>
-            <a:extLst>
-              <a:ext uri="{FF2B5EF4-FFF2-40B4-BE49-F238E27FC236}">
-                <a16:creationId xmlns:a16="http://schemas.microsoft.com/office/drawing/2014/main" id="{55320127-8AE8-5916-1FCC-871B8615B4AB}"/>
+          <p:cNvPr id="8" name="Rectángulo 8">
+            <a:extLst>
+              <a:ext uri="{FF2B5EF4-FFF2-40B4-BE49-F238E27FC236}">
+                <a16:creationId xmlns:a16="http://schemas.microsoft.com/office/drawing/2014/main" id="{311018B1-EC6B-BDA2-B7AC-2AB4BD21E5B4}"/>
               </a:ext>
             </a:extLst>
           </p:cNvPr>
@@ -4243,10 +4716,155 @@
         </p:nvSpPr>
         <p:spPr>
           <a:xfrm>
-            <a:off x="1980956" y="4598795"/>
-            <a:ext cx="2339591" cy="636882"/>
-          </a:xfrm>
-          <a:prstGeom prst="roundRect">
+            <a:off x="461238" y="1941441"/>
+            <a:ext cx="11269523" cy="4397531"/>
+          </a:xfrm>
+          <a:prstGeom prst="rect">
+            <a:avLst/>
+          </a:prstGeom>
+        </p:spPr>
+        <p:style>
+          <a:lnRef idx="2">
+            <a:schemeClr val="dk1"/>
+          </a:lnRef>
+          <a:fillRef idx="1">
+            <a:schemeClr val="lt1"/>
+          </a:fillRef>
+          <a:effectRef idx="0">
+            <a:schemeClr val="dk1"/>
+          </a:effectRef>
+          <a:fontRef idx="minor">
+            <a:schemeClr val="dk1"/>
+          </a:fontRef>
+        </p:style>
+        <p:txBody>
+          <a:bodyPr rtlCol="0" anchor="ctr"/>
+          <a:lstStyle/>
+          <a:p>
+            <a:pPr algn="ctr"/>
+            <a:endParaRPr lang="es-VE" dirty="0"/>
+          </a:p>
+        </p:txBody>
+      </p:sp>
+      <p:grpSp>
+        <p:nvGrpSpPr>
+          <p:cNvPr id="9" name="Grupo 4">
+            <a:extLst>
+              <a:ext uri="{FF2B5EF4-FFF2-40B4-BE49-F238E27FC236}">
+                <a16:creationId xmlns:a16="http://schemas.microsoft.com/office/drawing/2014/main" id="{89180801-7260-E39D-1E34-D5AFACD3399B}"/>
+              </a:ext>
+            </a:extLst>
+          </p:cNvPr>
+          <p:cNvGrpSpPr/>
+          <p:nvPr/>
+        </p:nvGrpSpPr>
+        <p:grpSpPr>
+          <a:xfrm>
+            <a:off x="480399" y="1941441"/>
+            <a:ext cx="1617910" cy="1559606"/>
+            <a:chOff x="862780" y="190737"/>
+            <a:chExt cx="1637071" cy="1578077"/>
+          </a:xfrm>
+        </p:grpSpPr>
+        <p:sp>
+          <p:nvSpPr>
+            <p:cNvPr id="10" name="Rectángulo 5">
+              <a:extLst>
+                <a:ext uri="{FF2B5EF4-FFF2-40B4-BE49-F238E27FC236}">
+                  <a16:creationId xmlns:a16="http://schemas.microsoft.com/office/drawing/2014/main" id="{CF57DEF9-CC8A-682C-9C0E-4F223A0A6EB3}"/>
+                </a:ext>
+              </a:extLst>
+            </p:cNvPr>
+            <p:cNvSpPr/>
+            <p:nvPr/>
+          </p:nvSpPr>
+          <p:spPr>
+            <a:xfrm>
+              <a:off x="862780" y="190737"/>
+              <a:ext cx="1637071" cy="1578077"/>
+            </a:xfrm>
+            <a:prstGeom prst="rect">
+              <a:avLst/>
+            </a:prstGeom>
+          </p:spPr>
+          <p:style>
+            <a:lnRef idx="2">
+              <a:schemeClr val="dk1"/>
+            </a:lnRef>
+            <a:fillRef idx="1">
+              <a:schemeClr val="lt1"/>
+            </a:fillRef>
+            <a:effectRef idx="0">
+              <a:schemeClr val="dk1"/>
+            </a:effectRef>
+            <a:fontRef idx="minor">
+              <a:schemeClr val="dk1"/>
+            </a:fontRef>
+          </p:style>
+          <p:txBody>
+            <a:bodyPr rtlCol="0" anchor="ctr"/>
+            <a:lstStyle/>
+            <a:p>
+              <a:pPr algn="ctr"/>
+              <a:endParaRPr lang="es-VE"/>
+            </a:p>
+          </p:txBody>
+        </p:sp>
+        <p:pic>
+          <p:nvPicPr>
+            <p:cNvPr id="11" name="Gráfico 6" descr="Contorno de cara riendo con relleno sólido">
+              <a:extLst>
+                <a:ext uri="{FF2B5EF4-FFF2-40B4-BE49-F238E27FC236}">
+                  <a16:creationId xmlns:a16="http://schemas.microsoft.com/office/drawing/2014/main" id="{4578A14D-D25C-297B-3744-6DEAF73980EC}"/>
+                </a:ext>
+              </a:extLst>
+            </p:cNvPr>
+            <p:cNvPicPr>
+              <a:picLocks noChangeAspect="1"/>
+            </p:cNvPicPr>
+            <p:nvPr/>
+          </p:nvPicPr>
+          <p:blipFill>
+            <a:blip r:embed="rId5">
+              <a:extLst>
+                <a:ext uri="{96DAC541-7B7A-43D3-8B79-37D633B846F1}">
+                  <asvg:svgBlip xmlns:asvg="http://schemas.microsoft.com/office/drawing/2016/SVG/main" r:embed="rId6"/>
+                </a:ext>
+              </a:extLst>
+            </a:blip>
+            <a:stretch>
+              <a:fillRect/>
+            </a:stretch>
+          </p:blipFill>
+          <p:spPr>
+            <a:xfrm>
+              <a:off x="1224115" y="522575"/>
+              <a:ext cx="914400" cy="914400"/>
+            </a:xfrm>
+            <a:prstGeom prst="rect">
+              <a:avLst/>
+            </a:prstGeom>
+          </p:spPr>
+        </p:pic>
+      </p:grpSp>
+      <p:sp>
+        <p:nvSpPr>
+          <p:cNvPr id="12" name="Rectángulo 9">
+            <a:extLst>
+              <a:ext uri="{FF2B5EF4-FFF2-40B4-BE49-F238E27FC236}">
+                <a16:creationId xmlns:a16="http://schemas.microsoft.com/office/drawing/2014/main" id="{8387780E-FFC4-8D76-8F4D-B7857A570258}"/>
+              </a:ext>
+            </a:extLst>
+          </p:cNvPr>
+          <p:cNvSpPr/>
+          <p:nvPr/>
+        </p:nvSpPr>
+        <p:spPr>
+          <a:xfrm>
+            <a:off x="2098308" y="1956300"/>
+            <a:ext cx="5844223" cy="1559607"/>
+          </a:xfrm>
+          <a:prstGeom prst="rect">
             <a:avLst/>
           </a:prstGeom>
         </p:spPr>
@@ -4271,19 +4889,119 @@
             <a:pPr algn="ctr"/>
             <a:r>
               <a:rPr lang="es-ES" dirty="0"/>
-              <a:t>Estudiante</a:t>
+              <a:t>DATOS</a:t>
             </a:r>
             <a:endParaRPr lang="es-VE" dirty="0"/>
           </a:p>
         </p:txBody>
       </p:sp>
-      <p:sp>
-        <p:nvSpPr>
-          <p:cNvPr id="17" name="Rectángulo: esquinas redondeadas 16">
-            <a:hlinkClick r:id="rId10" action="ppaction://hlinksldjump"/>
-            <a:extLst>
-              <a:ext uri="{FF2B5EF4-FFF2-40B4-BE49-F238E27FC236}">
-                <a16:creationId xmlns:a16="http://schemas.microsoft.com/office/drawing/2014/main" id="{3F2C384F-CE40-13BC-1DF7-2C2AC38ABAFE}"/>
+      <p:grpSp>
+        <p:nvGrpSpPr>
+          <p:cNvPr id="13" name="Grupo 10">
+            <a:extLst>
+              <a:ext uri="{FF2B5EF4-FFF2-40B4-BE49-F238E27FC236}">
+                <a16:creationId xmlns:a16="http://schemas.microsoft.com/office/drawing/2014/main" id="{8AEB81B6-E92F-3DE2-3403-77F0769BB89C}"/>
+              </a:ext>
+            </a:extLst>
+          </p:cNvPr>
+          <p:cNvGrpSpPr/>
+          <p:nvPr/>
+        </p:nvGrpSpPr>
+        <p:grpSpPr>
+          <a:xfrm>
+            <a:off x="458628" y="3475368"/>
+            <a:ext cx="1639681" cy="1425805"/>
+            <a:chOff x="862780" y="190737"/>
+            <a:chExt cx="1637071" cy="1578077"/>
+          </a:xfrm>
+        </p:grpSpPr>
+        <p:sp>
+          <p:nvSpPr>
+            <p:cNvPr id="14" name="Rectángulo 11">
+              <a:extLst>
+                <a:ext uri="{FF2B5EF4-FFF2-40B4-BE49-F238E27FC236}">
+                  <a16:creationId xmlns:a16="http://schemas.microsoft.com/office/drawing/2014/main" id="{366274C7-6429-228C-9BD4-15656E220C34}"/>
+                </a:ext>
+              </a:extLst>
+            </p:cNvPr>
+            <p:cNvSpPr/>
+            <p:nvPr/>
+          </p:nvSpPr>
+          <p:spPr>
+            <a:xfrm>
+              <a:off x="862780" y="190737"/>
+              <a:ext cx="1637071" cy="1578077"/>
+            </a:xfrm>
+            <a:prstGeom prst="rect">
+              <a:avLst/>
+            </a:prstGeom>
+          </p:spPr>
+          <p:style>
+            <a:lnRef idx="2">
+              <a:schemeClr val="dk1"/>
+            </a:lnRef>
+            <a:fillRef idx="1">
+              <a:schemeClr val="lt1"/>
+            </a:fillRef>
+            <a:effectRef idx="0">
+              <a:schemeClr val="dk1"/>
+            </a:effectRef>
+            <a:fontRef idx="minor">
+              <a:schemeClr val="dk1"/>
+            </a:fontRef>
+          </p:style>
+          <p:txBody>
+            <a:bodyPr rtlCol="0" anchor="ctr"/>
+            <a:lstStyle/>
+            <a:p>
+              <a:pPr algn="ctr"/>
+              <a:endParaRPr lang="es-VE"/>
+            </a:p>
+          </p:txBody>
+        </p:sp>
+        <p:pic>
+          <p:nvPicPr>
+            <p:cNvPr id="15" name="Gráfico 13" descr="Contorno de cara riendo con relleno sólido">
+              <a:extLst>
+                <a:ext uri="{FF2B5EF4-FFF2-40B4-BE49-F238E27FC236}">
+                  <a16:creationId xmlns:a16="http://schemas.microsoft.com/office/drawing/2014/main" id="{5D1A8AE0-CEA7-33AB-563A-EDA073B1F33D}"/>
+                </a:ext>
+              </a:extLst>
+            </p:cNvPr>
+            <p:cNvPicPr>
+              <a:picLocks noChangeAspect="1"/>
+            </p:cNvPicPr>
+            <p:nvPr/>
+          </p:nvPicPr>
+          <p:blipFill>
+            <a:blip r:embed="rId5">
+              <a:extLst>
+                <a:ext uri="{96DAC541-7B7A-43D3-8B79-37D633B846F1}">
+                  <asvg:svgBlip xmlns:asvg="http://schemas.microsoft.com/office/drawing/2016/SVG/main" r:embed="rId6"/>
+                </a:ext>
+              </a:extLst>
+            </a:blip>
+            <a:stretch>
+              <a:fillRect/>
+            </a:stretch>
+          </p:blipFill>
+          <p:spPr>
+            <a:xfrm>
+              <a:off x="1224115" y="522575"/>
+              <a:ext cx="914400" cy="914400"/>
+            </a:xfrm>
+            <a:prstGeom prst="rect">
+              <a:avLst/>
+            </a:prstGeom>
+          </p:spPr>
+        </p:pic>
+      </p:grpSp>
+      <p:sp>
+        <p:nvSpPr>
+          <p:cNvPr id="16" name="Rectángulo 15">
+            <a:extLst>
+              <a:ext uri="{FF2B5EF4-FFF2-40B4-BE49-F238E27FC236}">
+                <a16:creationId xmlns:a16="http://schemas.microsoft.com/office/drawing/2014/main" id="{3A7BE2F3-876E-7973-1DE7-47D3B291E2DC}"/>
               </a:ext>
             </a:extLst>
           </p:cNvPr>
@@ -4292,10 +5010,10 @@
         </p:nvSpPr>
         <p:spPr>
           <a:xfrm>
-            <a:off x="1980955" y="5324167"/>
-            <a:ext cx="2339591" cy="636882"/>
-          </a:xfrm>
-          <a:prstGeom prst="roundRect">
+            <a:off x="2098310" y="3475367"/>
+            <a:ext cx="5844223" cy="1507134"/>
+          </a:xfrm>
+          <a:prstGeom prst="rect">
             <a:avLst/>
           </a:prstGeom>
         </p:spPr>
@@ -4320,7 +5038,686 @@
             <a:pPr algn="ctr"/>
             <a:r>
               <a:rPr lang="es-ES" dirty="0"/>
-              <a:t>Representante</a:t>
+              <a:t>DATOS</a:t>
+            </a:r>
+            <a:endParaRPr lang="es-VE" dirty="0"/>
+          </a:p>
+        </p:txBody>
+      </p:sp>
+      <p:grpSp>
+        <p:nvGrpSpPr>
+          <p:cNvPr id="17" name="Grupo 16">
+            <a:extLst>
+              <a:ext uri="{FF2B5EF4-FFF2-40B4-BE49-F238E27FC236}">
+                <a16:creationId xmlns:a16="http://schemas.microsoft.com/office/drawing/2014/main" id="{D1E5BEEF-896F-C8CD-8ADB-9D1B39CD56D1}"/>
+              </a:ext>
+            </a:extLst>
+          </p:cNvPr>
+          <p:cNvGrpSpPr/>
+          <p:nvPr/>
+        </p:nvGrpSpPr>
+        <p:grpSpPr>
+          <a:xfrm>
+            <a:off x="458629" y="4913167"/>
+            <a:ext cx="1639681" cy="1425805"/>
+            <a:chOff x="862780" y="190737"/>
+            <a:chExt cx="1637071" cy="1578077"/>
+          </a:xfrm>
+        </p:grpSpPr>
+        <p:sp>
+          <p:nvSpPr>
+            <p:cNvPr id="18" name="Rectángulo 19">
+              <a:extLst>
+                <a:ext uri="{FF2B5EF4-FFF2-40B4-BE49-F238E27FC236}">
+                  <a16:creationId xmlns:a16="http://schemas.microsoft.com/office/drawing/2014/main" id="{50BB673A-E8B5-3C0C-867B-21A65659C9C6}"/>
+                </a:ext>
+              </a:extLst>
+            </p:cNvPr>
+            <p:cNvSpPr/>
+            <p:nvPr/>
+          </p:nvSpPr>
+          <p:spPr>
+            <a:xfrm>
+              <a:off x="862780" y="190737"/>
+              <a:ext cx="1637071" cy="1578077"/>
+            </a:xfrm>
+            <a:prstGeom prst="rect">
+              <a:avLst/>
+            </a:prstGeom>
+          </p:spPr>
+          <p:style>
+            <a:lnRef idx="2">
+              <a:schemeClr val="dk1"/>
+            </a:lnRef>
+            <a:fillRef idx="1">
+              <a:schemeClr val="lt1"/>
+            </a:fillRef>
+            <a:effectRef idx="0">
+              <a:schemeClr val="dk1"/>
+            </a:effectRef>
+            <a:fontRef idx="minor">
+              <a:schemeClr val="dk1"/>
+            </a:fontRef>
+          </p:style>
+          <p:txBody>
+            <a:bodyPr rtlCol="0" anchor="ctr"/>
+            <a:lstStyle/>
+            <a:p>
+              <a:pPr algn="ctr"/>
+              <a:endParaRPr lang="es-VE"/>
+            </a:p>
+          </p:txBody>
+        </p:sp>
+        <p:pic>
+          <p:nvPicPr>
+            <p:cNvPr id="19" name="Gráfico 20" descr="Contorno de cara riendo con relleno sólido">
+              <a:extLst>
+                <a:ext uri="{FF2B5EF4-FFF2-40B4-BE49-F238E27FC236}">
+                  <a16:creationId xmlns:a16="http://schemas.microsoft.com/office/drawing/2014/main" id="{83A8C720-8B8D-527B-A010-7B218F473837}"/>
+                </a:ext>
+              </a:extLst>
+            </p:cNvPr>
+            <p:cNvPicPr>
+              <a:picLocks noChangeAspect="1"/>
+            </p:cNvPicPr>
+            <p:nvPr/>
+          </p:nvPicPr>
+          <p:blipFill>
+            <a:blip r:embed="rId5">
+              <a:extLst>
+                <a:ext uri="{96DAC541-7B7A-43D3-8B79-37D633B846F1}">
+                  <asvg:svgBlip xmlns:asvg="http://schemas.microsoft.com/office/drawing/2016/SVG/main" r:embed="rId6"/>
+                </a:ext>
+              </a:extLst>
+            </a:blip>
+            <a:stretch>
+              <a:fillRect/>
+            </a:stretch>
+          </p:blipFill>
+          <p:spPr>
+            <a:xfrm>
+              <a:off x="1224115" y="522575"/>
+              <a:ext cx="914400" cy="914400"/>
+            </a:xfrm>
+            <a:prstGeom prst="rect">
+              <a:avLst/>
+            </a:prstGeom>
+          </p:spPr>
+        </p:pic>
+      </p:grpSp>
+      <p:sp>
+        <p:nvSpPr>
+          <p:cNvPr id="20" name="Rectángulo 21">
+            <a:extLst>
+              <a:ext uri="{FF2B5EF4-FFF2-40B4-BE49-F238E27FC236}">
+                <a16:creationId xmlns:a16="http://schemas.microsoft.com/office/drawing/2014/main" id="{E3AAC181-BDA6-322B-DFBC-3D507B8D7F9A}"/>
+              </a:ext>
+            </a:extLst>
+          </p:cNvPr>
+          <p:cNvSpPr/>
+          <p:nvPr/>
+        </p:nvSpPr>
+        <p:spPr>
+          <a:xfrm>
+            <a:off x="2098310" y="4913168"/>
+            <a:ext cx="5844223" cy="1425804"/>
+          </a:xfrm>
+          <a:prstGeom prst="rect">
+            <a:avLst/>
+          </a:prstGeom>
+        </p:spPr>
+        <p:style>
+          <a:lnRef idx="2">
+            <a:schemeClr val="accent1"/>
+          </a:lnRef>
+          <a:fillRef idx="1">
+            <a:schemeClr val="lt1"/>
+          </a:fillRef>
+          <a:effectRef idx="0">
+            <a:schemeClr val="accent1"/>
+          </a:effectRef>
+          <a:fontRef idx="minor">
+            <a:schemeClr val="dk1"/>
+          </a:fontRef>
+        </p:style>
+        <p:txBody>
+          <a:bodyPr rtlCol="0" anchor="ctr"/>
+          <a:lstStyle/>
+          <a:p>
+            <a:pPr algn="ctr"/>
+            <a:r>
+              <a:rPr lang="es-ES" dirty="0"/>
+              <a:t>DATOS</a:t>
+            </a:r>
+            <a:endParaRPr lang="es-VE" dirty="0"/>
+          </a:p>
+        </p:txBody>
+      </p:sp>
+      <p:sp>
+        <p:nvSpPr>
+          <p:cNvPr id="22" name="Rectángulo: esquinas redondeadas 31">
+            <a:hlinkClick r:id="rId7" action="ppaction://hlinksldjump"/>
+            <a:extLst>
+              <a:ext uri="{FF2B5EF4-FFF2-40B4-BE49-F238E27FC236}">
+                <a16:creationId xmlns:a16="http://schemas.microsoft.com/office/drawing/2014/main" id="{149D11AA-4100-E818-FCEF-8F4DC653B0E2}"/>
+              </a:ext>
+            </a:extLst>
+          </p:cNvPr>
+          <p:cNvSpPr/>
+          <p:nvPr/>
+        </p:nvSpPr>
+        <p:spPr>
+          <a:xfrm>
+            <a:off x="8593918" y="5297043"/>
+            <a:ext cx="1061885" cy="383458"/>
+          </a:xfrm>
+          <a:prstGeom prst="roundRect">
+            <a:avLst/>
+          </a:prstGeom>
+        </p:spPr>
+        <p:style>
+          <a:lnRef idx="2">
+            <a:schemeClr val="dk1"/>
+          </a:lnRef>
+          <a:fillRef idx="1">
+            <a:schemeClr val="lt1"/>
+          </a:fillRef>
+          <a:effectRef idx="0">
+            <a:schemeClr val="dk1"/>
+          </a:effectRef>
+          <a:fontRef idx="minor">
+            <a:schemeClr val="dk1"/>
+          </a:fontRef>
+        </p:style>
+        <p:txBody>
+          <a:bodyPr rtlCol="0" anchor="ctr"/>
+          <a:lstStyle/>
+          <a:p>
+            <a:pPr algn="ctr"/>
+            <a:r>
+              <a:rPr lang="es-ES" dirty="0"/>
+              <a:t>Ver</a:t>
+            </a:r>
+            <a:endParaRPr lang="es-VE" dirty="0"/>
+          </a:p>
+        </p:txBody>
+      </p:sp>
+      <p:sp>
+        <p:nvSpPr>
+          <p:cNvPr id="23" name="Rectángulo: esquinas redondeadas 32">
+            <a:hlinkClick r:id="rId7" action="ppaction://hlinksldjump"/>
+            <a:extLst>
+              <a:ext uri="{FF2B5EF4-FFF2-40B4-BE49-F238E27FC236}">
+                <a16:creationId xmlns:a16="http://schemas.microsoft.com/office/drawing/2014/main" id="{216275AF-5962-6EF4-6F76-4C79B3FAC982}"/>
+              </a:ext>
+            </a:extLst>
+          </p:cNvPr>
+          <p:cNvSpPr/>
+          <p:nvPr/>
+        </p:nvSpPr>
+        <p:spPr>
+          <a:xfrm>
+            <a:off x="10307188" y="5779202"/>
+            <a:ext cx="1061885" cy="383458"/>
+          </a:xfrm>
+          <a:prstGeom prst="roundRect">
+            <a:avLst/>
+          </a:prstGeom>
+        </p:spPr>
+        <p:style>
+          <a:lnRef idx="2">
+            <a:schemeClr val="dk1"/>
+          </a:lnRef>
+          <a:fillRef idx="1">
+            <a:schemeClr val="lt1"/>
+          </a:fillRef>
+          <a:effectRef idx="0">
+            <a:schemeClr val="dk1"/>
+          </a:effectRef>
+          <a:fontRef idx="minor">
+            <a:schemeClr val="dk1"/>
+          </a:fontRef>
+        </p:style>
+        <p:txBody>
+          <a:bodyPr rtlCol="0" anchor="ctr"/>
+          <a:lstStyle/>
+          <a:p>
+            <a:pPr algn="ctr"/>
+            <a:r>
+              <a:rPr lang="es-ES" dirty="0"/>
+              <a:t>Editar</a:t>
+            </a:r>
+            <a:endParaRPr lang="es-VE" dirty="0"/>
+          </a:p>
+        </p:txBody>
+      </p:sp>
+      <p:sp>
+        <p:nvSpPr>
+          <p:cNvPr id="24" name="Rectángulo: esquinas redondeadas 31">
+            <a:hlinkClick r:id="rId7" action="ppaction://hlinksldjump"/>
+            <a:extLst>
+              <a:ext uri="{FF2B5EF4-FFF2-40B4-BE49-F238E27FC236}">
+                <a16:creationId xmlns:a16="http://schemas.microsoft.com/office/drawing/2014/main" id="{1559F2EC-CD34-CBFE-EF84-EE87B4CAFD35}"/>
+              </a:ext>
+            </a:extLst>
+          </p:cNvPr>
+          <p:cNvSpPr/>
+          <p:nvPr/>
+        </p:nvSpPr>
+        <p:spPr>
+          <a:xfrm>
+            <a:off x="8593919" y="5764860"/>
+            <a:ext cx="1061885" cy="383458"/>
+          </a:xfrm>
+          <a:prstGeom prst="roundRect">
+            <a:avLst/>
+          </a:prstGeom>
+        </p:spPr>
+        <p:style>
+          <a:lnRef idx="2">
+            <a:schemeClr val="dk1"/>
+          </a:lnRef>
+          <a:fillRef idx="1">
+            <a:schemeClr val="lt1"/>
+          </a:fillRef>
+          <a:effectRef idx="0">
+            <a:schemeClr val="dk1"/>
+          </a:effectRef>
+          <a:fontRef idx="minor">
+            <a:schemeClr val="dk1"/>
+          </a:fontRef>
+        </p:style>
+        <p:txBody>
+          <a:bodyPr rtlCol="0" anchor="ctr"/>
+          <a:lstStyle/>
+          <a:p>
+            <a:pPr algn="ctr"/>
+            <a:r>
+              <a:rPr lang="es-ES" dirty="0"/>
+              <a:t>Eliminar</a:t>
+            </a:r>
+            <a:endParaRPr lang="es-VE" dirty="0"/>
+          </a:p>
+        </p:txBody>
+      </p:sp>
+      <p:grpSp>
+        <p:nvGrpSpPr>
+          <p:cNvPr id="25" name="Grupo 10">
+            <a:extLst>
+              <a:ext uri="{FF2B5EF4-FFF2-40B4-BE49-F238E27FC236}">
+                <a16:creationId xmlns:a16="http://schemas.microsoft.com/office/drawing/2014/main" id="{7644BFD7-1B0B-44C0-1564-F4C764D5347B}"/>
+              </a:ext>
+            </a:extLst>
+          </p:cNvPr>
+          <p:cNvGrpSpPr/>
+          <p:nvPr/>
+        </p:nvGrpSpPr>
+        <p:grpSpPr>
+          <a:xfrm>
+            <a:off x="8933833" y="2469975"/>
+            <a:ext cx="1805623" cy="1670231"/>
+            <a:chOff x="862780" y="190737"/>
+            <a:chExt cx="1637071" cy="1578077"/>
+          </a:xfrm>
+        </p:grpSpPr>
+        <p:sp>
+          <p:nvSpPr>
+            <p:cNvPr id="26" name="Rectángulo 11">
+              <a:extLst>
+                <a:ext uri="{FF2B5EF4-FFF2-40B4-BE49-F238E27FC236}">
+                  <a16:creationId xmlns:a16="http://schemas.microsoft.com/office/drawing/2014/main" id="{CD4555B9-52EA-6FE0-96BE-764C8A3E39A4}"/>
+                </a:ext>
+              </a:extLst>
+            </p:cNvPr>
+            <p:cNvSpPr/>
+            <p:nvPr/>
+          </p:nvSpPr>
+          <p:spPr>
+            <a:xfrm>
+              <a:off x="862780" y="190737"/>
+              <a:ext cx="1637071" cy="1578077"/>
+            </a:xfrm>
+            <a:prstGeom prst="rect">
+              <a:avLst/>
+            </a:prstGeom>
+          </p:spPr>
+          <p:style>
+            <a:lnRef idx="2">
+              <a:schemeClr val="dk1"/>
+            </a:lnRef>
+            <a:fillRef idx="1">
+              <a:schemeClr val="lt1"/>
+            </a:fillRef>
+            <a:effectRef idx="0">
+              <a:schemeClr val="dk1"/>
+            </a:effectRef>
+            <a:fontRef idx="minor">
+              <a:schemeClr val="dk1"/>
+            </a:fontRef>
+          </p:style>
+          <p:txBody>
+            <a:bodyPr rtlCol="0" anchor="ctr"/>
+            <a:lstStyle/>
+            <a:p>
+              <a:pPr algn="ctr"/>
+              <a:endParaRPr lang="es-VE"/>
+            </a:p>
+          </p:txBody>
+        </p:sp>
+        <p:pic>
+          <p:nvPicPr>
+            <p:cNvPr id="27" name="Gráfico 13" descr="Contorno de cara riendo con relleno sólido">
+              <a:extLst>
+                <a:ext uri="{FF2B5EF4-FFF2-40B4-BE49-F238E27FC236}">
+                  <a16:creationId xmlns:a16="http://schemas.microsoft.com/office/drawing/2014/main" id="{BAD8E174-9F71-EE90-6E7F-9DF48B980031}"/>
+                </a:ext>
+              </a:extLst>
+            </p:cNvPr>
+            <p:cNvPicPr>
+              <a:picLocks noChangeAspect="1"/>
+            </p:cNvPicPr>
+            <p:nvPr/>
+          </p:nvPicPr>
+          <p:blipFill>
+            <a:blip r:embed="rId5">
+              <a:extLst>
+                <a:ext uri="{96DAC541-7B7A-43D3-8B79-37D633B846F1}">
+                  <asvg:svgBlip xmlns:asvg="http://schemas.microsoft.com/office/drawing/2016/SVG/main" r:embed="rId6"/>
+                </a:ext>
+              </a:extLst>
+            </a:blip>
+            <a:stretch>
+              <a:fillRect/>
+            </a:stretch>
+          </p:blipFill>
+          <p:spPr>
+            <a:xfrm>
+              <a:off x="1224115" y="522575"/>
+              <a:ext cx="914400" cy="914400"/>
+            </a:xfrm>
+            <a:prstGeom prst="rect">
+              <a:avLst/>
+            </a:prstGeom>
+          </p:spPr>
+        </p:pic>
+      </p:grpSp>
+      <p:sp>
+        <p:nvSpPr>
+          <p:cNvPr id="29" name="CuadroTexto 13">
+            <a:extLst>
+              <a:ext uri="{FF2B5EF4-FFF2-40B4-BE49-F238E27FC236}">
+                <a16:creationId xmlns:a16="http://schemas.microsoft.com/office/drawing/2014/main" id="{719659D0-D63E-AA8E-794F-2844F1D85951}"/>
+              </a:ext>
+            </a:extLst>
+          </p:cNvPr>
+          <p:cNvSpPr txBox="1"/>
+          <p:nvPr/>
+        </p:nvSpPr>
+        <p:spPr>
+          <a:xfrm>
+            <a:off x="8650977" y="2022575"/>
+            <a:ext cx="2339590" cy="369332"/>
+          </a:xfrm>
+          <a:prstGeom prst="rect">
+            <a:avLst/>
+          </a:prstGeom>
+          <a:noFill/>
+        </p:spPr>
+        <p:txBody>
+          <a:bodyPr wrap="square" rtlCol="0">
+            <a:spAutoFit/>
+          </a:bodyPr>
+          <a:lstStyle/>
+          <a:p>
+            <a:pPr algn="ctr"/>
+            <a:r>
+              <a:rPr lang="es-ES" b="1" dirty="0"/>
+              <a:t>Selección</a:t>
+            </a:r>
+            <a:endParaRPr lang="es-VE" b="1" dirty="0"/>
+          </a:p>
+        </p:txBody>
+      </p:sp>
+      <p:sp>
+        <p:nvSpPr>
+          <p:cNvPr id="30" name="Rectángulo: esquinas redondeadas 31">
+            <a:hlinkClick r:id="rId7" action="ppaction://hlinksldjump"/>
+            <a:extLst>
+              <a:ext uri="{FF2B5EF4-FFF2-40B4-BE49-F238E27FC236}">
+                <a16:creationId xmlns:a16="http://schemas.microsoft.com/office/drawing/2014/main" id="{EB5A203F-3DBC-8879-3443-D15D0D93D773}"/>
+              </a:ext>
+            </a:extLst>
+          </p:cNvPr>
+          <p:cNvSpPr/>
+          <p:nvPr/>
+        </p:nvSpPr>
+        <p:spPr>
+          <a:xfrm>
+            <a:off x="8371045" y="4267855"/>
+            <a:ext cx="2998028" cy="897983"/>
+          </a:xfrm>
+          <a:prstGeom prst="roundRect">
+            <a:avLst/>
+          </a:prstGeom>
+        </p:spPr>
+        <p:style>
+          <a:lnRef idx="2">
+            <a:schemeClr val="dk1"/>
+          </a:lnRef>
+          <a:fillRef idx="1">
+            <a:schemeClr val="lt1"/>
+          </a:fillRef>
+          <a:effectRef idx="0">
+            <a:schemeClr val="dk1"/>
+          </a:effectRef>
+          <a:fontRef idx="minor">
+            <a:schemeClr val="dk1"/>
+          </a:fontRef>
+        </p:style>
+        <p:txBody>
+          <a:bodyPr rtlCol="0" anchor="ctr"/>
+          <a:lstStyle/>
+          <a:p>
+            <a:pPr algn="ctr"/>
+            <a:r>
+              <a:rPr lang="es-ES" dirty="0"/>
+              <a:t>Datos</a:t>
+            </a:r>
+            <a:endParaRPr lang="es-VE" dirty="0"/>
+          </a:p>
+        </p:txBody>
+      </p:sp>
+      <p:sp>
+        <p:nvSpPr>
+          <p:cNvPr id="31" name="Rectángulo: esquinas redondeadas 31">
+            <a:hlinkClick r:id="rId7" action="ppaction://hlinksldjump"/>
+            <a:extLst>
+              <a:ext uri="{FF2B5EF4-FFF2-40B4-BE49-F238E27FC236}">
+                <a16:creationId xmlns:a16="http://schemas.microsoft.com/office/drawing/2014/main" id="{68AEE113-FEB8-C260-C918-244EA06C21D8}"/>
+              </a:ext>
+            </a:extLst>
+          </p:cNvPr>
+          <p:cNvSpPr/>
+          <p:nvPr/>
+        </p:nvSpPr>
+        <p:spPr>
+          <a:xfrm>
+            <a:off x="7942531" y="1304130"/>
+            <a:ext cx="2172055" cy="387174"/>
+          </a:xfrm>
+          <a:prstGeom prst="roundRect">
+            <a:avLst/>
+          </a:prstGeom>
+        </p:spPr>
+        <p:style>
+          <a:lnRef idx="2">
+            <a:schemeClr val="dk1"/>
+          </a:lnRef>
+          <a:fillRef idx="1">
+            <a:schemeClr val="lt1"/>
+          </a:fillRef>
+          <a:effectRef idx="0">
+            <a:schemeClr val="dk1"/>
+          </a:effectRef>
+          <a:fontRef idx="minor">
+            <a:schemeClr val="dk1"/>
+          </a:fontRef>
+        </p:style>
+        <p:txBody>
+          <a:bodyPr rtlCol="0" anchor="ctr"/>
+          <a:lstStyle/>
+          <a:p>
+            <a:pPr algn="ctr"/>
+            <a:r>
+              <a:rPr lang="es-ES" dirty="0"/>
+              <a:t>Añadir estudiante</a:t>
+            </a:r>
+            <a:endParaRPr lang="es-VE" dirty="0"/>
+          </a:p>
+        </p:txBody>
+      </p:sp>
+      <p:sp>
+        <p:nvSpPr>
+          <p:cNvPr id="32" name="Rectángulo: esquinas redondeadas 31">
+            <a:hlinkClick r:id="rId7" action="ppaction://hlinksldjump"/>
+            <a:extLst>
+              <a:ext uri="{FF2B5EF4-FFF2-40B4-BE49-F238E27FC236}">
+                <a16:creationId xmlns:a16="http://schemas.microsoft.com/office/drawing/2014/main" id="{9A9E929B-9FA1-06E4-8FC8-97526071E7B4}"/>
+              </a:ext>
+            </a:extLst>
+          </p:cNvPr>
+          <p:cNvSpPr/>
+          <p:nvPr/>
+        </p:nvSpPr>
+        <p:spPr>
+          <a:xfrm>
+            <a:off x="10439610" y="1317257"/>
+            <a:ext cx="1101914" cy="342062"/>
+          </a:xfrm>
+          <a:prstGeom prst="roundRect">
+            <a:avLst/>
+          </a:prstGeom>
+        </p:spPr>
+        <p:style>
+          <a:lnRef idx="2">
+            <a:schemeClr val="dk1"/>
+          </a:lnRef>
+          <a:fillRef idx="1">
+            <a:schemeClr val="lt1"/>
+          </a:fillRef>
+          <a:effectRef idx="0">
+            <a:schemeClr val="dk1"/>
+          </a:effectRef>
+          <a:fontRef idx="minor">
+            <a:schemeClr val="dk1"/>
+          </a:fontRef>
+        </p:style>
+        <p:txBody>
+          <a:bodyPr rtlCol="0" anchor="ctr"/>
+          <a:lstStyle/>
+          <a:p>
+            <a:pPr algn="ctr"/>
+            <a:r>
+              <a:rPr lang="es-ES" dirty="0"/>
+              <a:t>Exportar</a:t>
+            </a:r>
+            <a:endParaRPr lang="es-VE" dirty="0"/>
+          </a:p>
+        </p:txBody>
+      </p:sp>
+      <p:sp>
+        <p:nvSpPr>
+          <p:cNvPr id="34" name="Rectángulo: esquinas redondeadas 31">
+            <a:hlinkClick r:id="rId7" action="ppaction://hlinksldjump"/>
+            <a:extLst>
+              <a:ext uri="{FF2B5EF4-FFF2-40B4-BE49-F238E27FC236}">
+                <a16:creationId xmlns:a16="http://schemas.microsoft.com/office/drawing/2014/main" id="{0E621854-0B20-2D51-659C-A637F4393070}"/>
+              </a:ext>
+            </a:extLst>
+          </p:cNvPr>
+          <p:cNvSpPr/>
+          <p:nvPr/>
+        </p:nvSpPr>
+        <p:spPr>
+          <a:xfrm>
+            <a:off x="10318890" y="5315318"/>
+            <a:ext cx="1061885" cy="383458"/>
+          </a:xfrm>
+          <a:prstGeom prst="roundRect">
+            <a:avLst/>
+          </a:prstGeom>
+        </p:spPr>
+        <p:style>
+          <a:lnRef idx="2">
+            <a:schemeClr val="dk1"/>
+          </a:lnRef>
+          <a:fillRef idx="1">
+            <a:schemeClr val="lt1"/>
+          </a:fillRef>
+          <a:effectRef idx="0">
+            <a:schemeClr val="dk1"/>
+          </a:effectRef>
+          <a:fontRef idx="minor">
+            <a:schemeClr val="dk1"/>
+          </a:fontRef>
+        </p:style>
+        <p:txBody>
+          <a:bodyPr rtlCol="0" anchor="ctr"/>
+          <a:lstStyle/>
+          <a:p>
+            <a:pPr algn="ctr"/>
+            <a:r>
+              <a:rPr lang="es-ES" dirty="0"/>
+              <a:t>Ver Rep.</a:t>
+            </a:r>
+            <a:endParaRPr lang="es-VE" dirty="0"/>
+          </a:p>
+        </p:txBody>
+      </p:sp>
+      <p:sp>
+        <p:nvSpPr>
+          <p:cNvPr id="35" name="Rectángulo: esquinas redondeadas 31">
+            <a:hlinkClick r:id="rId7" action="ppaction://hlinksldjump"/>
+            <a:extLst>
+              <a:ext uri="{FF2B5EF4-FFF2-40B4-BE49-F238E27FC236}">
+                <a16:creationId xmlns:a16="http://schemas.microsoft.com/office/drawing/2014/main" id="{D6020349-9BC6-9279-FBF5-9328C2039ED1}"/>
+              </a:ext>
+            </a:extLst>
+          </p:cNvPr>
+          <p:cNvSpPr/>
+          <p:nvPr/>
+        </p:nvSpPr>
+        <p:spPr>
+          <a:xfrm>
+            <a:off x="6638737" y="1321677"/>
+            <a:ext cx="1101914" cy="342062"/>
+          </a:xfrm>
+          <a:prstGeom prst="roundRect">
+            <a:avLst/>
+          </a:prstGeom>
+        </p:spPr>
+        <p:style>
+          <a:lnRef idx="2">
+            <a:schemeClr val="dk1"/>
+          </a:lnRef>
+          <a:fillRef idx="1">
+            <a:schemeClr val="lt1"/>
+          </a:fillRef>
+          <a:effectRef idx="0">
+            <a:schemeClr val="dk1"/>
+          </a:effectRef>
+          <a:fontRef idx="minor">
+            <a:schemeClr val="dk1"/>
+          </a:fontRef>
+        </p:style>
+        <p:txBody>
+          <a:bodyPr rtlCol="0" anchor="ctr"/>
+          <a:lstStyle/>
+          <a:p>
+            <a:pPr algn="ctr"/>
+            <a:r>
+              <a:rPr lang="es-ES" dirty="0"/>
+              <a:t>Filtrar</a:t>
             </a:r>
             <a:endParaRPr lang="es-VE" dirty="0"/>
           </a:p>
@@ -4329,7 +5726,7 @@
     </p:spTree>
     <p:extLst>
       <p:ext uri="{BB962C8B-B14F-4D97-AF65-F5344CB8AC3E}">
-        <p14:creationId xmlns:p14="http://schemas.microsoft.com/office/powerpoint/2010/main" val="1918439319"/>
+        <p14:creationId xmlns:p14="http://schemas.microsoft.com/office/powerpoint/2010/main" val="4181796213"/>
       </p:ext>
     </p:extLst>
   </p:cSld>
@@ -7456,4 +8853,319 @@
     </a:ext>
   </a:extLst>
 </a:theme>
+</file>
+
+<file path=ppt/theme/theme2.xml><?xml version="1.0" encoding="utf-8"?>
+<a:theme xmlns:a="http://schemas.openxmlformats.org/drawingml/2006/main" name="Office Theme">
+  <a:themeElements>
+    <a:clrScheme name="Office">
+      <a:dk1>
+        <a:sysClr val="windowText" lastClr="000000"/>
+      </a:dk1>
+      <a:lt1>
+        <a:sysClr val="window" lastClr="FFFFFF"/>
+      </a:lt1>
+      <a:dk2>
+        <a:srgbClr val="0E2841"/>
+      </a:dk2>
+      <a:lt2>
+        <a:srgbClr val="E8E8E8"/>
+      </a:lt2>
+      <a:accent1>
+        <a:srgbClr val="156082"/>
+      </a:accent1>
+      <a:accent2>
+        <a:srgbClr val="E97132"/>
+      </a:accent2>
+      <a:accent3>
+        <a:srgbClr val="196B24"/>
+      </a:accent3>
+      <a:accent4>
+        <a:srgbClr val="0F9ED5"/>
+      </a:accent4>
+      <a:accent5>
+        <a:srgbClr val="A02B93"/>
+      </a:accent5>
+      <a:accent6>
+        <a:srgbClr val="4EA72E"/>
+      </a:accent6>
+      <a:hlink>
+        <a:srgbClr val="467886"/>
+      </a:hlink>
+      <a:folHlink>
+        <a:srgbClr val="96607D"/>
+      </a:folHlink>
+    </a:clrScheme>
+    <a:fontScheme name="Office">
+      <a:majorFont>
+        <a:latin typeface="Aptos Display" panose="02110004020202020204"/>
+        <a:ea typeface=""/>
+        <a:cs typeface=""/>
+        <a:font script="Jpan" typeface="游ゴシック Light"/>
+        <a:font script="Hang" typeface="맑은 고딕"/>
+        <a:font script="Hans" typeface="等线 Light"/>
+        <a:font script="Hant" typeface="新細明體"/>
+        <a:font script="Arab" typeface="Times New Roman"/>
+        <a:font script="Hebr" typeface="Times New Roman"/>
+        <a:font script="Thai" typeface="Angsana New"/>
+        <a:font script="Ethi" typeface="Nyala"/>
+        <a:font script="Beng" typeface="Vrinda"/>
+        <a:font script="Gujr" typeface="Shruti"/>
+        <a:font script="Khmr" typeface="MoolBoran"/>
+        <a:font script="Knda" typeface="Tunga"/>
+        <a:font script="Guru" typeface="Raavi"/>
+        <a:font script="Cans" typeface="Euphemia"/>
+        <a:font script="Cher" typeface="Plantagenet Cherokee"/>
+        <a:font script="Yiii" typeface="Microsoft Yi Baiti"/>
+        <a:font script="Tibt" typeface="Microsoft Himalaya"/>
+        <a:font script="Thaa" typeface="MV Boli"/>
+        <a:font script="Deva" typeface="Mangal"/>
+        <a:font script="Telu" typeface="Gautami"/>
+        <a:font script="Taml" typeface="Latha"/>
+        <a:font script="Syrc" typeface="Estrangelo Edessa"/>
+        <a:font script="Orya" typeface="Kalinga"/>
+        <a:font script="Mlym" typeface="Kartika"/>
+        <a:font script="Laoo" typeface="DokChampa"/>
+        <a:font script="Sinh" typeface="Iskoola Pota"/>
+        <a:font script="Mong" typeface="Mongolian Baiti"/>
+        <a:font script="Viet" typeface="Times New Roman"/>
+        <a:font script="Uigh" typeface="Microsoft Uighur"/>
+        <a:font script="Geor" typeface="Sylfaen"/>
+        <a:font script="Armn" typeface="Arial"/>
+        <a:font script="Bugi" typeface="Leelawadee UI"/>
+        <a:font script="Bopo" typeface="Microsoft JhengHei"/>
+        <a:font script="Java" typeface="Javanese Text"/>
+        <a:font script="Lisu" typeface="Segoe UI"/>
+        <a:font script="Mymr" typeface="Myanmar Text"/>
+        <a:font script="Nkoo" typeface="Ebrima"/>
+        <a:font script="Olck" typeface="Nirmala UI"/>
+        <a:font script="Osma" typeface="Ebrima"/>
+        <a:font script="Phag" typeface="Phagspa"/>
+        <a:font script="Syrn" typeface="Estrangelo Edessa"/>
+        <a:font script="Syrj" typeface="Estrangelo Edessa"/>
+        <a:font script="Syre" typeface="Estrangelo Edessa"/>
+        <a:font script="Sora" typeface="Nirmala UI"/>
+        <a:font script="Tale" typeface="Microsoft Tai Le"/>
+        <a:font script="Talu" typeface="Microsoft New Tai Lue"/>
+        <a:font script="Tfng" typeface="Ebrima"/>
+      </a:majorFont>
+      <a:minorFont>
+        <a:latin typeface="Aptos" panose="02110004020202020204"/>
+        <a:ea typeface=""/>
+        <a:cs typeface=""/>
+        <a:font script="Jpan" typeface="游ゴシック"/>
+        <a:font script="Hang" typeface="맑은 고딕"/>
+        <a:font script="Hans" typeface="等线"/>
+        <a:font script="Hant" typeface="新細明體"/>
+        <a:font script="Arab" typeface="Arial"/>
+        <a:font script="Hebr" typeface="Arial"/>
+        <a:font script="Thai" typeface="Cordia New"/>
+        <a:font script="Ethi" typeface="Nyala"/>
+        <a:font script="Beng" typeface="Vrinda"/>
+        <a:font script="Gujr" typeface="Shruti"/>
+        <a:font script="Khmr" typeface="DaunPenh"/>
+        <a:font script="Knda" typeface="Tunga"/>
+        <a:font script="Guru" typeface="Raavi"/>
+        <a:font script="Cans" typeface="Euphemia"/>
+        <a:font script="Cher" typeface="Plantagenet Cherokee"/>
+        <a:font script="Yiii" typeface="Microsoft Yi Baiti"/>
+        <a:font script="Tibt" typeface="Microsoft Himalaya"/>
+        <a:font script="Thaa" typeface="MV Boli"/>
+        <a:font script="Deva" typeface="Mangal"/>
+        <a:font script="Telu" typeface="Gautami"/>
+        <a:font script="Taml" typeface="Latha"/>
+        <a:font script="Syrc" typeface="Estrangelo Edessa"/>
+        <a:font script="Orya" typeface="Kalinga"/>
+        <a:font script="Mlym" typeface="Kartika"/>
+        <a:font script="Laoo" typeface="DokChampa"/>
+        <a:font script="Sinh" typeface="Iskoola Pota"/>
+        <a:font script="Mong" typeface="Mongolian Baiti"/>
+        <a:font script="Viet" typeface="Arial"/>
+        <a:font script="Uigh" typeface="Microsoft Uighur"/>
+        <a:font script="Geor" typeface="Sylfaen"/>
+        <a:font script="Armn" typeface="Arial"/>
+        <a:font script="Bugi" typeface="Leelawadee UI"/>
+        <a:font script="Bopo" typeface="Microsoft JhengHei"/>
+        <a:font script="Java" typeface="Javanese Text"/>
+        <a:font script="Lisu" typeface="Segoe UI"/>
+        <a:font script="Mymr" typeface="Myanmar Text"/>
+        <a:font script="Nkoo" typeface="Ebrima"/>
+        <a:font script="Olck" typeface="Nirmala UI"/>
+        <a:font script="Osma" typeface="Ebrima"/>
+        <a:font script="Phag" typeface="Phagspa"/>
+        <a:font script="Syrn" typeface="Estrangelo Edessa"/>
+        <a:font script="Syrj" typeface="Estrangelo Edessa"/>
+        <a:font script="Syre" typeface="Estrangelo Edessa"/>
+        <a:font script="Sora" typeface="Nirmala UI"/>
+        <a:font script="Tale" typeface="Microsoft Tai Le"/>
+        <a:font script="Talu" typeface="Microsoft New Tai Lue"/>
+        <a:font script="Tfng" typeface="Ebrima"/>
+      </a:minorFont>
+    </a:fontScheme>
+    <a:fmtScheme name="Office">
+      <a:fillStyleLst>
+        <a:solidFill>
+          <a:schemeClr val="phClr"/>
+        </a:solidFill>
+        <a:gradFill rotWithShape="1">
+          <a:gsLst>
+            <a:gs pos="0">
+              <a:schemeClr val="phClr">
+                <a:lumMod val="110000"/>
+                <a:satMod val="105000"/>
+                <a:tint val="67000"/>
+              </a:schemeClr>
+            </a:gs>
+            <a:gs pos="50000">
+              <a:schemeClr val="phClr">
+                <a:lumMod val="105000"/>
+                <a:satMod val="103000"/>
+                <a:tint val="73000"/>
+              </a:schemeClr>
+            </a:gs>
+            <a:gs pos="100000">
+              <a:schemeClr val="phClr">
+                <a:lumMod val="105000"/>
+                <a:satMod val="109000"/>
+                <a:tint val="81000"/>
+              </a:schemeClr>
+            </a:gs>
+          </a:gsLst>
+          <a:lin ang="5400000" scaled="0"/>
+        </a:gradFill>
+        <a:gradFill rotWithShape="1">
+          <a:gsLst>
+            <a:gs pos="0">
+              <a:schemeClr val="phClr">
+                <a:satMod val="103000"/>
+                <a:lumMod val="102000"/>
+                <a:tint val="94000"/>
+              </a:schemeClr>
+            </a:gs>
+            <a:gs pos="50000">
+              <a:schemeClr val="phClr">
+                <a:satMod val="110000"/>
+                <a:lumMod val="100000"/>
+                <a:shade val="100000"/>
+              </a:schemeClr>
+            </a:gs>
+            <a:gs pos="100000">
+              <a:schemeClr val="phClr">
+                <a:lumMod val="99000"/>
+                <a:satMod val="120000"/>
+                <a:shade val="78000"/>
+              </a:schemeClr>
+            </a:gs>
+          </a:gsLst>
+          <a:lin ang="5400000" scaled="0"/>
+        </a:gradFill>
+      </a:fillStyleLst>
+      <a:lnStyleLst>
+        <a:ln w="12700" cap="flat" cmpd="sng" algn="ctr">
+          <a:solidFill>
+            <a:schemeClr val="phClr"/>
+          </a:solidFill>
+          <a:prstDash val="solid"/>
+          <a:miter lim="800000"/>
+        </a:ln>
+        <a:ln w="19050" cap="flat" cmpd="sng" algn="ctr">
+          <a:solidFill>
+            <a:schemeClr val="phClr"/>
+          </a:solidFill>
+          <a:prstDash val="solid"/>
+          <a:miter lim="800000"/>
+        </a:ln>
+        <a:ln w="25400" cap="flat" cmpd="sng" algn="ctr">
+          <a:solidFill>
+            <a:schemeClr val="phClr"/>
+          </a:solidFill>
+          <a:prstDash val="solid"/>
+          <a:miter lim="800000"/>
+        </a:ln>
+      </a:lnStyleLst>
+      <a:effectStyleLst>
+        <a:effectStyle>
+          <a:effectLst/>
+        </a:effectStyle>
+        <a:effectStyle>
+          <a:effectLst/>
+        </a:effectStyle>
+        <a:effectStyle>
+          <a:effectLst>
+            <a:outerShdw blurRad="57150" dist="19050" dir="5400000" algn="ctr" rotWithShape="0">
+              <a:srgbClr val="000000">
+                <a:alpha val="63000"/>
+              </a:srgbClr>
+            </a:outerShdw>
+          </a:effectLst>
+        </a:effectStyle>
+      </a:effectStyleLst>
+      <a:bgFillStyleLst>
+        <a:solidFill>
+          <a:schemeClr val="phClr"/>
+        </a:solidFill>
+        <a:solidFill>
+          <a:schemeClr val="phClr">
+            <a:tint val="95000"/>
+            <a:satMod val="170000"/>
+          </a:schemeClr>
+        </a:solidFill>
+        <a:gradFill rotWithShape="1">
+          <a:gsLst>
+            <a:gs pos="0">
+              <a:schemeClr val="phClr">
+                <a:tint val="93000"/>
+                <a:satMod val="150000"/>
+                <a:shade val="98000"/>
+                <a:lumMod val="102000"/>
+              </a:schemeClr>
+            </a:gs>
+            <a:gs pos="50000">
+              <a:schemeClr val="phClr">
+                <a:tint val="98000"/>
+                <a:satMod val="130000"/>
+                <a:shade val="90000"/>
+                <a:lumMod val="103000"/>
+              </a:schemeClr>
+            </a:gs>
+            <a:gs pos="100000">
+              <a:schemeClr val="phClr">
+                <a:shade val="63000"/>
+                <a:satMod val="120000"/>
+              </a:schemeClr>
+            </a:gs>
+          </a:gsLst>
+          <a:lin ang="5400000" scaled="0"/>
+        </a:gradFill>
+      </a:bgFillStyleLst>
+    </a:fmtScheme>
+  </a:themeElements>
+  <a:objectDefaults>
+    <a:lnDef>
+      <a:spPr/>
+      <a:bodyPr/>
+      <a:lstStyle/>
+      <a:style>
+        <a:lnRef idx="2">
+          <a:schemeClr val="accent1"/>
+        </a:lnRef>
+        <a:fillRef idx="0">
+          <a:schemeClr val="accent1"/>
+        </a:fillRef>
+        <a:effectRef idx="1">
+          <a:schemeClr val="accent1"/>
+        </a:effectRef>
+        <a:fontRef idx="minor">
+          <a:schemeClr val="tx1"/>
+        </a:fontRef>
+      </a:style>
+    </a:lnDef>
+  </a:objectDefaults>
+  <a:extraClrSchemeLst/>
+  <a:extLst>
+    <a:ext uri="{05A4C25C-085E-4340-85A3-A5531E510DB2}">
+      <thm15:themeFamily xmlns:thm15="http://schemas.microsoft.com/office/thememl/2012/main" name="Office Theme" id="{2E142A2C-CD16-42D6-873A-C26D2A0506FA}" vid="{1BDDFF52-6CD6-40A5-AB3C-68EB2F1E4D0A}"/>
+    </a:ext>
+  </a:extLst>
+</a:theme>
 </file>
</xml_diff>